<commit_message>
presentazione aggiornata (a maggio) con bozza scenario
</commit_message>
<xml_diff>
--- a/ontologia.pptx
+++ b/ontologia.pptx
@@ -5,7 +5,9 @@
     <p:sldMasterId id="2147483648" r:id="rId1"/>
   </p:sldMasterIdLst>
   <p:sldIdLst>
-    <p:sldId id="256" r:id="rId2"/>
+    <p:sldId id="257" r:id="rId2"/>
+    <p:sldId id="256" r:id="rId3"/>
+    <p:sldId id="258" r:id="rId4"/>
   </p:sldIdLst>
   <p:sldSz cx="12192000" cy="6858000"/>
   <p:notesSz cx="6858000" cy="9144000"/>
@@ -104,6 +106,11 @@
       </a:defRPr>
     </a:lvl9pPr>
   </p:defaultTextStyle>
+  <p:extLst>
+    <p:ext uri="{EFAFB233-063F-42B5-8137-9DF3F51BA10A}">
+      <p15:sldGuideLst xmlns:p15="http://schemas.microsoft.com/office/powerpoint/2012/main"/>
+    </p:ext>
+  </p:extLst>
 </p:presentation>
 </file>
 
@@ -238,7 +245,7 @@
           <a:p>
             <a:fld id="{1A332EEC-0DEC-4519-86B2-D35C9D955E4F}" type="datetimeFigureOut">
               <a:rPr lang="it-IT" smtClean="0"/>
-              <a:t>29/03/2017</a:t>
+              <a:t>12/04/2017</a:t>
             </a:fld>
             <a:endParaRPr lang="it-IT"/>
           </a:p>
@@ -280,7 +287,7 @@
           <a:p>
             <a:fld id="{6B8D206D-5D46-4416-B9F0-2EBC8E758699}" type="slidenum">
               <a:rPr lang="it-IT" smtClean="0"/>
-              <a:t>‹#›</a:t>
+              <a:t>‹N›</a:t>
             </a:fld>
             <a:endParaRPr lang="it-IT"/>
           </a:p>
@@ -408,7 +415,7 @@
           <a:p>
             <a:fld id="{1A332EEC-0DEC-4519-86B2-D35C9D955E4F}" type="datetimeFigureOut">
               <a:rPr lang="it-IT" smtClean="0"/>
-              <a:t>29/03/2017</a:t>
+              <a:t>12/04/2017</a:t>
             </a:fld>
             <a:endParaRPr lang="it-IT"/>
           </a:p>
@@ -450,7 +457,7 @@
           <a:p>
             <a:fld id="{6B8D206D-5D46-4416-B9F0-2EBC8E758699}" type="slidenum">
               <a:rPr lang="it-IT" smtClean="0"/>
-              <a:t>‹#›</a:t>
+              <a:t>‹N›</a:t>
             </a:fld>
             <a:endParaRPr lang="it-IT"/>
           </a:p>
@@ -588,7 +595,7 @@
           <a:p>
             <a:fld id="{1A332EEC-0DEC-4519-86B2-D35C9D955E4F}" type="datetimeFigureOut">
               <a:rPr lang="it-IT" smtClean="0"/>
-              <a:t>29/03/2017</a:t>
+              <a:t>12/04/2017</a:t>
             </a:fld>
             <a:endParaRPr lang="it-IT"/>
           </a:p>
@@ -630,7 +637,7 @@
           <a:p>
             <a:fld id="{6B8D206D-5D46-4416-B9F0-2EBC8E758699}" type="slidenum">
               <a:rPr lang="it-IT" smtClean="0"/>
-              <a:t>‹#›</a:t>
+              <a:t>‹N›</a:t>
             </a:fld>
             <a:endParaRPr lang="it-IT"/>
           </a:p>
@@ -758,7 +765,7 @@
           <a:p>
             <a:fld id="{1A332EEC-0DEC-4519-86B2-D35C9D955E4F}" type="datetimeFigureOut">
               <a:rPr lang="it-IT" smtClean="0"/>
-              <a:t>29/03/2017</a:t>
+              <a:t>12/04/2017</a:t>
             </a:fld>
             <a:endParaRPr lang="it-IT"/>
           </a:p>
@@ -800,7 +807,7 @@
           <a:p>
             <a:fld id="{6B8D206D-5D46-4416-B9F0-2EBC8E758699}" type="slidenum">
               <a:rPr lang="it-IT" smtClean="0"/>
-              <a:t>‹#›</a:t>
+              <a:t>‹N›</a:t>
             </a:fld>
             <a:endParaRPr lang="it-IT"/>
           </a:p>
@@ -1004,7 +1011,7 @@
           <a:p>
             <a:fld id="{1A332EEC-0DEC-4519-86B2-D35C9D955E4F}" type="datetimeFigureOut">
               <a:rPr lang="it-IT" smtClean="0"/>
-              <a:t>29/03/2017</a:t>
+              <a:t>12/04/2017</a:t>
             </a:fld>
             <a:endParaRPr lang="it-IT"/>
           </a:p>
@@ -1046,7 +1053,7 @@
           <a:p>
             <a:fld id="{6B8D206D-5D46-4416-B9F0-2EBC8E758699}" type="slidenum">
               <a:rPr lang="it-IT" smtClean="0"/>
-              <a:t>‹#›</a:t>
+              <a:t>‹N›</a:t>
             </a:fld>
             <a:endParaRPr lang="it-IT"/>
           </a:p>
@@ -1236,7 +1243,7 @@
           <a:p>
             <a:fld id="{1A332EEC-0DEC-4519-86B2-D35C9D955E4F}" type="datetimeFigureOut">
               <a:rPr lang="it-IT" smtClean="0"/>
-              <a:t>29/03/2017</a:t>
+              <a:t>12/04/2017</a:t>
             </a:fld>
             <a:endParaRPr lang="it-IT"/>
           </a:p>
@@ -1278,7 +1285,7 @@
           <a:p>
             <a:fld id="{6B8D206D-5D46-4416-B9F0-2EBC8E758699}" type="slidenum">
               <a:rPr lang="it-IT" smtClean="0"/>
-              <a:t>‹#›</a:t>
+              <a:t>‹N›</a:t>
             </a:fld>
             <a:endParaRPr lang="it-IT"/>
           </a:p>
@@ -1603,7 +1610,7 @@
           <a:p>
             <a:fld id="{1A332EEC-0DEC-4519-86B2-D35C9D955E4F}" type="datetimeFigureOut">
               <a:rPr lang="it-IT" smtClean="0"/>
-              <a:t>29/03/2017</a:t>
+              <a:t>12/04/2017</a:t>
             </a:fld>
             <a:endParaRPr lang="it-IT"/>
           </a:p>
@@ -1645,7 +1652,7 @@
           <a:p>
             <a:fld id="{6B8D206D-5D46-4416-B9F0-2EBC8E758699}" type="slidenum">
               <a:rPr lang="it-IT" smtClean="0"/>
-              <a:t>‹#›</a:t>
+              <a:t>‹N›</a:t>
             </a:fld>
             <a:endParaRPr lang="it-IT"/>
           </a:p>
@@ -1721,7 +1728,7 @@
           <a:p>
             <a:fld id="{1A332EEC-0DEC-4519-86B2-D35C9D955E4F}" type="datetimeFigureOut">
               <a:rPr lang="it-IT" smtClean="0"/>
-              <a:t>29/03/2017</a:t>
+              <a:t>12/04/2017</a:t>
             </a:fld>
             <a:endParaRPr lang="it-IT"/>
           </a:p>
@@ -1763,7 +1770,7 @@
           <a:p>
             <a:fld id="{6B8D206D-5D46-4416-B9F0-2EBC8E758699}" type="slidenum">
               <a:rPr lang="it-IT" smtClean="0"/>
-              <a:t>‹#›</a:t>
+              <a:t>‹N›</a:t>
             </a:fld>
             <a:endParaRPr lang="it-IT"/>
           </a:p>
@@ -1816,7 +1823,7 @@
           <a:p>
             <a:fld id="{1A332EEC-0DEC-4519-86B2-D35C9D955E4F}" type="datetimeFigureOut">
               <a:rPr lang="it-IT" smtClean="0"/>
-              <a:t>29/03/2017</a:t>
+              <a:t>12/04/2017</a:t>
             </a:fld>
             <a:endParaRPr lang="it-IT"/>
           </a:p>
@@ -1858,7 +1865,7 @@
           <a:p>
             <a:fld id="{6B8D206D-5D46-4416-B9F0-2EBC8E758699}" type="slidenum">
               <a:rPr lang="it-IT" smtClean="0"/>
-              <a:t>‹#›</a:t>
+              <a:t>‹N›</a:t>
             </a:fld>
             <a:endParaRPr lang="it-IT"/>
           </a:p>
@@ -2093,7 +2100,7 @@
           <a:p>
             <a:fld id="{1A332EEC-0DEC-4519-86B2-D35C9D955E4F}" type="datetimeFigureOut">
               <a:rPr lang="it-IT" smtClean="0"/>
-              <a:t>29/03/2017</a:t>
+              <a:t>12/04/2017</a:t>
             </a:fld>
             <a:endParaRPr lang="it-IT"/>
           </a:p>
@@ -2135,7 +2142,7 @@
           <a:p>
             <a:fld id="{6B8D206D-5D46-4416-B9F0-2EBC8E758699}" type="slidenum">
               <a:rPr lang="it-IT" smtClean="0"/>
-              <a:t>‹#›</a:t>
+              <a:t>‹N›</a:t>
             </a:fld>
             <a:endParaRPr lang="it-IT"/>
           </a:p>
@@ -2346,7 +2353,7 @@
           <a:p>
             <a:fld id="{1A332EEC-0DEC-4519-86B2-D35C9D955E4F}" type="datetimeFigureOut">
               <a:rPr lang="it-IT" smtClean="0"/>
-              <a:t>29/03/2017</a:t>
+              <a:t>12/04/2017</a:t>
             </a:fld>
             <a:endParaRPr lang="it-IT"/>
           </a:p>
@@ -2388,7 +2395,7 @@
           <a:p>
             <a:fld id="{6B8D206D-5D46-4416-B9F0-2EBC8E758699}" type="slidenum">
               <a:rPr lang="it-IT" smtClean="0"/>
-              <a:t>‹#›</a:t>
+              <a:t>‹N›</a:t>
             </a:fld>
             <a:endParaRPr lang="it-IT"/>
           </a:p>
@@ -2559,7 +2566,7 @@
           <a:p>
             <a:fld id="{1A332EEC-0DEC-4519-86B2-D35C9D955E4F}" type="datetimeFigureOut">
               <a:rPr lang="it-IT" smtClean="0"/>
-              <a:t>29/03/2017</a:t>
+              <a:t>12/04/2017</a:t>
             </a:fld>
             <a:endParaRPr lang="it-IT"/>
           </a:p>
@@ -2637,7 +2644,7 @@
           <a:p>
             <a:fld id="{6B8D206D-5D46-4416-B9F0-2EBC8E758699}" type="slidenum">
               <a:rPr lang="it-IT" smtClean="0"/>
-              <a:t>‹#›</a:t>
+              <a:t>‹N›</a:t>
             </a:fld>
             <a:endParaRPr lang="it-IT"/>
           </a:p>
@@ -2966,6 +2973,1995 @@
       </p:grpSpPr>
       <p:sp>
         <p:nvSpPr>
+          <p:cNvPr id="2" name="Titolo 1"/>
+          <p:cNvSpPr>
+            <a:spLocks noGrp="1"/>
+          </p:cNvSpPr>
+          <p:nvPr>
+            <p:ph type="title"/>
+          </p:nvPr>
+        </p:nvSpPr>
+        <p:spPr/>
+        <p:txBody>
+          <a:bodyPr/>
+          <a:lstStyle/>
+          <a:p>
+            <a:pPr algn="ctr"/>
+            <a:r>
+              <a:rPr lang="it-IT" dirty="0"/>
+              <a:t>Scenario</a:t>
+            </a:r>
+          </a:p>
+        </p:txBody>
+      </p:sp>
+      <p:sp>
+        <p:nvSpPr>
+          <p:cNvPr id="4" name="Rettangolo 3"/>
+          <p:cNvSpPr/>
+          <p:nvPr/>
+        </p:nvSpPr>
+        <p:spPr>
+          <a:xfrm>
+            <a:off x="838200" y="2152482"/>
+            <a:ext cx="3636696" cy="2589452"/>
+          </a:xfrm>
+          <a:prstGeom prst="rect">
+            <a:avLst/>
+          </a:prstGeom>
+          <a:solidFill>
+            <a:schemeClr val="bg1"/>
+          </a:solidFill>
+        </p:spPr>
+        <p:style>
+          <a:lnRef idx="2">
+            <a:schemeClr val="accent1">
+              <a:shade val="50000"/>
+            </a:schemeClr>
+          </a:lnRef>
+          <a:fillRef idx="1">
+            <a:schemeClr val="accent1"/>
+          </a:fillRef>
+          <a:effectRef idx="0">
+            <a:schemeClr val="accent1"/>
+          </a:effectRef>
+          <a:fontRef idx="minor">
+            <a:schemeClr val="lt1"/>
+          </a:fontRef>
+        </p:style>
+        <p:txBody>
+          <a:bodyPr rtlCol="0" anchor="ctr"/>
+          <a:lstStyle/>
+          <a:p>
+            <a:pPr algn="ctr"/>
+            <a:endParaRPr lang="it-IT"/>
+          </a:p>
+        </p:txBody>
+      </p:sp>
+      <p:sp>
+        <p:nvSpPr>
+          <p:cNvPr id="5" name="Rettangolo 4"/>
+          <p:cNvSpPr/>
+          <p:nvPr/>
+        </p:nvSpPr>
+        <p:spPr>
+          <a:xfrm>
+            <a:off x="1278542" y="2605635"/>
+            <a:ext cx="882031" cy="1383738"/>
+          </a:xfrm>
+          <a:prstGeom prst="rect">
+            <a:avLst/>
+          </a:prstGeom>
+        </p:spPr>
+        <p:style>
+          <a:lnRef idx="2">
+            <a:schemeClr val="accent1">
+              <a:shade val="50000"/>
+            </a:schemeClr>
+          </a:lnRef>
+          <a:fillRef idx="1">
+            <a:schemeClr val="accent1"/>
+          </a:fillRef>
+          <a:effectRef idx="0">
+            <a:schemeClr val="accent1"/>
+          </a:effectRef>
+          <a:fontRef idx="minor">
+            <a:schemeClr val="lt1"/>
+          </a:fontRef>
+        </p:style>
+        <p:txBody>
+          <a:bodyPr rtlCol="0" anchor="ctr"/>
+          <a:lstStyle/>
+          <a:p>
+            <a:pPr algn="ctr"/>
+            <a:endParaRPr lang="it-IT"/>
+          </a:p>
+        </p:txBody>
+      </p:sp>
+      <p:sp>
+        <p:nvSpPr>
+          <p:cNvPr id="7" name="Ovale 6"/>
+          <p:cNvSpPr/>
+          <p:nvPr/>
+        </p:nvSpPr>
+        <p:spPr>
+          <a:xfrm>
+            <a:off x="1375646" y="2840305"/>
+            <a:ext cx="89012" cy="89012"/>
+          </a:xfrm>
+          <a:prstGeom prst="ellipse">
+            <a:avLst/>
+          </a:prstGeom>
+          <a:solidFill>
+            <a:srgbClr val="FF0000"/>
+          </a:solidFill>
+        </p:spPr>
+        <p:style>
+          <a:lnRef idx="2">
+            <a:schemeClr val="accent1">
+              <a:shade val="50000"/>
+            </a:schemeClr>
+          </a:lnRef>
+          <a:fillRef idx="1">
+            <a:schemeClr val="accent1"/>
+          </a:fillRef>
+          <a:effectRef idx="0">
+            <a:schemeClr val="accent1"/>
+          </a:effectRef>
+          <a:fontRef idx="minor">
+            <a:schemeClr val="lt1"/>
+          </a:fontRef>
+        </p:style>
+        <p:txBody>
+          <a:bodyPr rtlCol="0" anchor="ctr"/>
+          <a:lstStyle/>
+          <a:p>
+            <a:pPr algn="ctr"/>
+            <a:endParaRPr lang="it-IT"/>
+          </a:p>
+        </p:txBody>
+      </p:sp>
+      <p:sp>
+        <p:nvSpPr>
+          <p:cNvPr id="8" name="Ovale 7"/>
+          <p:cNvSpPr/>
+          <p:nvPr/>
+        </p:nvSpPr>
+        <p:spPr>
+          <a:xfrm>
+            <a:off x="1950183" y="2840305"/>
+            <a:ext cx="89012" cy="89012"/>
+          </a:xfrm>
+          <a:prstGeom prst="ellipse">
+            <a:avLst/>
+          </a:prstGeom>
+          <a:solidFill>
+            <a:srgbClr val="FF0000"/>
+          </a:solidFill>
+        </p:spPr>
+        <p:style>
+          <a:lnRef idx="2">
+            <a:schemeClr val="accent1">
+              <a:shade val="50000"/>
+            </a:schemeClr>
+          </a:lnRef>
+          <a:fillRef idx="1">
+            <a:schemeClr val="accent1"/>
+          </a:fillRef>
+          <a:effectRef idx="0">
+            <a:schemeClr val="accent1"/>
+          </a:effectRef>
+          <a:fontRef idx="minor">
+            <a:schemeClr val="lt1"/>
+          </a:fontRef>
+        </p:style>
+        <p:txBody>
+          <a:bodyPr rtlCol="0" anchor="ctr"/>
+          <a:lstStyle/>
+          <a:p>
+            <a:pPr algn="ctr"/>
+            <a:endParaRPr lang="it-IT"/>
+          </a:p>
+        </p:txBody>
+      </p:sp>
+      <p:sp>
+        <p:nvSpPr>
+          <p:cNvPr id="9" name="Ovale 8"/>
+          <p:cNvSpPr/>
+          <p:nvPr/>
+        </p:nvSpPr>
+        <p:spPr>
+          <a:xfrm>
+            <a:off x="1375646" y="3706152"/>
+            <a:ext cx="89012" cy="89012"/>
+          </a:xfrm>
+          <a:prstGeom prst="ellipse">
+            <a:avLst/>
+          </a:prstGeom>
+          <a:solidFill>
+            <a:srgbClr val="FF0000"/>
+          </a:solidFill>
+        </p:spPr>
+        <p:style>
+          <a:lnRef idx="2">
+            <a:schemeClr val="accent1">
+              <a:shade val="50000"/>
+            </a:schemeClr>
+          </a:lnRef>
+          <a:fillRef idx="1">
+            <a:schemeClr val="accent1"/>
+          </a:fillRef>
+          <a:effectRef idx="0">
+            <a:schemeClr val="accent1"/>
+          </a:effectRef>
+          <a:fontRef idx="minor">
+            <a:schemeClr val="lt1"/>
+          </a:fontRef>
+        </p:style>
+        <p:txBody>
+          <a:bodyPr rtlCol="0" anchor="ctr"/>
+          <a:lstStyle/>
+          <a:p>
+            <a:pPr algn="ctr"/>
+            <a:endParaRPr lang="it-IT"/>
+          </a:p>
+        </p:txBody>
+      </p:sp>
+      <p:sp>
+        <p:nvSpPr>
+          <p:cNvPr id="10" name="Ovale 9"/>
+          <p:cNvSpPr/>
+          <p:nvPr/>
+        </p:nvSpPr>
+        <p:spPr>
+          <a:xfrm>
+            <a:off x="1950183" y="3706152"/>
+            <a:ext cx="89012" cy="89012"/>
+          </a:xfrm>
+          <a:prstGeom prst="ellipse">
+            <a:avLst/>
+          </a:prstGeom>
+          <a:solidFill>
+            <a:srgbClr val="FF0000"/>
+          </a:solidFill>
+        </p:spPr>
+        <p:style>
+          <a:lnRef idx="2">
+            <a:schemeClr val="accent1">
+              <a:shade val="50000"/>
+            </a:schemeClr>
+          </a:lnRef>
+          <a:fillRef idx="1">
+            <a:schemeClr val="accent1"/>
+          </a:fillRef>
+          <a:effectRef idx="0">
+            <a:schemeClr val="accent1"/>
+          </a:effectRef>
+          <a:fontRef idx="minor">
+            <a:schemeClr val="lt1"/>
+          </a:fontRef>
+        </p:style>
+        <p:txBody>
+          <a:bodyPr rtlCol="0" anchor="ctr"/>
+          <a:lstStyle/>
+          <a:p>
+            <a:pPr algn="ctr"/>
+            <a:endParaRPr lang="it-IT"/>
+          </a:p>
+        </p:txBody>
+      </p:sp>
+      <p:sp>
+        <p:nvSpPr>
+          <p:cNvPr id="11" name="Ovale 10"/>
+          <p:cNvSpPr/>
+          <p:nvPr/>
+        </p:nvSpPr>
+        <p:spPr>
+          <a:xfrm>
+            <a:off x="1096472" y="2840305"/>
+            <a:ext cx="89012" cy="89012"/>
+          </a:xfrm>
+          <a:prstGeom prst="ellipse">
+            <a:avLst/>
+          </a:prstGeom>
+          <a:solidFill>
+            <a:schemeClr val="accent6"/>
+          </a:solidFill>
+        </p:spPr>
+        <p:style>
+          <a:lnRef idx="2">
+            <a:schemeClr val="accent1">
+              <a:shade val="50000"/>
+            </a:schemeClr>
+          </a:lnRef>
+          <a:fillRef idx="1">
+            <a:schemeClr val="accent1"/>
+          </a:fillRef>
+          <a:effectRef idx="0">
+            <a:schemeClr val="accent1"/>
+          </a:effectRef>
+          <a:fontRef idx="minor">
+            <a:schemeClr val="lt1"/>
+          </a:fontRef>
+        </p:style>
+        <p:txBody>
+          <a:bodyPr rtlCol="0" anchor="ctr"/>
+          <a:lstStyle/>
+          <a:p>
+            <a:pPr algn="ctr"/>
+            <a:endParaRPr lang="it-IT"/>
+          </a:p>
+        </p:txBody>
+      </p:sp>
+      <p:sp>
+        <p:nvSpPr>
+          <p:cNvPr id="12" name="Ovale 11"/>
+          <p:cNvSpPr/>
+          <p:nvPr/>
+        </p:nvSpPr>
+        <p:spPr>
+          <a:xfrm>
+            <a:off x="1096472" y="3706152"/>
+            <a:ext cx="89012" cy="89012"/>
+          </a:xfrm>
+          <a:prstGeom prst="ellipse">
+            <a:avLst/>
+          </a:prstGeom>
+          <a:solidFill>
+            <a:schemeClr val="accent6"/>
+          </a:solidFill>
+        </p:spPr>
+        <p:style>
+          <a:lnRef idx="2">
+            <a:schemeClr val="accent1">
+              <a:shade val="50000"/>
+            </a:schemeClr>
+          </a:lnRef>
+          <a:fillRef idx="1">
+            <a:schemeClr val="accent1"/>
+          </a:fillRef>
+          <a:effectRef idx="0">
+            <a:schemeClr val="accent1"/>
+          </a:effectRef>
+          <a:fontRef idx="minor">
+            <a:schemeClr val="lt1"/>
+          </a:fontRef>
+        </p:style>
+        <p:txBody>
+          <a:bodyPr rtlCol="0" anchor="ctr"/>
+          <a:lstStyle/>
+          <a:p>
+            <a:pPr algn="ctr"/>
+            <a:endParaRPr lang="it-IT"/>
+          </a:p>
+        </p:txBody>
+      </p:sp>
+      <p:sp>
+        <p:nvSpPr>
+          <p:cNvPr id="13" name="Ovale 12"/>
+          <p:cNvSpPr/>
+          <p:nvPr/>
+        </p:nvSpPr>
+        <p:spPr>
+          <a:xfrm>
+            <a:off x="2253631" y="2840305"/>
+            <a:ext cx="89012" cy="89012"/>
+          </a:xfrm>
+          <a:prstGeom prst="ellipse">
+            <a:avLst/>
+          </a:prstGeom>
+          <a:solidFill>
+            <a:schemeClr val="accent6"/>
+          </a:solidFill>
+        </p:spPr>
+        <p:style>
+          <a:lnRef idx="2">
+            <a:schemeClr val="accent1">
+              <a:shade val="50000"/>
+            </a:schemeClr>
+          </a:lnRef>
+          <a:fillRef idx="1">
+            <a:schemeClr val="accent1"/>
+          </a:fillRef>
+          <a:effectRef idx="0">
+            <a:schemeClr val="accent1"/>
+          </a:effectRef>
+          <a:fontRef idx="minor">
+            <a:schemeClr val="lt1"/>
+          </a:fontRef>
+        </p:style>
+        <p:txBody>
+          <a:bodyPr rtlCol="0" anchor="ctr"/>
+          <a:lstStyle/>
+          <a:p>
+            <a:pPr algn="ctr"/>
+            <a:endParaRPr lang="it-IT"/>
+          </a:p>
+        </p:txBody>
+      </p:sp>
+      <p:sp>
+        <p:nvSpPr>
+          <p:cNvPr id="14" name="Ovale 13"/>
+          <p:cNvSpPr/>
+          <p:nvPr/>
+        </p:nvSpPr>
+        <p:spPr>
+          <a:xfrm>
+            <a:off x="2253631" y="3706152"/>
+            <a:ext cx="89012" cy="89012"/>
+          </a:xfrm>
+          <a:prstGeom prst="ellipse">
+            <a:avLst/>
+          </a:prstGeom>
+          <a:solidFill>
+            <a:schemeClr val="accent6"/>
+          </a:solidFill>
+        </p:spPr>
+        <p:style>
+          <a:lnRef idx="2">
+            <a:schemeClr val="accent1">
+              <a:shade val="50000"/>
+            </a:schemeClr>
+          </a:lnRef>
+          <a:fillRef idx="1">
+            <a:schemeClr val="accent1"/>
+          </a:fillRef>
+          <a:effectRef idx="0">
+            <a:schemeClr val="accent1"/>
+          </a:effectRef>
+          <a:fontRef idx="minor">
+            <a:schemeClr val="lt1"/>
+          </a:fontRef>
+        </p:style>
+        <p:txBody>
+          <a:bodyPr rtlCol="0" anchor="ctr"/>
+          <a:lstStyle/>
+          <a:p>
+            <a:pPr algn="ctr"/>
+            <a:endParaRPr lang="it-IT"/>
+          </a:p>
+        </p:txBody>
+      </p:sp>
+      <p:sp>
+        <p:nvSpPr>
+          <p:cNvPr id="15" name="Rettangolo 14"/>
+          <p:cNvSpPr/>
+          <p:nvPr/>
+        </p:nvSpPr>
+        <p:spPr>
+          <a:xfrm>
+            <a:off x="2967754" y="2605635"/>
+            <a:ext cx="882031" cy="1383738"/>
+          </a:xfrm>
+          <a:prstGeom prst="rect">
+            <a:avLst/>
+          </a:prstGeom>
+        </p:spPr>
+        <p:style>
+          <a:lnRef idx="2">
+            <a:schemeClr val="accent1">
+              <a:shade val="50000"/>
+            </a:schemeClr>
+          </a:lnRef>
+          <a:fillRef idx="1">
+            <a:schemeClr val="accent1"/>
+          </a:fillRef>
+          <a:effectRef idx="0">
+            <a:schemeClr val="accent1"/>
+          </a:effectRef>
+          <a:fontRef idx="minor">
+            <a:schemeClr val="lt1"/>
+          </a:fontRef>
+        </p:style>
+        <p:txBody>
+          <a:bodyPr rtlCol="0" anchor="ctr"/>
+          <a:lstStyle/>
+          <a:p>
+            <a:pPr algn="ctr"/>
+            <a:endParaRPr lang="it-IT"/>
+          </a:p>
+        </p:txBody>
+      </p:sp>
+      <p:sp>
+        <p:nvSpPr>
+          <p:cNvPr id="16" name="Ovale 15"/>
+          <p:cNvSpPr/>
+          <p:nvPr/>
+        </p:nvSpPr>
+        <p:spPr>
+          <a:xfrm>
+            <a:off x="3064858" y="2840305"/>
+            <a:ext cx="89012" cy="89012"/>
+          </a:xfrm>
+          <a:prstGeom prst="ellipse">
+            <a:avLst/>
+          </a:prstGeom>
+          <a:solidFill>
+            <a:srgbClr val="FF0000"/>
+          </a:solidFill>
+        </p:spPr>
+        <p:style>
+          <a:lnRef idx="2">
+            <a:schemeClr val="accent1">
+              <a:shade val="50000"/>
+            </a:schemeClr>
+          </a:lnRef>
+          <a:fillRef idx="1">
+            <a:schemeClr val="accent1"/>
+          </a:fillRef>
+          <a:effectRef idx="0">
+            <a:schemeClr val="accent1"/>
+          </a:effectRef>
+          <a:fontRef idx="minor">
+            <a:schemeClr val="lt1"/>
+          </a:fontRef>
+        </p:style>
+        <p:txBody>
+          <a:bodyPr rtlCol="0" anchor="ctr"/>
+          <a:lstStyle/>
+          <a:p>
+            <a:pPr algn="ctr"/>
+            <a:endParaRPr lang="it-IT"/>
+          </a:p>
+        </p:txBody>
+      </p:sp>
+      <p:sp>
+        <p:nvSpPr>
+          <p:cNvPr id="17" name="Ovale 16"/>
+          <p:cNvSpPr/>
+          <p:nvPr/>
+        </p:nvSpPr>
+        <p:spPr>
+          <a:xfrm>
+            <a:off x="3639395" y="2840305"/>
+            <a:ext cx="89012" cy="89012"/>
+          </a:xfrm>
+          <a:prstGeom prst="ellipse">
+            <a:avLst/>
+          </a:prstGeom>
+          <a:solidFill>
+            <a:srgbClr val="FF0000"/>
+          </a:solidFill>
+        </p:spPr>
+        <p:style>
+          <a:lnRef idx="2">
+            <a:schemeClr val="accent1">
+              <a:shade val="50000"/>
+            </a:schemeClr>
+          </a:lnRef>
+          <a:fillRef idx="1">
+            <a:schemeClr val="accent1"/>
+          </a:fillRef>
+          <a:effectRef idx="0">
+            <a:schemeClr val="accent1"/>
+          </a:effectRef>
+          <a:fontRef idx="minor">
+            <a:schemeClr val="lt1"/>
+          </a:fontRef>
+        </p:style>
+        <p:txBody>
+          <a:bodyPr rtlCol="0" anchor="ctr"/>
+          <a:lstStyle/>
+          <a:p>
+            <a:pPr algn="ctr"/>
+            <a:endParaRPr lang="it-IT"/>
+          </a:p>
+        </p:txBody>
+      </p:sp>
+      <p:sp>
+        <p:nvSpPr>
+          <p:cNvPr id="18" name="Ovale 17"/>
+          <p:cNvSpPr/>
+          <p:nvPr/>
+        </p:nvSpPr>
+        <p:spPr>
+          <a:xfrm>
+            <a:off x="3064858" y="3706152"/>
+            <a:ext cx="89012" cy="89012"/>
+          </a:xfrm>
+          <a:prstGeom prst="ellipse">
+            <a:avLst/>
+          </a:prstGeom>
+          <a:solidFill>
+            <a:srgbClr val="FF0000"/>
+          </a:solidFill>
+        </p:spPr>
+        <p:style>
+          <a:lnRef idx="2">
+            <a:schemeClr val="accent1">
+              <a:shade val="50000"/>
+            </a:schemeClr>
+          </a:lnRef>
+          <a:fillRef idx="1">
+            <a:schemeClr val="accent1"/>
+          </a:fillRef>
+          <a:effectRef idx="0">
+            <a:schemeClr val="accent1"/>
+          </a:effectRef>
+          <a:fontRef idx="minor">
+            <a:schemeClr val="lt1"/>
+          </a:fontRef>
+        </p:style>
+        <p:txBody>
+          <a:bodyPr rtlCol="0" anchor="ctr"/>
+          <a:lstStyle/>
+          <a:p>
+            <a:pPr algn="ctr"/>
+            <a:endParaRPr lang="it-IT"/>
+          </a:p>
+        </p:txBody>
+      </p:sp>
+      <p:sp>
+        <p:nvSpPr>
+          <p:cNvPr id="19" name="Ovale 18"/>
+          <p:cNvSpPr/>
+          <p:nvPr/>
+        </p:nvSpPr>
+        <p:spPr>
+          <a:xfrm>
+            <a:off x="3639395" y="3706152"/>
+            <a:ext cx="89012" cy="89012"/>
+          </a:xfrm>
+          <a:prstGeom prst="ellipse">
+            <a:avLst/>
+          </a:prstGeom>
+          <a:solidFill>
+            <a:srgbClr val="FF0000"/>
+          </a:solidFill>
+        </p:spPr>
+        <p:style>
+          <a:lnRef idx="2">
+            <a:schemeClr val="accent1">
+              <a:shade val="50000"/>
+            </a:schemeClr>
+          </a:lnRef>
+          <a:fillRef idx="1">
+            <a:schemeClr val="accent1"/>
+          </a:fillRef>
+          <a:effectRef idx="0">
+            <a:schemeClr val="accent1"/>
+          </a:effectRef>
+          <a:fontRef idx="minor">
+            <a:schemeClr val="lt1"/>
+          </a:fontRef>
+        </p:style>
+        <p:txBody>
+          <a:bodyPr rtlCol="0" anchor="ctr"/>
+          <a:lstStyle/>
+          <a:p>
+            <a:pPr algn="ctr"/>
+            <a:endParaRPr lang="it-IT"/>
+          </a:p>
+        </p:txBody>
+      </p:sp>
+      <p:sp>
+        <p:nvSpPr>
+          <p:cNvPr id="20" name="Ovale 19"/>
+          <p:cNvSpPr/>
+          <p:nvPr/>
+        </p:nvSpPr>
+        <p:spPr>
+          <a:xfrm>
+            <a:off x="2785684" y="2840305"/>
+            <a:ext cx="89012" cy="89012"/>
+          </a:xfrm>
+          <a:prstGeom prst="ellipse">
+            <a:avLst/>
+          </a:prstGeom>
+          <a:solidFill>
+            <a:schemeClr val="accent6"/>
+          </a:solidFill>
+        </p:spPr>
+        <p:style>
+          <a:lnRef idx="2">
+            <a:schemeClr val="accent1">
+              <a:shade val="50000"/>
+            </a:schemeClr>
+          </a:lnRef>
+          <a:fillRef idx="1">
+            <a:schemeClr val="accent1"/>
+          </a:fillRef>
+          <a:effectRef idx="0">
+            <a:schemeClr val="accent1"/>
+          </a:effectRef>
+          <a:fontRef idx="minor">
+            <a:schemeClr val="lt1"/>
+          </a:fontRef>
+        </p:style>
+        <p:txBody>
+          <a:bodyPr rtlCol="0" anchor="ctr"/>
+          <a:lstStyle/>
+          <a:p>
+            <a:pPr algn="ctr"/>
+            <a:endParaRPr lang="it-IT"/>
+          </a:p>
+        </p:txBody>
+      </p:sp>
+      <p:sp>
+        <p:nvSpPr>
+          <p:cNvPr id="21" name="Ovale 20"/>
+          <p:cNvSpPr/>
+          <p:nvPr/>
+        </p:nvSpPr>
+        <p:spPr>
+          <a:xfrm>
+            <a:off x="2785684" y="3706152"/>
+            <a:ext cx="89012" cy="89012"/>
+          </a:xfrm>
+          <a:prstGeom prst="ellipse">
+            <a:avLst/>
+          </a:prstGeom>
+          <a:solidFill>
+            <a:schemeClr val="accent6"/>
+          </a:solidFill>
+        </p:spPr>
+        <p:style>
+          <a:lnRef idx="2">
+            <a:schemeClr val="accent1">
+              <a:shade val="50000"/>
+            </a:schemeClr>
+          </a:lnRef>
+          <a:fillRef idx="1">
+            <a:schemeClr val="accent1"/>
+          </a:fillRef>
+          <a:effectRef idx="0">
+            <a:schemeClr val="accent1"/>
+          </a:effectRef>
+          <a:fontRef idx="minor">
+            <a:schemeClr val="lt1"/>
+          </a:fontRef>
+        </p:style>
+        <p:txBody>
+          <a:bodyPr rtlCol="0" anchor="ctr"/>
+          <a:lstStyle/>
+          <a:p>
+            <a:pPr algn="ctr"/>
+            <a:endParaRPr lang="it-IT"/>
+          </a:p>
+        </p:txBody>
+      </p:sp>
+      <p:sp>
+        <p:nvSpPr>
+          <p:cNvPr id="22" name="Ovale 21"/>
+          <p:cNvSpPr/>
+          <p:nvPr/>
+        </p:nvSpPr>
+        <p:spPr>
+          <a:xfrm>
+            <a:off x="3942843" y="2840305"/>
+            <a:ext cx="89012" cy="89012"/>
+          </a:xfrm>
+          <a:prstGeom prst="ellipse">
+            <a:avLst/>
+          </a:prstGeom>
+          <a:solidFill>
+            <a:schemeClr val="accent6"/>
+          </a:solidFill>
+        </p:spPr>
+        <p:style>
+          <a:lnRef idx="2">
+            <a:schemeClr val="accent1">
+              <a:shade val="50000"/>
+            </a:schemeClr>
+          </a:lnRef>
+          <a:fillRef idx="1">
+            <a:schemeClr val="accent1"/>
+          </a:fillRef>
+          <a:effectRef idx="0">
+            <a:schemeClr val="accent1"/>
+          </a:effectRef>
+          <a:fontRef idx="minor">
+            <a:schemeClr val="lt1"/>
+          </a:fontRef>
+        </p:style>
+        <p:txBody>
+          <a:bodyPr rtlCol="0" anchor="ctr"/>
+          <a:lstStyle/>
+          <a:p>
+            <a:pPr algn="ctr"/>
+            <a:endParaRPr lang="it-IT"/>
+          </a:p>
+        </p:txBody>
+      </p:sp>
+      <p:sp>
+        <p:nvSpPr>
+          <p:cNvPr id="23" name="Ovale 22"/>
+          <p:cNvSpPr/>
+          <p:nvPr/>
+        </p:nvSpPr>
+        <p:spPr>
+          <a:xfrm>
+            <a:off x="3942843" y="3706152"/>
+            <a:ext cx="89012" cy="89012"/>
+          </a:xfrm>
+          <a:prstGeom prst="ellipse">
+            <a:avLst/>
+          </a:prstGeom>
+          <a:solidFill>
+            <a:schemeClr val="accent6"/>
+          </a:solidFill>
+        </p:spPr>
+        <p:style>
+          <a:lnRef idx="2">
+            <a:schemeClr val="accent1">
+              <a:shade val="50000"/>
+            </a:schemeClr>
+          </a:lnRef>
+          <a:fillRef idx="1">
+            <a:schemeClr val="accent1"/>
+          </a:fillRef>
+          <a:effectRef idx="0">
+            <a:schemeClr val="accent1"/>
+          </a:effectRef>
+          <a:fontRef idx="minor">
+            <a:schemeClr val="lt1"/>
+          </a:fontRef>
+        </p:style>
+        <p:txBody>
+          <a:bodyPr rtlCol="0" anchor="ctr"/>
+          <a:lstStyle/>
+          <a:p>
+            <a:pPr algn="ctr"/>
+            <a:endParaRPr lang="it-IT"/>
+          </a:p>
+        </p:txBody>
+      </p:sp>
+      <p:sp>
+        <p:nvSpPr>
+          <p:cNvPr id="25" name="Callout 2 24"/>
+          <p:cNvSpPr/>
+          <p:nvPr/>
+        </p:nvSpPr>
+        <p:spPr>
+          <a:xfrm>
+            <a:off x="4685288" y="2840305"/>
+            <a:ext cx="1097144" cy="250853"/>
+          </a:xfrm>
+          <a:prstGeom prst="borderCallout2">
+            <a:avLst>
+              <a:gd name="adj1" fmla="val 18750"/>
+              <a:gd name="adj2" fmla="val 695"/>
+              <a:gd name="adj3" fmla="val 18750"/>
+              <a:gd name="adj4" fmla="val -16667"/>
+              <a:gd name="adj5" fmla="val 17578"/>
+              <a:gd name="adj6" fmla="val -58301"/>
+            </a:avLst>
+          </a:prstGeom>
+          <a:solidFill>
+            <a:schemeClr val="bg1"/>
+          </a:solidFill>
+        </p:spPr>
+        <p:style>
+          <a:lnRef idx="2">
+            <a:schemeClr val="accent1">
+              <a:shade val="50000"/>
+            </a:schemeClr>
+          </a:lnRef>
+          <a:fillRef idx="1">
+            <a:schemeClr val="accent1"/>
+          </a:fillRef>
+          <a:effectRef idx="0">
+            <a:schemeClr val="accent1"/>
+          </a:effectRef>
+          <a:fontRef idx="minor">
+            <a:schemeClr val="lt1"/>
+          </a:fontRef>
+        </p:style>
+        <p:txBody>
+          <a:bodyPr rtlCol="0" anchor="ctr"/>
+          <a:lstStyle/>
+          <a:p>
+            <a:pPr algn="ctr"/>
+            <a:r>
+              <a:rPr lang="it-IT" sz="1200" dirty="0">
+                <a:solidFill>
+                  <a:sysClr val="windowText" lastClr="000000"/>
+                </a:solidFill>
+              </a:rPr>
+              <a:t>sensore sedia</a:t>
+            </a:r>
+          </a:p>
+        </p:txBody>
+      </p:sp>
+      <p:sp>
+        <p:nvSpPr>
+          <p:cNvPr id="26" name="Callout 2 25"/>
+          <p:cNvSpPr/>
+          <p:nvPr/>
+        </p:nvSpPr>
+        <p:spPr>
+          <a:xfrm>
+            <a:off x="4696753" y="2480208"/>
+            <a:ext cx="1097144" cy="250853"/>
+          </a:xfrm>
+          <a:prstGeom prst="borderCallout2">
+            <a:avLst>
+              <a:gd name="adj1" fmla="val 18750"/>
+              <a:gd name="adj2" fmla="val 695"/>
+              <a:gd name="adj3" fmla="val 18750"/>
+              <a:gd name="adj4" fmla="val -35417"/>
+              <a:gd name="adj5" fmla="val 156288"/>
+              <a:gd name="adj6" fmla="val -95539"/>
+            </a:avLst>
+          </a:prstGeom>
+          <a:solidFill>
+            <a:schemeClr val="bg1"/>
+          </a:solidFill>
+        </p:spPr>
+        <p:style>
+          <a:lnRef idx="2">
+            <a:schemeClr val="accent1">
+              <a:shade val="50000"/>
+            </a:schemeClr>
+          </a:lnRef>
+          <a:fillRef idx="1">
+            <a:schemeClr val="accent1"/>
+          </a:fillRef>
+          <a:effectRef idx="0">
+            <a:schemeClr val="accent1"/>
+          </a:effectRef>
+          <a:fontRef idx="minor">
+            <a:schemeClr val="lt1"/>
+          </a:fontRef>
+        </p:style>
+        <p:txBody>
+          <a:bodyPr rtlCol="0" anchor="ctr"/>
+          <a:lstStyle/>
+          <a:p>
+            <a:pPr algn="ctr"/>
+            <a:r>
+              <a:rPr lang="it-IT" sz="1200" dirty="0">
+                <a:solidFill>
+                  <a:sysClr val="windowText" lastClr="000000"/>
+                </a:solidFill>
+              </a:rPr>
+              <a:t>sensore tavolo</a:t>
+            </a:r>
+          </a:p>
+        </p:txBody>
+      </p:sp>
+      <p:pic>
+        <p:nvPicPr>
+          <p:cNvPr id="27" name="Immagine 26"/>
+          <p:cNvPicPr>
+            <a:picLocks noChangeAspect="1"/>
+          </p:cNvPicPr>
+          <p:nvPr/>
+        </p:nvPicPr>
+        <p:blipFill rotWithShape="1">
+          <a:blip r:embed="rId2"/>
+          <a:srcRect l="2201" t="1668" r="4600" b="5443"/>
+          <a:stretch/>
+        </p:blipFill>
+        <p:spPr>
+          <a:xfrm>
+            <a:off x="4689446" y="5058561"/>
+            <a:ext cx="1937857" cy="1409351"/>
+          </a:xfrm>
+          <a:prstGeom prst="rect">
+            <a:avLst/>
+          </a:prstGeom>
+        </p:spPr>
+      </p:pic>
+      <p:pic>
+        <p:nvPicPr>
+          <p:cNvPr id="28" name="Immagine 27"/>
+          <p:cNvPicPr>
+            <a:picLocks noChangeAspect="1"/>
+          </p:cNvPicPr>
+          <p:nvPr/>
+        </p:nvPicPr>
+        <p:blipFill>
+          <a:blip r:embed="rId3" cstate="print">
+            <a:extLst>
+              <a:ext uri="{28A0092B-C50C-407E-A947-70E740481C1C}">
+                <a14:useLocalDpi xmlns:a14="http://schemas.microsoft.com/office/drawing/2010/main" val="0"/>
+              </a:ext>
+            </a:extLst>
+          </a:blip>
+          <a:stretch>
+            <a:fillRect/>
+          </a:stretch>
+        </p:blipFill>
+        <p:spPr>
+          <a:xfrm>
+            <a:off x="9217825" y="4741934"/>
+            <a:ext cx="1349200" cy="1908495"/>
+          </a:xfrm>
+          <a:prstGeom prst="rect">
+            <a:avLst/>
+          </a:prstGeom>
+        </p:spPr>
+      </p:pic>
+      <p:sp>
+        <p:nvSpPr>
+          <p:cNvPr id="29" name="Freccia a destra rientrata 28"/>
+          <p:cNvSpPr/>
+          <p:nvPr/>
+        </p:nvSpPr>
+        <p:spPr>
+          <a:xfrm rot="3991473">
+            <a:off x="3281198" y="3956473"/>
+            <a:ext cx="2239224" cy="209724"/>
+          </a:xfrm>
+          <a:prstGeom prst="notchedRightArrow">
+            <a:avLst>
+              <a:gd name="adj1" fmla="val 25095"/>
+              <a:gd name="adj2" fmla="val 50000"/>
+            </a:avLst>
+          </a:prstGeom>
+          <a:solidFill>
+            <a:schemeClr val="accent1">
+              <a:lumMod val="20000"/>
+              <a:lumOff val="80000"/>
+            </a:schemeClr>
+          </a:solidFill>
+        </p:spPr>
+        <p:style>
+          <a:lnRef idx="2">
+            <a:schemeClr val="accent1">
+              <a:shade val="50000"/>
+            </a:schemeClr>
+          </a:lnRef>
+          <a:fillRef idx="1">
+            <a:schemeClr val="accent1"/>
+          </a:fillRef>
+          <a:effectRef idx="0">
+            <a:schemeClr val="accent1"/>
+          </a:effectRef>
+          <a:fontRef idx="minor">
+            <a:schemeClr val="lt1"/>
+          </a:fontRef>
+        </p:style>
+        <p:txBody>
+          <a:bodyPr rtlCol="0" anchor="ctr"/>
+          <a:lstStyle/>
+          <a:p>
+            <a:pPr algn="ctr"/>
+            <a:endParaRPr lang="it-IT"/>
+          </a:p>
+        </p:txBody>
+      </p:sp>
+      <p:sp>
+        <p:nvSpPr>
+          <p:cNvPr id="31" name="Freccia bidirezionale orizzontale 30"/>
+          <p:cNvSpPr/>
+          <p:nvPr/>
+        </p:nvSpPr>
+        <p:spPr>
+          <a:xfrm>
+            <a:off x="6694416" y="5591319"/>
+            <a:ext cx="2583288" cy="222252"/>
+          </a:xfrm>
+          <a:prstGeom prst="leftRightArrow">
+            <a:avLst>
+              <a:gd name="adj1" fmla="val 27353"/>
+              <a:gd name="adj2" fmla="val 50000"/>
+            </a:avLst>
+          </a:prstGeom>
+          <a:solidFill>
+            <a:schemeClr val="accent1">
+              <a:lumMod val="20000"/>
+              <a:lumOff val="80000"/>
+            </a:schemeClr>
+          </a:solidFill>
+        </p:spPr>
+        <p:style>
+          <a:lnRef idx="2">
+            <a:schemeClr val="accent1">
+              <a:shade val="50000"/>
+            </a:schemeClr>
+          </a:lnRef>
+          <a:fillRef idx="1">
+            <a:schemeClr val="accent1"/>
+          </a:fillRef>
+          <a:effectRef idx="0">
+            <a:schemeClr val="accent1"/>
+          </a:effectRef>
+          <a:fontRef idx="minor">
+            <a:schemeClr val="lt1"/>
+          </a:fontRef>
+        </p:style>
+        <p:txBody>
+          <a:bodyPr rtlCol="0" anchor="ctr"/>
+          <a:lstStyle/>
+          <a:p>
+            <a:pPr algn="ctr"/>
+            <a:endParaRPr lang="it-IT"/>
+          </a:p>
+        </p:txBody>
+      </p:sp>
+      <p:sp>
+        <p:nvSpPr>
+          <p:cNvPr id="32" name="Rettangolo 31"/>
+          <p:cNvSpPr/>
+          <p:nvPr/>
+        </p:nvSpPr>
+        <p:spPr>
+          <a:xfrm>
+            <a:off x="5992824" y="2152482"/>
+            <a:ext cx="3636696" cy="2589452"/>
+          </a:xfrm>
+          <a:prstGeom prst="rect">
+            <a:avLst/>
+          </a:prstGeom>
+          <a:solidFill>
+            <a:schemeClr val="bg1"/>
+          </a:solidFill>
+        </p:spPr>
+        <p:style>
+          <a:lnRef idx="2">
+            <a:schemeClr val="accent1">
+              <a:shade val="50000"/>
+            </a:schemeClr>
+          </a:lnRef>
+          <a:fillRef idx="1">
+            <a:schemeClr val="accent1"/>
+          </a:fillRef>
+          <a:effectRef idx="0">
+            <a:schemeClr val="accent1"/>
+          </a:effectRef>
+          <a:fontRef idx="minor">
+            <a:schemeClr val="lt1"/>
+          </a:fontRef>
+        </p:style>
+        <p:txBody>
+          <a:bodyPr rtlCol="0" anchor="ctr"/>
+          <a:lstStyle/>
+          <a:p>
+            <a:pPr algn="ctr"/>
+            <a:endParaRPr lang="it-IT"/>
+          </a:p>
+        </p:txBody>
+      </p:sp>
+      <p:sp>
+        <p:nvSpPr>
+          <p:cNvPr id="33" name="Rettangolo 32"/>
+          <p:cNvSpPr/>
+          <p:nvPr/>
+        </p:nvSpPr>
+        <p:spPr>
+          <a:xfrm>
+            <a:off x="6433166" y="2605635"/>
+            <a:ext cx="882031" cy="1383738"/>
+          </a:xfrm>
+          <a:prstGeom prst="rect">
+            <a:avLst/>
+          </a:prstGeom>
+        </p:spPr>
+        <p:style>
+          <a:lnRef idx="2">
+            <a:schemeClr val="accent1">
+              <a:shade val="50000"/>
+            </a:schemeClr>
+          </a:lnRef>
+          <a:fillRef idx="1">
+            <a:schemeClr val="accent1"/>
+          </a:fillRef>
+          <a:effectRef idx="0">
+            <a:schemeClr val="accent1"/>
+          </a:effectRef>
+          <a:fontRef idx="minor">
+            <a:schemeClr val="lt1"/>
+          </a:fontRef>
+        </p:style>
+        <p:txBody>
+          <a:bodyPr rtlCol="0" anchor="ctr"/>
+          <a:lstStyle/>
+          <a:p>
+            <a:pPr algn="ctr"/>
+            <a:endParaRPr lang="it-IT"/>
+          </a:p>
+        </p:txBody>
+      </p:sp>
+      <p:sp>
+        <p:nvSpPr>
+          <p:cNvPr id="34" name="Ovale 33"/>
+          <p:cNvSpPr/>
+          <p:nvPr/>
+        </p:nvSpPr>
+        <p:spPr>
+          <a:xfrm>
+            <a:off x="6530270" y="2840305"/>
+            <a:ext cx="89012" cy="89012"/>
+          </a:xfrm>
+          <a:prstGeom prst="ellipse">
+            <a:avLst/>
+          </a:prstGeom>
+          <a:solidFill>
+            <a:srgbClr val="FF0000"/>
+          </a:solidFill>
+        </p:spPr>
+        <p:style>
+          <a:lnRef idx="2">
+            <a:schemeClr val="accent1">
+              <a:shade val="50000"/>
+            </a:schemeClr>
+          </a:lnRef>
+          <a:fillRef idx="1">
+            <a:schemeClr val="accent1"/>
+          </a:fillRef>
+          <a:effectRef idx="0">
+            <a:schemeClr val="accent1"/>
+          </a:effectRef>
+          <a:fontRef idx="minor">
+            <a:schemeClr val="lt1"/>
+          </a:fontRef>
+        </p:style>
+        <p:txBody>
+          <a:bodyPr rtlCol="0" anchor="ctr"/>
+          <a:lstStyle/>
+          <a:p>
+            <a:pPr algn="ctr"/>
+            <a:endParaRPr lang="it-IT"/>
+          </a:p>
+        </p:txBody>
+      </p:sp>
+      <p:sp>
+        <p:nvSpPr>
+          <p:cNvPr id="35" name="Ovale 34"/>
+          <p:cNvSpPr/>
+          <p:nvPr/>
+        </p:nvSpPr>
+        <p:spPr>
+          <a:xfrm>
+            <a:off x="7104807" y="2840305"/>
+            <a:ext cx="89012" cy="89012"/>
+          </a:xfrm>
+          <a:prstGeom prst="ellipse">
+            <a:avLst/>
+          </a:prstGeom>
+          <a:solidFill>
+            <a:srgbClr val="FF0000"/>
+          </a:solidFill>
+        </p:spPr>
+        <p:style>
+          <a:lnRef idx="2">
+            <a:schemeClr val="accent1">
+              <a:shade val="50000"/>
+            </a:schemeClr>
+          </a:lnRef>
+          <a:fillRef idx="1">
+            <a:schemeClr val="accent1"/>
+          </a:fillRef>
+          <a:effectRef idx="0">
+            <a:schemeClr val="accent1"/>
+          </a:effectRef>
+          <a:fontRef idx="minor">
+            <a:schemeClr val="lt1"/>
+          </a:fontRef>
+        </p:style>
+        <p:txBody>
+          <a:bodyPr rtlCol="0" anchor="ctr"/>
+          <a:lstStyle/>
+          <a:p>
+            <a:pPr algn="ctr"/>
+            <a:endParaRPr lang="it-IT"/>
+          </a:p>
+        </p:txBody>
+      </p:sp>
+      <p:sp>
+        <p:nvSpPr>
+          <p:cNvPr id="36" name="Ovale 35"/>
+          <p:cNvSpPr/>
+          <p:nvPr/>
+        </p:nvSpPr>
+        <p:spPr>
+          <a:xfrm>
+            <a:off x="6530270" y="3706152"/>
+            <a:ext cx="89012" cy="89012"/>
+          </a:xfrm>
+          <a:prstGeom prst="ellipse">
+            <a:avLst/>
+          </a:prstGeom>
+          <a:solidFill>
+            <a:srgbClr val="FF0000"/>
+          </a:solidFill>
+        </p:spPr>
+        <p:style>
+          <a:lnRef idx="2">
+            <a:schemeClr val="accent1">
+              <a:shade val="50000"/>
+            </a:schemeClr>
+          </a:lnRef>
+          <a:fillRef idx="1">
+            <a:schemeClr val="accent1"/>
+          </a:fillRef>
+          <a:effectRef idx="0">
+            <a:schemeClr val="accent1"/>
+          </a:effectRef>
+          <a:fontRef idx="minor">
+            <a:schemeClr val="lt1"/>
+          </a:fontRef>
+        </p:style>
+        <p:txBody>
+          <a:bodyPr rtlCol="0" anchor="ctr"/>
+          <a:lstStyle/>
+          <a:p>
+            <a:pPr algn="ctr"/>
+            <a:endParaRPr lang="it-IT"/>
+          </a:p>
+        </p:txBody>
+      </p:sp>
+      <p:sp>
+        <p:nvSpPr>
+          <p:cNvPr id="37" name="Ovale 36"/>
+          <p:cNvSpPr/>
+          <p:nvPr/>
+        </p:nvSpPr>
+        <p:spPr>
+          <a:xfrm>
+            <a:off x="7104807" y="3706152"/>
+            <a:ext cx="89012" cy="89012"/>
+          </a:xfrm>
+          <a:prstGeom prst="ellipse">
+            <a:avLst/>
+          </a:prstGeom>
+          <a:solidFill>
+            <a:srgbClr val="FF0000"/>
+          </a:solidFill>
+        </p:spPr>
+        <p:style>
+          <a:lnRef idx="2">
+            <a:schemeClr val="accent1">
+              <a:shade val="50000"/>
+            </a:schemeClr>
+          </a:lnRef>
+          <a:fillRef idx="1">
+            <a:schemeClr val="accent1"/>
+          </a:fillRef>
+          <a:effectRef idx="0">
+            <a:schemeClr val="accent1"/>
+          </a:effectRef>
+          <a:fontRef idx="minor">
+            <a:schemeClr val="lt1"/>
+          </a:fontRef>
+        </p:style>
+        <p:txBody>
+          <a:bodyPr rtlCol="0" anchor="ctr"/>
+          <a:lstStyle/>
+          <a:p>
+            <a:pPr algn="ctr"/>
+            <a:endParaRPr lang="it-IT"/>
+          </a:p>
+        </p:txBody>
+      </p:sp>
+      <p:sp>
+        <p:nvSpPr>
+          <p:cNvPr id="38" name="Ovale 37"/>
+          <p:cNvSpPr/>
+          <p:nvPr/>
+        </p:nvSpPr>
+        <p:spPr>
+          <a:xfrm>
+            <a:off x="6251096" y="2840305"/>
+            <a:ext cx="89012" cy="89012"/>
+          </a:xfrm>
+          <a:prstGeom prst="ellipse">
+            <a:avLst/>
+          </a:prstGeom>
+          <a:solidFill>
+            <a:schemeClr val="accent6"/>
+          </a:solidFill>
+        </p:spPr>
+        <p:style>
+          <a:lnRef idx="2">
+            <a:schemeClr val="accent1">
+              <a:shade val="50000"/>
+            </a:schemeClr>
+          </a:lnRef>
+          <a:fillRef idx="1">
+            <a:schemeClr val="accent1"/>
+          </a:fillRef>
+          <a:effectRef idx="0">
+            <a:schemeClr val="accent1"/>
+          </a:effectRef>
+          <a:fontRef idx="minor">
+            <a:schemeClr val="lt1"/>
+          </a:fontRef>
+        </p:style>
+        <p:txBody>
+          <a:bodyPr rtlCol="0" anchor="ctr"/>
+          <a:lstStyle/>
+          <a:p>
+            <a:pPr algn="ctr"/>
+            <a:endParaRPr lang="it-IT"/>
+          </a:p>
+        </p:txBody>
+      </p:sp>
+      <p:sp>
+        <p:nvSpPr>
+          <p:cNvPr id="39" name="Ovale 38"/>
+          <p:cNvSpPr/>
+          <p:nvPr/>
+        </p:nvSpPr>
+        <p:spPr>
+          <a:xfrm>
+            <a:off x="6251096" y="3706152"/>
+            <a:ext cx="89012" cy="89012"/>
+          </a:xfrm>
+          <a:prstGeom prst="ellipse">
+            <a:avLst/>
+          </a:prstGeom>
+          <a:solidFill>
+            <a:schemeClr val="accent6"/>
+          </a:solidFill>
+        </p:spPr>
+        <p:style>
+          <a:lnRef idx="2">
+            <a:schemeClr val="accent1">
+              <a:shade val="50000"/>
+            </a:schemeClr>
+          </a:lnRef>
+          <a:fillRef idx="1">
+            <a:schemeClr val="accent1"/>
+          </a:fillRef>
+          <a:effectRef idx="0">
+            <a:schemeClr val="accent1"/>
+          </a:effectRef>
+          <a:fontRef idx="minor">
+            <a:schemeClr val="lt1"/>
+          </a:fontRef>
+        </p:style>
+        <p:txBody>
+          <a:bodyPr rtlCol="0" anchor="ctr"/>
+          <a:lstStyle/>
+          <a:p>
+            <a:pPr algn="ctr"/>
+            <a:endParaRPr lang="it-IT"/>
+          </a:p>
+        </p:txBody>
+      </p:sp>
+      <p:sp>
+        <p:nvSpPr>
+          <p:cNvPr id="40" name="Ovale 39"/>
+          <p:cNvSpPr/>
+          <p:nvPr/>
+        </p:nvSpPr>
+        <p:spPr>
+          <a:xfrm>
+            <a:off x="7408255" y="2840305"/>
+            <a:ext cx="89012" cy="89012"/>
+          </a:xfrm>
+          <a:prstGeom prst="ellipse">
+            <a:avLst/>
+          </a:prstGeom>
+          <a:solidFill>
+            <a:schemeClr val="accent6"/>
+          </a:solidFill>
+        </p:spPr>
+        <p:style>
+          <a:lnRef idx="2">
+            <a:schemeClr val="accent1">
+              <a:shade val="50000"/>
+            </a:schemeClr>
+          </a:lnRef>
+          <a:fillRef idx="1">
+            <a:schemeClr val="accent1"/>
+          </a:fillRef>
+          <a:effectRef idx="0">
+            <a:schemeClr val="accent1"/>
+          </a:effectRef>
+          <a:fontRef idx="minor">
+            <a:schemeClr val="lt1"/>
+          </a:fontRef>
+        </p:style>
+        <p:txBody>
+          <a:bodyPr rtlCol="0" anchor="ctr"/>
+          <a:lstStyle/>
+          <a:p>
+            <a:pPr algn="ctr"/>
+            <a:endParaRPr lang="it-IT"/>
+          </a:p>
+        </p:txBody>
+      </p:sp>
+      <p:sp>
+        <p:nvSpPr>
+          <p:cNvPr id="41" name="Ovale 40"/>
+          <p:cNvSpPr/>
+          <p:nvPr/>
+        </p:nvSpPr>
+        <p:spPr>
+          <a:xfrm>
+            <a:off x="7408255" y="3706152"/>
+            <a:ext cx="89012" cy="89012"/>
+          </a:xfrm>
+          <a:prstGeom prst="ellipse">
+            <a:avLst/>
+          </a:prstGeom>
+          <a:solidFill>
+            <a:schemeClr val="accent6"/>
+          </a:solidFill>
+        </p:spPr>
+        <p:style>
+          <a:lnRef idx="2">
+            <a:schemeClr val="accent1">
+              <a:shade val="50000"/>
+            </a:schemeClr>
+          </a:lnRef>
+          <a:fillRef idx="1">
+            <a:schemeClr val="accent1"/>
+          </a:fillRef>
+          <a:effectRef idx="0">
+            <a:schemeClr val="accent1"/>
+          </a:effectRef>
+          <a:fontRef idx="minor">
+            <a:schemeClr val="lt1"/>
+          </a:fontRef>
+        </p:style>
+        <p:txBody>
+          <a:bodyPr rtlCol="0" anchor="ctr"/>
+          <a:lstStyle/>
+          <a:p>
+            <a:pPr algn="ctr"/>
+            <a:endParaRPr lang="it-IT"/>
+          </a:p>
+        </p:txBody>
+      </p:sp>
+      <p:sp>
+        <p:nvSpPr>
+          <p:cNvPr id="42" name="Rettangolo 41"/>
+          <p:cNvSpPr/>
+          <p:nvPr/>
+        </p:nvSpPr>
+        <p:spPr>
+          <a:xfrm>
+            <a:off x="8122378" y="2605635"/>
+            <a:ext cx="882031" cy="1383738"/>
+          </a:xfrm>
+          <a:prstGeom prst="rect">
+            <a:avLst/>
+          </a:prstGeom>
+        </p:spPr>
+        <p:style>
+          <a:lnRef idx="2">
+            <a:schemeClr val="accent1">
+              <a:shade val="50000"/>
+            </a:schemeClr>
+          </a:lnRef>
+          <a:fillRef idx="1">
+            <a:schemeClr val="accent1"/>
+          </a:fillRef>
+          <a:effectRef idx="0">
+            <a:schemeClr val="accent1"/>
+          </a:effectRef>
+          <a:fontRef idx="minor">
+            <a:schemeClr val="lt1"/>
+          </a:fontRef>
+        </p:style>
+        <p:txBody>
+          <a:bodyPr rtlCol="0" anchor="ctr"/>
+          <a:lstStyle/>
+          <a:p>
+            <a:pPr algn="ctr"/>
+            <a:endParaRPr lang="it-IT"/>
+          </a:p>
+        </p:txBody>
+      </p:sp>
+      <p:sp>
+        <p:nvSpPr>
+          <p:cNvPr id="43" name="Ovale 42"/>
+          <p:cNvSpPr/>
+          <p:nvPr/>
+        </p:nvSpPr>
+        <p:spPr>
+          <a:xfrm>
+            <a:off x="8219482" y="2840305"/>
+            <a:ext cx="89012" cy="89012"/>
+          </a:xfrm>
+          <a:prstGeom prst="ellipse">
+            <a:avLst/>
+          </a:prstGeom>
+          <a:solidFill>
+            <a:srgbClr val="FF0000"/>
+          </a:solidFill>
+        </p:spPr>
+        <p:style>
+          <a:lnRef idx="2">
+            <a:schemeClr val="accent1">
+              <a:shade val="50000"/>
+            </a:schemeClr>
+          </a:lnRef>
+          <a:fillRef idx="1">
+            <a:schemeClr val="accent1"/>
+          </a:fillRef>
+          <a:effectRef idx="0">
+            <a:schemeClr val="accent1"/>
+          </a:effectRef>
+          <a:fontRef idx="minor">
+            <a:schemeClr val="lt1"/>
+          </a:fontRef>
+        </p:style>
+        <p:txBody>
+          <a:bodyPr rtlCol="0" anchor="ctr"/>
+          <a:lstStyle/>
+          <a:p>
+            <a:pPr algn="ctr"/>
+            <a:endParaRPr lang="it-IT"/>
+          </a:p>
+        </p:txBody>
+      </p:sp>
+      <p:sp>
+        <p:nvSpPr>
+          <p:cNvPr id="44" name="Ovale 43"/>
+          <p:cNvSpPr/>
+          <p:nvPr/>
+        </p:nvSpPr>
+        <p:spPr>
+          <a:xfrm>
+            <a:off x="8794019" y="2840305"/>
+            <a:ext cx="89012" cy="89012"/>
+          </a:xfrm>
+          <a:prstGeom prst="ellipse">
+            <a:avLst/>
+          </a:prstGeom>
+          <a:solidFill>
+            <a:srgbClr val="FF0000"/>
+          </a:solidFill>
+        </p:spPr>
+        <p:style>
+          <a:lnRef idx="2">
+            <a:schemeClr val="accent1">
+              <a:shade val="50000"/>
+            </a:schemeClr>
+          </a:lnRef>
+          <a:fillRef idx="1">
+            <a:schemeClr val="accent1"/>
+          </a:fillRef>
+          <a:effectRef idx="0">
+            <a:schemeClr val="accent1"/>
+          </a:effectRef>
+          <a:fontRef idx="minor">
+            <a:schemeClr val="lt1"/>
+          </a:fontRef>
+        </p:style>
+        <p:txBody>
+          <a:bodyPr rtlCol="0" anchor="ctr"/>
+          <a:lstStyle/>
+          <a:p>
+            <a:pPr algn="ctr"/>
+            <a:endParaRPr lang="it-IT"/>
+          </a:p>
+        </p:txBody>
+      </p:sp>
+      <p:sp>
+        <p:nvSpPr>
+          <p:cNvPr id="45" name="Ovale 44"/>
+          <p:cNvSpPr/>
+          <p:nvPr/>
+        </p:nvSpPr>
+        <p:spPr>
+          <a:xfrm>
+            <a:off x="8219482" y="3706152"/>
+            <a:ext cx="89012" cy="89012"/>
+          </a:xfrm>
+          <a:prstGeom prst="ellipse">
+            <a:avLst/>
+          </a:prstGeom>
+          <a:solidFill>
+            <a:srgbClr val="FF0000"/>
+          </a:solidFill>
+        </p:spPr>
+        <p:style>
+          <a:lnRef idx="2">
+            <a:schemeClr val="accent1">
+              <a:shade val="50000"/>
+            </a:schemeClr>
+          </a:lnRef>
+          <a:fillRef idx="1">
+            <a:schemeClr val="accent1"/>
+          </a:fillRef>
+          <a:effectRef idx="0">
+            <a:schemeClr val="accent1"/>
+          </a:effectRef>
+          <a:fontRef idx="minor">
+            <a:schemeClr val="lt1"/>
+          </a:fontRef>
+        </p:style>
+        <p:txBody>
+          <a:bodyPr rtlCol="0" anchor="ctr"/>
+          <a:lstStyle/>
+          <a:p>
+            <a:pPr algn="ctr"/>
+            <a:endParaRPr lang="it-IT"/>
+          </a:p>
+        </p:txBody>
+      </p:sp>
+      <p:sp>
+        <p:nvSpPr>
+          <p:cNvPr id="46" name="Ovale 45"/>
+          <p:cNvSpPr/>
+          <p:nvPr/>
+        </p:nvSpPr>
+        <p:spPr>
+          <a:xfrm>
+            <a:off x="8794019" y="3706152"/>
+            <a:ext cx="89012" cy="89012"/>
+          </a:xfrm>
+          <a:prstGeom prst="ellipse">
+            <a:avLst/>
+          </a:prstGeom>
+          <a:solidFill>
+            <a:srgbClr val="FF0000"/>
+          </a:solidFill>
+        </p:spPr>
+        <p:style>
+          <a:lnRef idx="2">
+            <a:schemeClr val="accent1">
+              <a:shade val="50000"/>
+            </a:schemeClr>
+          </a:lnRef>
+          <a:fillRef idx="1">
+            <a:schemeClr val="accent1"/>
+          </a:fillRef>
+          <a:effectRef idx="0">
+            <a:schemeClr val="accent1"/>
+          </a:effectRef>
+          <a:fontRef idx="minor">
+            <a:schemeClr val="lt1"/>
+          </a:fontRef>
+        </p:style>
+        <p:txBody>
+          <a:bodyPr rtlCol="0" anchor="ctr"/>
+          <a:lstStyle/>
+          <a:p>
+            <a:pPr algn="ctr"/>
+            <a:endParaRPr lang="it-IT"/>
+          </a:p>
+        </p:txBody>
+      </p:sp>
+      <p:sp>
+        <p:nvSpPr>
+          <p:cNvPr id="47" name="Ovale 46"/>
+          <p:cNvSpPr/>
+          <p:nvPr/>
+        </p:nvSpPr>
+        <p:spPr>
+          <a:xfrm>
+            <a:off x="7940308" y="2840305"/>
+            <a:ext cx="89012" cy="89012"/>
+          </a:xfrm>
+          <a:prstGeom prst="ellipse">
+            <a:avLst/>
+          </a:prstGeom>
+          <a:solidFill>
+            <a:schemeClr val="accent6"/>
+          </a:solidFill>
+        </p:spPr>
+        <p:style>
+          <a:lnRef idx="2">
+            <a:schemeClr val="accent1">
+              <a:shade val="50000"/>
+            </a:schemeClr>
+          </a:lnRef>
+          <a:fillRef idx="1">
+            <a:schemeClr val="accent1"/>
+          </a:fillRef>
+          <a:effectRef idx="0">
+            <a:schemeClr val="accent1"/>
+          </a:effectRef>
+          <a:fontRef idx="minor">
+            <a:schemeClr val="lt1"/>
+          </a:fontRef>
+        </p:style>
+        <p:txBody>
+          <a:bodyPr rtlCol="0" anchor="ctr"/>
+          <a:lstStyle/>
+          <a:p>
+            <a:pPr algn="ctr"/>
+            <a:endParaRPr lang="it-IT"/>
+          </a:p>
+        </p:txBody>
+      </p:sp>
+      <p:sp>
+        <p:nvSpPr>
+          <p:cNvPr id="48" name="Ovale 47"/>
+          <p:cNvSpPr/>
+          <p:nvPr/>
+        </p:nvSpPr>
+        <p:spPr>
+          <a:xfrm>
+            <a:off x="7940308" y="3706152"/>
+            <a:ext cx="89012" cy="89012"/>
+          </a:xfrm>
+          <a:prstGeom prst="ellipse">
+            <a:avLst/>
+          </a:prstGeom>
+          <a:solidFill>
+            <a:schemeClr val="accent6"/>
+          </a:solidFill>
+        </p:spPr>
+        <p:style>
+          <a:lnRef idx="2">
+            <a:schemeClr val="accent1">
+              <a:shade val="50000"/>
+            </a:schemeClr>
+          </a:lnRef>
+          <a:fillRef idx="1">
+            <a:schemeClr val="accent1"/>
+          </a:fillRef>
+          <a:effectRef idx="0">
+            <a:schemeClr val="accent1"/>
+          </a:effectRef>
+          <a:fontRef idx="minor">
+            <a:schemeClr val="lt1"/>
+          </a:fontRef>
+        </p:style>
+        <p:txBody>
+          <a:bodyPr rtlCol="0" anchor="ctr"/>
+          <a:lstStyle/>
+          <a:p>
+            <a:pPr algn="ctr"/>
+            <a:endParaRPr lang="it-IT"/>
+          </a:p>
+        </p:txBody>
+      </p:sp>
+      <p:sp>
+        <p:nvSpPr>
+          <p:cNvPr id="49" name="Ovale 48"/>
+          <p:cNvSpPr/>
+          <p:nvPr/>
+        </p:nvSpPr>
+        <p:spPr>
+          <a:xfrm>
+            <a:off x="9097467" y="2840305"/>
+            <a:ext cx="89012" cy="89012"/>
+          </a:xfrm>
+          <a:prstGeom prst="ellipse">
+            <a:avLst/>
+          </a:prstGeom>
+          <a:solidFill>
+            <a:schemeClr val="accent6"/>
+          </a:solidFill>
+        </p:spPr>
+        <p:style>
+          <a:lnRef idx="2">
+            <a:schemeClr val="accent1">
+              <a:shade val="50000"/>
+            </a:schemeClr>
+          </a:lnRef>
+          <a:fillRef idx="1">
+            <a:schemeClr val="accent1"/>
+          </a:fillRef>
+          <a:effectRef idx="0">
+            <a:schemeClr val="accent1"/>
+          </a:effectRef>
+          <a:fontRef idx="minor">
+            <a:schemeClr val="lt1"/>
+          </a:fontRef>
+        </p:style>
+        <p:txBody>
+          <a:bodyPr rtlCol="0" anchor="ctr"/>
+          <a:lstStyle/>
+          <a:p>
+            <a:pPr algn="ctr"/>
+            <a:endParaRPr lang="it-IT"/>
+          </a:p>
+        </p:txBody>
+      </p:sp>
+      <p:sp>
+        <p:nvSpPr>
+          <p:cNvPr id="50" name="Ovale 49"/>
+          <p:cNvSpPr/>
+          <p:nvPr/>
+        </p:nvSpPr>
+        <p:spPr>
+          <a:xfrm>
+            <a:off x="9097467" y="3706152"/>
+            <a:ext cx="89012" cy="89012"/>
+          </a:xfrm>
+          <a:prstGeom prst="ellipse">
+            <a:avLst/>
+          </a:prstGeom>
+          <a:solidFill>
+            <a:schemeClr val="accent6"/>
+          </a:solidFill>
+        </p:spPr>
+        <p:style>
+          <a:lnRef idx="2">
+            <a:schemeClr val="accent1">
+              <a:shade val="50000"/>
+            </a:schemeClr>
+          </a:lnRef>
+          <a:fillRef idx="1">
+            <a:schemeClr val="accent1"/>
+          </a:fillRef>
+          <a:effectRef idx="0">
+            <a:schemeClr val="accent1"/>
+          </a:effectRef>
+          <a:fontRef idx="minor">
+            <a:schemeClr val="lt1"/>
+          </a:fontRef>
+        </p:style>
+        <p:txBody>
+          <a:bodyPr rtlCol="0" anchor="ctr"/>
+          <a:lstStyle/>
+          <a:p>
+            <a:pPr algn="ctr"/>
+            <a:endParaRPr lang="it-IT"/>
+          </a:p>
+        </p:txBody>
+      </p:sp>
+      <p:sp>
+        <p:nvSpPr>
+          <p:cNvPr id="51" name="Freccia a destra rientrata 50"/>
+          <p:cNvSpPr/>
+          <p:nvPr/>
+        </p:nvSpPr>
+        <p:spPr>
+          <a:xfrm rot="17046395" flipH="1">
+            <a:off x="4995508" y="3918788"/>
+            <a:ext cx="2161241" cy="209724"/>
+          </a:xfrm>
+          <a:prstGeom prst="notchedRightArrow">
+            <a:avLst>
+              <a:gd name="adj1" fmla="val 25095"/>
+              <a:gd name="adj2" fmla="val 50000"/>
+            </a:avLst>
+          </a:prstGeom>
+          <a:solidFill>
+            <a:schemeClr val="accent1">
+              <a:lumMod val="20000"/>
+              <a:lumOff val="80000"/>
+            </a:schemeClr>
+          </a:solidFill>
+        </p:spPr>
+        <p:style>
+          <a:lnRef idx="2">
+            <a:schemeClr val="accent1">
+              <a:shade val="50000"/>
+            </a:schemeClr>
+          </a:lnRef>
+          <a:fillRef idx="1">
+            <a:schemeClr val="accent1"/>
+          </a:fillRef>
+          <a:effectRef idx="0">
+            <a:schemeClr val="accent1"/>
+          </a:effectRef>
+          <a:fontRef idx="minor">
+            <a:schemeClr val="lt1"/>
+          </a:fontRef>
+        </p:style>
+        <p:txBody>
+          <a:bodyPr rtlCol="0" anchor="ctr"/>
+          <a:lstStyle/>
+          <a:p>
+            <a:pPr algn="ctr"/>
+            <a:endParaRPr lang="it-IT"/>
+          </a:p>
+        </p:txBody>
+      </p:sp>
+    </p:spTree>
+    <p:extLst>
+      <p:ext uri="{BB962C8B-B14F-4D97-AF65-F5344CB8AC3E}">
+        <p14:creationId xmlns:p14="http://schemas.microsoft.com/office/powerpoint/2010/main" val="1374969981"/>
+      </p:ext>
+    </p:extLst>
+  </p:cSld>
+  <p:clrMapOvr>
+    <a:masterClrMapping/>
+  </p:clrMapOvr>
+</p:sld>
+</file>
+
+<file path=ppt/slides/slide2.xml><?xml version="1.0" encoding="utf-8"?>
+<p:sld xmlns:a="http://schemas.openxmlformats.org/drawingml/2006/main" xmlns:r="http://schemas.openxmlformats.org/officeDocument/2006/relationships" xmlns:p="http://schemas.openxmlformats.org/presentationml/2006/main">
+  <p:cSld>
+    <p:spTree>
+      <p:nvGrpSpPr>
+        <p:cNvPr id="1" name=""/>
+        <p:cNvGrpSpPr/>
+        <p:nvPr/>
+      </p:nvGrpSpPr>
+      <p:grpSpPr>
+        <a:xfrm>
+          <a:off x="0" y="0"/>
+          <a:ext cx="0" cy="0"/>
+          <a:chOff x="0" y="0"/>
+          <a:chExt cx="0" cy="0"/>
+        </a:xfrm>
+      </p:grpSpPr>
+      <p:sp>
+        <p:nvSpPr>
           <p:cNvPr id="6" name="Rectangle: Rounded Corners 5"/>
           <p:cNvSpPr/>
           <p:nvPr/>
@@ -3719,6 +5715,1360 @@
     <p:extLst>
       <p:ext uri="{BB962C8B-B14F-4D97-AF65-F5344CB8AC3E}">
         <p14:creationId xmlns:p14="http://schemas.microsoft.com/office/powerpoint/2010/main" val="2544109714"/>
+      </p:ext>
+    </p:extLst>
+  </p:cSld>
+  <p:clrMapOvr>
+    <a:masterClrMapping/>
+  </p:clrMapOvr>
+</p:sld>
+</file>
+
+<file path=ppt/slides/slide3.xml><?xml version="1.0" encoding="utf-8"?>
+<p:sld xmlns:a="http://schemas.openxmlformats.org/drawingml/2006/main" xmlns:r="http://schemas.openxmlformats.org/officeDocument/2006/relationships" xmlns:p="http://schemas.openxmlformats.org/presentationml/2006/main">
+  <p:cSld>
+    <p:spTree>
+      <p:nvGrpSpPr>
+        <p:cNvPr id="1" name=""/>
+        <p:cNvGrpSpPr/>
+        <p:nvPr/>
+      </p:nvGrpSpPr>
+      <p:grpSpPr>
+        <a:xfrm>
+          <a:off x="0" y="0"/>
+          <a:ext cx="0" cy="0"/>
+          <a:chOff x="0" y="0"/>
+          <a:chExt cx="0" cy="0"/>
+        </a:xfrm>
+      </p:grpSpPr>
+      <p:sp>
+        <p:nvSpPr>
+          <p:cNvPr id="2" name="Titolo 1"/>
+          <p:cNvSpPr>
+            <a:spLocks noGrp="1"/>
+          </p:cNvSpPr>
+          <p:nvPr>
+            <p:ph type="title"/>
+          </p:nvPr>
+        </p:nvSpPr>
+        <p:spPr/>
+        <p:txBody>
+          <a:bodyPr/>
+          <a:lstStyle/>
+          <a:p>
+            <a:endParaRPr lang="it-IT"/>
+          </a:p>
+        </p:txBody>
+      </p:sp>
+      <p:grpSp>
+        <p:nvGrpSpPr>
+          <p:cNvPr id="4" name="Group 80"/>
+          <p:cNvGrpSpPr>
+            <a:grpSpLocks/>
+          </p:cNvGrpSpPr>
+          <p:nvPr/>
+        </p:nvGrpSpPr>
+        <p:grpSpPr bwMode="auto">
+          <a:xfrm>
+            <a:off x="75421" y="4700336"/>
+            <a:ext cx="1871662" cy="2089150"/>
+            <a:chOff x="113" y="2704"/>
+            <a:chExt cx="1179" cy="1316"/>
+          </a:xfrm>
+        </p:grpSpPr>
+        <p:sp>
+          <p:nvSpPr>
+            <p:cNvPr id="5" name="Rectangle 1663"/>
+            <p:cNvSpPr>
+              <a:spLocks noChangeArrowheads="1"/>
+            </p:cNvSpPr>
+            <p:nvPr/>
+          </p:nvSpPr>
+          <p:spPr bwMode="auto">
+            <a:xfrm>
+              <a:off x="113" y="2704"/>
+              <a:ext cx="1179" cy="1316"/>
+            </a:xfrm>
+            <a:prstGeom prst="rect">
+              <a:avLst/>
+            </a:prstGeom>
+            <a:noFill/>
+            <a:ln w="25400">
+              <a:solidFill>
+                <a:srgbClr val="000000"/>
+              </a:solidFill>
+              <a:miter lim="800000"/>
+              <a:headEnd/>
+              <a:tailEnd/>
+            </a:ln>
+          </p:spPr>
+          <p:txBody>
+            <a:bodyPr wrap="none" anchor="ctr"/>
+            <a:lstStyle>
+              <a:defPPr>
+                <a:defRPr lang="it-IT"/>
+              </a:defPPr>
+              <a:lvl1pPr algn="l" rtl="0" fontAlgn="base">
+                <a:spcBef>
+                  <a:spcPct val="0"/>
+                </a:spcBef>
+                <a:spcAft>
+                  <a:spcPct val="0"/>
+                </a:spcAft>
+                <a:defRPr u="sng" kern="1200">
+                  <a:solidFill>
+                    <a:schemeClr val="tx1"/>
+                  </a:solidFill>
+                  <a:latin typeface="Arial" panose="020B0604020202020204" pitchFamily="34" charset="0"/>
+                  <a:ea typeface="+mn-ea"/>
+                  <a:cs typeface="+mn-cs"/>
+                </a:defRPr>
+              </a:lvl1pPr>
+              <a:lvl2pPr marL="457200" algn="l" rtl="0" fontAlgn="base">
+                <a:spcBef>
+                  <a:spcPct val="0"/>
+                </a:spcBef>
+                <a:spcAft>
+                  <a:spcPct val="0"/>
+                </a:spcAft>
+                <a:defRPr u="sng" kern="1200">
+                  <a:solidFill>
+                    <a:schemeClr val="tx1"/>
+                  </a:solidFill>
+                  <a:latin typeface="Arial" panose="020B0604020202020204" pitchFamily="34" charset="0"/>
+                  <a:ea typeface="+mn-ea"/>
+                  <a:cs typeface="+mn-cs"/>
+                </a:defRPr>
+              </a:lvl2pPr>
+              <a:lvl3pPr marL="914400" algn="l" rtl="0" fontAlgn="base">
+                <a:spcBef>
+                  <a:spcPct val="0"/>
+                </a:spcBef>
+                <a:spcAft>
+                  <a:spcPct val="0"/>
+                </a:spcAft>
+                <a:defRPr u="sng" kern="1200">
+                  <a:solidFill>
+                    <a:schemeClr val="tx1"/>
+                  </a:solidFill>
+                  <a:latin typeface="Arial" panose="020B0604020202020204" pitchFamily="34" charset="0"/>
+                  <a:ea typeface="+mn-ea"/>
+                  <a:cs typeface="+mn-cs"/>
+                </a:defRPr>
+              </a:lvl3pPr>
+              <a:lvl4pPr marL="1371600" algn="l" rtl="0" fontAlgn="base">
+                <a:spcBef>
+                  <a:spcPct val="0"/>
+                </a:spcBef>
+                <a:spcAft>
+                  <a:spcPct val="0"/>
+                </a:spcAft>
+                <a:defRPr u="sng" kern="1200">
+                  <a:solidFill>
+                    <a:schemeClr val="tx1"/>
+                  </a:solidFill>
+                  <a:latin typeface="Arial" panose="020B0604020202020204" pitchFamily="34" charset="0"/>
+                  <a:ea typeface="+mn-ea"/>
+                  <a:cs typeface="+mn-cs"/>
+                </a:defRPr>
+              </a:lvl4pPr>
+              <a:lvl5pPr marL="1828800" algn="l" rtl="0" fontAlgn="base">
+                <a:spcBef>
+                  <a:spcPct val="0"/>
+                </a:spcBef>
+                <a:spcAft>
+                  <a:spcPct val="0"/>
+                </a:spcAft>
+                <a:defRPr u="sng" kern="1200">
+                  <a:solidFill>
+                    <a:schemeClr val="tx1"/>
+                  </a:solidFill>
+                  <a:latin typeface="Arial" panose="020B0604020202020204" pitchFamily="34" charset="0"/>
+                  <a:ea typeface="+mn-ea"/>
+                  <a:cs typeface="+mn-cs"/>
+                </a:defRPr>
+              </a:lvl5pPr>
+              <a:lvl6pPr marL="2286000" algn="l" defTabSz="914400" rtl="0" eaLnBrk="1" latinLnBrk="0" hangingPunct="1">
+                <a:defRPr u="sng" kern="1200">
+                  <a:solidFill>
+                    <a:schemeClr val="tx1"/>
+                  </a:solidFill>
+                  <a:latin typeface="Arial" panose="020B0604020202020204" pitchFamily="34" charset="0"/>
+                  <a:ea typeface="+mn-ea"/>
+                  <a:cs typeface="+mn-cs"/>
+                </a:defRPr>
+              </a:lvl6pPr>
+              <a:lvl7pPr marL="2743200" algn="l" defTabSz="914400" rtl="0" eaLnBrk="1" latinLnBrk="0" hangingPunct="1">
+                <a:defRPr u="sng" kern="1200">
+                  <a:solidFill>
+                    <a:schemeClr val="tx1"/>
+                  </a:solidFill>
+                  <a:latin typeface="Arial" panose="020B0604020202020204" pitchFamily="34" charset="0"/>
+                  <a:ea typeface="+mn-ea"/>
+                  <a:cs typeface="+mn-cs"/>
+                </a:defRPr>
+              </a:lvl7pPr>
+              <a:lvl8pPr marL="3200400" algn="l" defTabSz="914400" rtl="0" eaLnBrk="1" latinLnBrk="0" hangingPunct="1">
+                <a:defRPr u="sng" kern="1200">
+                  <a:solidFill>
+                    <a:schemeClr val="tx1"/>
+                  </a:solidFill>
+                  <a:latin typeface="Arial" panose="020B0604020202020204" pitchFamily="34" charset="0"/>
+                  <a:ea typeface="+mn-ea"/>
+                  <a:cs typeface="+mn-cs"/>
+                </a:defRPr>
+              </a:lvl8pPr>
+              <a:lvl9pPr marL="3657600" algn="l" defTabSz="914400" rtl="0" eaLnBrk="1" latinLnBrk="0" hangingPunct="1">
+                <a:defRPr u="sng" kern="1200">
+                  <a:solidFill>
+                    <a:schemeClr val="tx1"/>
+                  </a:solidFill>
+                  <a:latin typeface="Arial" panose="020B0604020202020204" pitchFamily="34" charset="0"/>
+                  <a:ea typeface="+mn-ea"/>
+                  <a:cs typeface="+mn-cs"/>
+                </a:defRPr>
+              </a:lvl9pPr>
+            </a:lstStyle>
+            <a:p>
+              <a:pPr fontAlgn="auto">
+                <a:spcBef>
+                  <a:spcPts val="0"/>
+                </a:spcBef>
+                <a:spcAft>
+                  <a:spcPts val="0"/>
+                </a:spcAft>
+                <a:defRPr/>
+              </a:pPr>
+              <a:endParaRPr lang="it-IT" u="none" kern="0">
+                <a:solidFill>
+                  <a:sysClr val="windowText" lastClr="000000"/>
+                </a:solidFill>
+                <a:latin typeface="Calibri" pitchFamily="34" charset="0"/>
+              </a:endParaRPr>
+            </a:p>
+          </p:txBody>
+        </p:sp>
+        <p:sp>
+          <p:nvSpPr>
+            <p:cNvPr id="6" name="Rectangle 1664"/>
+            <p:cNvSpPr>
+              <a:spLocks noChangeArrowheads="1"/>
+            </p:cNvSpPr>
+            <p:nvPr/>
+          </p:nvSpPr>
+          <p:spPr bwMode="auto">
+            <a:xfrm>
+              <a:off x="191" y="3625"/>
+              <a:ext cx="1041" cy="123"/>
+            </a:xfrm>
+            <a:prstGeom prst="rect">
+              <a:avLst/>
+            </a:prstGeom>
+            <a:solidFill>
+              <a:srgbClr val="BBE0E3"/>
+            </a:solidFill>
+            <a:ln w="28575">
+              <a:solidFill>
+                <a:srgbClr val="000000"/>
+              </a:solidFill>
+              <a:miter lim="800000"/>
+              <a:headEnd/>
+              <a:tailEnd/>
+            </a:ln>
+          </p:spPr>
+          <p:txBody>
+            <a:bodyPr wrap="none" anchor="ctr"/>
+            <a:lstStyle>
+              <a:defPPr>
+                <a:defRPr lang="it-IT"/>
+              </a:defPPr>
+              <a:lvl1pPr algn="l" rtl="0" fontAlgn="base">
+                <a:spcBef>
+                  <a:spcPct val="0"/>
+                </a:spcBef>
+                <a:spcAft>
+                  <a:spcPct val="0"/>
+                </a:spcAft>
+                <a:defRPr u="sng" kern="1200">
+                  <a:solidFill>
+                    <a:schemeClr val="tx1"/>
+                  </a:solidFill>
+                  <a:latin typeface="Arial" panose="020B0604020202020204" pitchFamily="34" charset="0"/>
+                  <a:ea typeface="+mn-ea"/>
+                  <a:cs typeface="+mn-cs"/>
+                </a:defRPr>
+              </a:lvl1pPr>
+              <a:lvl2pPr marL="457200" algn="l" rtl="0" fontAlgn="base">
+                <a:spcBef>
+                  <a:spcPct val="0"/>
+                </a:spcBef>
+                <a:spcAft>
+                  <a:spcPct val="0"/>
+                </a:spcAft>
+                <a:defRPr u="sng" kern="1200">
+                  <a:solidFill>
+                    <a:schemeClr val="tx1"/>
+                  </a:solidFill>
+                  <a:latin typeface="Arial" panose="020B0604020202020204" pitchFamily="34" charset="0"/>
+                  <a:ea typeface="+mn-ea"/>
+                  <a:cs typeface="+mn-cs"/>
+                </a:defRPr>
+              </a:lvl2pPr>
+              <a:lvl3pPr marL="914400" algn="l" rtl="0" fontAlgn="base">
+                <a:spcBef>
+                  <a:spcPct val="0"/>
+                </a:spcBef>
+                <a:spcAft>
+                  <a:spcPct val="0"/>
+                </a:spcAft>
+                <a:defRPr u="sng" kern="1200">
+                  <a:solidFill>
+                    <a:schemeClr val="tx1"/>
+                  </a:solidFill>
+                  <a:latin typeface="Arial" panose="020B0604020202020204" pitchFamily="34" charset="0"/>
+                  <a:ea typeface="+mn-ea"/>
+                  <a:cs typeface="+mn-cs"/>
+                </a:defRPr>
+              </a:lvl3pPr>
+              <a:lvl4pPr marL="1371600" algn="l" rtl="0" fontAlgn="base">
+                <a:spcBef>
+                  <a:spcPct val="0"/>
+                </a:spcBef>
+                <a:spcAft>
+                  <a:spcPct val="0"/>
+                </a:spcAft>
+                <a:defRPr u="sng" kern="1200">
+                  <a:solidFill>
+                    <a:schemeClr val="tx1"/>
+                  </a:solidFill>
+                  <a:latin typeface="Arial" panose="020B0604020202020204" pitchFamily="34" charset="0"/>
+                  <a:ea typeface="+mn-ea"/>
+                  <a:cs typeface="+mn-cs"/>
+                </a:defRPr>
+              </a:lvl4pPr>
+              <a:lvl5pPr marL="1828800" algn="l" rtl="0" fontAlgn="base">
+                <a:spcBef>
+                  <a:spcPct val="0"/>
+                </a:spcBef>
+                <a:spcAft>
+                  <a:spcPct val="0"/>
+                </a:spcAft>
+                <a:defRPr u="sng" kern="1200">
+                  <a:solidFill>
+                    <a:schemeClr val="tx1"/>
+                  </a:solidFill>
+                  <a:latin typeface="Arial" panose="020B0604020202020204" pitchFamily="34" charset="0"/>
+                  <a:ea typeface="+mn-ea"/>
+                  <a:cs typeface="+mn-cs"/>
+                </a:defRPr>
+              </a:lvl5pPr>
+              <a:lvl6pPr marL="2286000" algn="l" defTabSz="914400" rtl="0" eaLnBrk="1" latinLnBrk="0" hangingPunct="1">
+                <a:defRPr u="sng" kern="1200">
+                  <a:solidFill>
+                    <a:schemeClr val="tx1"/>
+                  </a:solidFill>
+                  <a:latin typeface="Arial" panose="020B0604020202020204" pitchFamily="34" charset="0"/>
+                  <a:ea typeface="+mn-ea"/>
+                  <a:cs typeface="+mn-cs"/>
+                </a:defRPr>
+              </a:lvl6pPr>
+              <a:lvl7pPr marL="2743200" algn="l" defTabSz="914400" rtl="0" eaLnBrk="1" latinLnBrk="0" hangingPunct="1">
+                <a:defRPr u="sng" kern="1200">
+                  <a:solidFill>
+                    <a:schemeClr val="tx1"/>
+                  </a:solidFill>
+                  <a:latin typeface="Arial" panose="020B0604020202020204" pitchFamily="34" charset="0"/>
+                  <a:ea typeface="+mn-ea"/>
+                  <a:cs typeface="+mn-cs"/>
+                </a:defRPr>
+              </a:lvl7pPr>
+              <a:lvl8pPr marL="3200400" algn="l" defTabSz="914400" rtl="0" eaLnBrk="1" latinLnBrk="0" hangingPunct="1">
+                <a:defRPr u="sng" kern="1200">
+                  <a:solidFill>
+                    <a:schemeClr val="tx1"/>
+                  </a:solidFill>
+                  <a:latin typeface="Arial" panose="020B0604020202020204" pitchFamily="34" charset="0"/>
+                  <a:ea typeface="+mn-ea"/>
+                  <a:cs typeface="+mn-cs"/>
+                </a:defRPr>
+              </a:lvl8pPr>
+              <a:lvl9pPr marL="3657600" algn="l" defTabSz="914400" rtl="0" eaLnBrk="1" latinLnBrk="0" hangingPunct="1">
+                <a:defRPr u="sng" kern="1200">
+                  <a:solidFill>
+                    <a:schemeClr val="tx1"/>
+                  </a:solidFill>
+                  <a:latin typeface="Arial" panose="020B0604020202020204" pitchFamily="34" charset="0"/>
+                  <a:ea typeface="+mn-ea"/>
+                  <a:cs typeface="+mn-cs"/>
+                </a:defRPr>
+              </a:lvl9pPr>
+            </a:lstStyle>
+            <a:p>
+              <a:pPr algn="ctr" fontAlgn="auto">
+                <a:spcBef>
+                  <a:spcPts val="0"/>
+                </a:spcBef>
+                <a:spcAft>
+                  <a:spcPts val="0"/>
+                </a:spcAft>
+                <a:defRPr/>
+              </a:pPr>
+              <a:r>
+                <a:rPr lang="en-US" sz="1200" u="none" kern="0">
+                  <a:solidFill>
+                    <a:sysClr val="windowText" lastClr="000000"/>
+                  </a:solidFill>
+                  <a:latin typeface="Calibri" pitchFamily="34" charset="0"/>
+                </a:rPr>
+                <a:t>Class</a:t>
+              </a:r>
+              <a:r>
+                <a:rPr lang="en-US" sz="800" u="none" kern="0">
+                  <a:solidFill>
+                    <a:sysClr val="windowText" lastClr="000000"/>
+                  </a:solidFill>
+                  <a:latin typeface="Arial" charset="0"/>
+                </a:rPr>
+                <a:t> </a:t>
+              </a:r>
+              <a:r>
+                <a:rPr lang="en-US" sz="1200" u="none" kern="0">
+                  <a:solidFill>
+                    <a:sysClr val="windowText" lastClr="000000"/>
+                  </a:solidFill>
+                  <a:latin typeface="Calibri" pitchFamily="34" charset="0"/>
+                </a:rPr>
+                <a:t>Instance</a:t>
+              </a:r>
+              <a:endParaRPr lang="it-IT" sz="1200" u="none" kern="0">
+                <a:solidFill>
+                  <a:sysClr val="windowText" lastClr="000000"/>
+                </a:solidFill>
+                <a:latin typeface="Calibri" pitchFamily="34" charset="0"/>
+              </a:endParaRPr>
+            </a:p>
+          </p:txBody>
+        </p:sp>
+        <p:sp>
+          <p:nvSpPr>
+            <p:cNvPr id="7" name="Text Box 1665"/>
+            <p:cNvSpPr txBox="1">
+              <a:spLocks noChangeArrowheads="1"/>
+            </p:cNvSpPr>
+            <p:nvPr/>
+          </p:nvSpPr>
+          <p:spPr bwMode="auto">
+            <a:xfrm>
+              <a:off x="238" y="3387"/>
+              <a:ext cx="520" cy="179"/>
+            </a:xfrm>
+            <a:prstGeom prst="rect">
+              <a:avLst/>
+            </a:prstGeom>
+            <a:noFill/>
+            <a:ln w="9525">
+              <a:solidFill>
+                <a:srgbClr val="000000"/>
+              </a:solidFill>
+              <a:prstDash val="lgDash"/>
+              <a:miter lim="800000"/>
+              <a:headEnd/>
+              <a:tailEnd/>
+            </a:ln>
+          </p:spPr>
+          <p:txBody>
+            <a:bodyPr>
+              <a:spAutoFit/>
+            </a:bodyPr>
+            <a:lstStyle>
+              <a:defPPr>
+                <a:defRPr lang="it-IT"/>
+              </a:defPPr>
+              <a:lvl1pPr algn="l" rtl="0" fontAlgn="base">
+                <a:spcBef>
+                  <a:spcPct val="0"/>
+                </a:spcBef>
+                <a:spcAft>
+                  <a:spcPct val="0"/>
+                </a:spcAft>
+                <a:defRPr u="sng" kern="1200">
+                  <a:solidFill>
+                    <a:schemeClr val="tx1"/>
+                  </a:solidFill>
+                  <a:latin typeface="Arial" panose="020B0604020202020204" pitchFamily="34" charset="0"/>
+                  <a:ea typeface="+mn-ea"/>
+                  <a:cs typeface="+mn-cs"/>
+                </a:defRPr>
+              </a:lvl1pPr>
+              <a:lvl2pPr marL="457200" algn="l" rtl="0" fontAlgn="base">
+                <a:spcBef>
+                  <a:spcPct val="0"/>
+                </a:spcBef>
+                <a:spcAft>
+                  <a:spcPct val="0"/>
+                </a:spcAft>
+                <a:defRPr u="sng" kern="1200">
+                  <a:solidFill>
+                    <a:schemeClr val="tx1"/>
+                  </a:solidFill>
+                  <a:latin typeface="Arial" panose="020B0604020202020204" pitchFamily="34" charset="0"/>
+                  <a:ea typeface="+mn-ea"/>
+                  <a:cs typeface="+mn-cs"/>
+                </a:defRPr>
+              </a:lvl2pPr>
+              <a:lvl3pPr marL="914400" algn="l" rtl="0" fontAlgn="base">
+                <a:spcBef>
+                  <a:spcPct val="0"/>
+                </a:spcBef>
+                <a:spcAft>
+                  <a:spcPct val="0"/>
+                </a:spcAft>
+                <a:defRPr u="sng" kern="1200">
+                  <a:solidFill>
+                    <a:schemeClr val="tx1"/>
+                  </a:solidFill>
+                  <a:latin typeface="Arial" panose="020B0604020202020204" pitchFamily="34" charset="0"/>
+                  <a:ea typeface="+mn-ea"/>
+                  <a:cs typeface="+mn-cs"/>
+                </a:defRPr>
+              </a:lvl3pPr>
+              <a:lvl4pPr marL="1371600" algn="l" rtl="0" fontAlgn="base">
+                <a:spcBef>
+                  <a:spcPct val="0"/>
+                </a:spcBef>
+                <a:spcAft>
+                  <a:spcPct val="0"/>
+                </a:spcAft>
+                <a:defRPr u="sng" kern="1200">
+                  <a:solidFill>
+                    <a:schemeClr val="tx1"/>
+                  </a:solidFill>
+                  <a:latin typeface="Arial" panose="020B0604020202020204" pitchFamily="34" charset="0"/>
+                  <a:ea typeface="+mn-ea"/>
+                  <a:cs typeface="+mn-cs"/>
+                </a:defRPr>
+              </a:lvl4pPr>
+              <a:lvl5pPr marL="1828800" algn="l" rtl="0" fontAlgn="base">
+                <a:spcBef>
+                  <a:spcPct val="0"/>
+                </a:spcBef>
+                <a:spcAft>
+                  <a:spcPct val="0"/>
+                </a:spcAft>
+                <a:defRPr u="sng" kern="1200">
+                  <a:solidFill>
+                    <a:schemeClr val="tx1"/>
+                  </a:solidFill>
+                  <a:latin typeface="Arial" panose="020B0604020202020204" pitchFamily="34" charset="0"/>
+                  <a:ea typeface="+mn-ea"/>
+                  <a:cs typeface="+mn-cs"/>
+                </a:defRPr>
+              </a:lvl5pPr>
+              <a:lvl6pPr marL="2286000" algn="l" defTabSz="914400" rtl="0" eaLnBrk="1" latinLnBrk="0" hangingPunct="1">
+                <a:defRPr u="sng" kern="1200">
+                  <a:solidFill>
+                    <a:schemeClr val="tx1"/>
+                  </a:solidFill>
+                  <a:latin typeface="Arial" panose="020B0604020202020204" pitchFamily="34" charset="0"/>
+                  <a:ea typeface="+mn-ea"/>
+                  <a:cs typeface="+mn-cs"/>
+                </a:defRPr>
+              </a:lvl6pPr>
+              <a:lvl7pPr marL="2743200" algn="l" defTabSz="914400" rtl="0" eaLnBrk="1" latinLnBrk="0" hangingPunct="1">
+                <a:defRPr u="sng" kern="1200">
+                  <a:solidFill>
+                    <a:schemeClr val="tx1"/>
+                  </a:solidFill>
+                  <a:latin typeface="Arial" panose="020B0604020202020204" pitchFamily="34" charset="0"/>
+                  <a:ea typeface="+mn-ea"/>
+                  <a:cs typeface="+mn-cs"/>
+                </a:defRPr>
+              </a:lvl7pPr>
+              <a:lvl8pPr marL="3200400" algn="l" defTabSz="914400" rtl="0" eaLnBrk="1" latinLnBrk="0" hangingPunct="1">
+                <a:defRPr u="sng" kern="1200">
+                  <a:solidFill>
+                    <a:schemeClr val="tx1"/>
+                  </a:solidFill>
+                  <a:latin typeface="Arial" panose="020B0604020202020204" pitchFamily="34" charset="0"/>
+                  <a:ea typeface="+mn-ea"/>
+                  <a:cs typeface="+mn-cs"/>
+                </a:defRPr>
+              </a:lvl8pPr>
+              <a:lvl9pPr marL="3657600" algn="l" defTabSz="914400" rtl="0" eaLnBrk="1" latinLnBrk="0" hangingPunct="1">
+                <a:defRPr u="sng" kern="1200">
+                  <a:solidFill>
+                    <a:schemeClr val="tx1"/>
+                  </a:solidFill>
+                  <a:latin typeface="Arial" panose="020B0604020202020204" pitchFamily="34" charset="0"/>
+                  <a:ea typeface="+mn-ea"/>
+                  <a:cs typeface="+mn-cs"/>
+                </a:defRPr>
+              </a:lvl9pPr>
+            </a:lstStyle>
+            <a:p>
+              <a:pPr algn="ctr" fontAlgn="auto">
+                <a:spcBef>
+                  <a:spcPts val="0"/>
+                </a:spcBef>
+                <a:spcAft>
+                  <a:spcPts val="0"/>
+                </a:spcAft>
+                <a:defRPr/>
+              </a:pPr>
+              <a:r>
+                <a:rPr lang="en-US" sz="1200" u="none" kern="0">
+                  <a:solidFill>
+                    <a:sysClr val="windowText" lastClr="000000"/>
+                  </a:solidFill>
+                  <a:latin typeface="Calibri" pitchFamily="34" charset="0"/>
+                </a:rPr>
+                <a:t>Property</a:t>
+              </a:r>
+              <a:endParaRPr lang="it-IT" sz="1200" u="none" kern="0">
+                <a:solidFill>
+                  <a:sysClr val="windowText" lastClr="000000"/>
+                </a:solidFill>
+                <a:latin typeface="Calibri" pitchFamily="34" charset="0"/>
+              </a:endParaRPr>
+            </a:p>
+          </p:txBody>
+        </p:sp>
+        <p:sp>
+          <p:nvSpPr>
+            <p:cNvPr id="8" name="AutoShape 1666"/>
+            <p:cNvSpPr>
+              <a:spLocks noChangeArrowheads="1"/>
+            </p:cNvSpPr>
+            <p:nvPr/>
+          </p:nvSpPr>
+          <p:spPr bwMode="auto">
+            <a:xfrm>
+              <a:off x="191" y="3815"/>
+              <a:ext cx="1041" cy="159"/>
+            </a:xfrm>
+            <a:prstGeom prst="hexagon">
+              <a:avLst>
+                <a:gd name="adj" fmla="val 137845"/>
+                <a:gd name="vf" fmla="val 115470"/>
+              </a:avLst>
+            </a:prstGeom>
+            <a:solidFill>
+              <a:srgbClr val="2D2D8A">
+                <a:lumMod val="40000"/>
+                <a:lumOff val="60000"/>
+              </a:srgbClr>
+            </a:solidFill>
+            <a:ln w="28575">
+              <a:solidFill>
+                <a:srgbClr val="000000"/>
+              </a:solidFill>
+              <a:miter lim="800000"/>
+              <a:headEnd/>
+              <a:tailEnd/>
+            </a:ln>
+            <a:effectLst/>
+          </p:spPr>
+          <p:txBody>
+            <a:bodyPr wrap="none" anchor="ctr"/>
+            <a:lstStyle>
+              <a:defPPr>
+                <a:defRPr lang="it-IT"/>
+              </a:defPPr>
+              <a:lvl1pPr algn="l" rtl="0" fontAlgn="base">
+                <a:spcBef>
+                  <a:spcPct val="0"/>
+                </a:spcBef>
+                <a:spcAft>
+                  <a:spcPct val="0"/>
+                </a:spcAft>
+                <a:defRPr u="sng" kern="1200">
+                  <a:solidFill>
+                    <a:schemeClr val="tx1"/>
+                  </a:solidFill>
+                  <a:latin typeface="Arial" panose="020B0604020202020204" pitchFamily="34" charset="0"/>
+                  <a:ea typeface="+mn-ea"/>
+                  <a:cs typeface="+mn-cs"/>
+                </a:defRPr>
+              </a:lvl1pPr>
+              <a:lvl2pPr marL="457200" algn="l" rtl="0" fontAlgn="base">
+                <a:spcBef>
+                  <a:spcPct val="0"/>
+                </a:spcBef>
+                <a:spcAft>
+                  <a:spcPct val="0"/>
+                </a:spcAft>
+                <a:defRPr u="sng" kern="1200">
+                  <a:solidFill>
+                    <a:schemeClr val="tx1"/>
+                  </a:solidFill>
+                  <a:latin typeface="Arial" panose="020B0604020202020204" pitchFamily="34" charset="0"/>
+                  <a:ea typeface="+mn-ea"/>
+                  <a:cs typeface="+mn-cs"/>
+                </a:defRPr>
+              </a:lvl2pPr>
+              <a:lvl3pPr marL="914400" algn="l" rtl="0" fontAlgn="base">
+                <a:spcBef>
+                  <a:spcPct val="0"/>
+                </a:spcBef>
+                <a:spcAft>
+                  <a:spcPct val="0"/>
+                </a:spcAft>
+                <a:defRPr u="sng" kern="1200">
+                  <a:solidFill>
+                    <a:schemeClr val="tx1"/>
+                  </a:solidFill>
+                  <a:latin typeface="Arial" panose="020B0604020202020204" pitchFamily="34" charset="0"/>
+                  <a:ea typeface="+mn-ea"/>
+                  <a:cs typeface="+mn-cs"/>
+                </a:defRPr>
+              </a:lvl3pPr>
+              <a:lvl4pPr marL="1371600" algn="l" rtl="0" fontAlgn="base">
+                <a:spcBef>
+                  <a:spcPct val="0"/>
+                </a:spcBef>
+                <a:spcAft>
+                  <a:spcPct val="0"/>
+                </a:spcAft>
+                <a:defRPr u="sng" kern="1200">
+                  <a:solidFill>
+                    <a:schemeClr val="tx1"/>
+                  </a:solidFill>
+                  <a:latin typeface="Arial" panose="020B0604020202020204" pitchFamily="34" charset="0"/>
+                  <a:ea typeface="+mn-ea"/>
+                  <a:cs typeface="+mn-cs"/>
+                </a:defRPr>
+              </a:lvl4pPr>
+              <a:lvl5pPr marL="1828800" algn="l" rtl="0" fontAlgn="base">
+                <a:spcBef>
+                  <a:spcPct val="0"/>
+                </a:spcBef>
+                <a:spcAft>
+                  <a:spcPct val="0"/>
+                </a:spcAft>
+                <a:defRPr u="sng" kern="1200">
+                  <a:solidFill>
+                    <a:schemeClr val="tx1"/>
+                  </a:solidFill>
+                  <a:latin typeface="Arial" panose="020B0604020202020204" pitchFamily="34" charset="0"/>
+                  <a:ea typeface="+mn-ea"/>
+                  <a:cs typeface="+mn-cs"/>
+                </a:defRPr>
+              </a:lvl5pPr>
+              <a:lvl6pPr marL="2286000" algn="l" defTabSz="914400" rtl="0" eaLnBrk="1" latinLnBrk="0" hangingPunct="1">
+                <a:defRPr u="sng" kern="1200">
+                  <a:solidFill>
+                    <a:schemeClr val="tx1"/>
+                  </a:solidFill>
+                  <a:latin typeface="Arial" panose="020B0604020202020204" pitchFamily="34" charset="0"/>
+                  <a:ea typeface="+mn-ea"/>
+                  <a:cs typeface="+mn-cs"/>
+                </a:defRPr>
+              </a:lvl6pPr>
+              <a:lvl7pPr marL="2743200" algn="l" defTabSz="914400" rtl="0" eaLnBrk="1" latinLnBrk="0" hangingPunct="1">
+                <a:defRPr u="sng" kern="1200">
+                  <a:solidFill>
+                    <a:schemeClr val="tx1"/>
+                  </a:solidFill>
+                  <a:latin typeface="Arial" panose="020B0604020202020204" pitchFamily="34" charset="0"/>
+                  <a:ea typeface="+mn-ea"/>
+                  <a:cs typeface="+mn-cs"/>
+                </a:defRPr>
+              </a:lvl7pPr>
+              <a:lvl8pPr marL="3200400" algn="l" defTabSz="914400" rtl="0" eaLnBrk="1" latinLnBrk="0" hangingPunct="1">
+                <a:defRPr u="sng" kern="1200">
+                  <a:solidFill>
+                    <a:schemeClr val="tx1"/>
+                  </a:solidFill>
+                  <a:latin typeface="Arial" panose="020B0604020202020204" pitchFamily="34" charset="0"/>
+                  <a:ea typeface="+mn-ea"/>
+                  <a:cs typeface="+mn-cs"/>
+                </a:defRPr>
+              </a:lvl8pPr>
+              <a:lvl9pPr marL="3657600" algn="l" defTabSz="914400" rtl="0" eaLnBrk="1" latinLnBrk="0" hangingPunct="1">
+                <a:defRPr u="sng" kern="1200">
+                  <a:solidFill>
+                    <a:schemeClr val="tx1"/>
+                  </a:solidFill>
+                  <a:latin typeface="Arial" panose="020B0604020202020204" pitchFamily="34" charset="0"/>
+                  <a:ea typeface="+mn-ea"/>
+                  <a:cs typeface="+mn-cs"/>
+                </a:defRPr>
+              </a:lvl9pPr>
+            </a:lstStyle>
+            <a:p>
+              <a:pPr algn="ctr" fontAlgn="auto">
+                <a:spcBef>
+                  <a:spcPts val="0"/>
+                </a:spcBef>
+                <a:spcAft>
+                  <a:spcPts val="0"/>
+                </a:spcAft>
+                <a:defRPr/>
+              </a:pPr>
+              <a:r>
+                <a:rPr lang="en-US" sz="1200" u="none" kern="0">
+                  <a:solidFill>
+                    <a:sysClr val="windowText" lastClr="000000"/>
+                  </a:solidFill>
+                  <a:latin typeface="Calibri" pitchFamily="34" charset="0"/>
+                </a:rPr>
+                <a:t>Literal</a:t>
+              </a:r>
+              <a:endParaRPr lang="it-IT" sz="1200" u="none" kern="0">
+                <a:solidFill>
+                  <a:sysClr val="windowText" lastClr="000000"/>
+                </a:solidFill>
+                <a:latin typeface="Calibri" pitchFamily="34" charset="0"/>
+              </a:endParaRPr>
+            </a:p>
+          </p:txBody>
+        </p:sp>
+        <p:sp>
+          <p:nvSpPr>
+            <p:cNvPr id="9" name="Line 1667"/>
+            <p:cNvSpPr>
+              <a:spLocks noChangeShapeType="1"/>
+            </p:cNvSpPr>
+            <p:nvPr/>
+          </p:nvSpPr>
+          <p:spPr bwMode="auto">
+            <a:xfrm>
+              <a:off x="806" y="3467"/>
+              <a:ext cx="379" cy="2"/>
+            </a:xfrm>
+            <a:prstGeom prst="line">
+              <a:avLst/>
+            </a:prstGeom>
+            <a:noFill/>
+            <a:ln w="12700">
+              <a:solidFill>
+                <a:srgbClr val="000000"/>
+              </a:solidFill>
+              <a:prstDash val="dash"/>
+              <a:round/>
+              <a:headEnd/>
+              <a:tailEnd type="triangle" w="med" len="med"/>
+            </a:ln>
+          </p:spPr>
+          <p:txBody>
+            <a:bodyPr/>
+            <a:lstStyle>
+              <a:defPPr>
+                <a:defRPr lang="it-IT"/>
+              </a:defPPr>
+              <a:lvl1pPr algn="l" rtl="0" fontAlgn="base">
+                <a:spcBef>
+                  <a:spcPct val="0"/>
+                </a:spcBef>
+                <a:spcAft>
+                  <a:spcPct val="0"/>
+                </a:spcAft>
+                <a:defRPr u="sng" kern="1200">
+                  <a:solidFill>
+                    <a:schemeClr val="tx1"/>
+                  </a:solidFill>
+                  <a:latin typeface="Arial" panose="020B0604020202020204" pitchFamily="34" charset="0"/>
+                  <a:ea typeface="+mn-ea"/>
+                  <a:cs typeface="+mn-cs"/>
+                </a:defRPr>
+              </a:lvl1pPr>
+              <a:lvl2pPr marL="457200" algn="l" rtl="0" fontAlgn="base">
+                <a:spcBef>
+                  <a:spcPct val="0"/>
+                </a:spcBef>
+                <a:spcAft>
+                  <a:spcPct val="0"/>
+                </a:spcAft>
+                <a:defRPr u="sng" kern="1200">
+                  <a:solidFill>
+                    <a:schemeClr val="tx1"/>
+                  </a:solidFill>
+                  <a:latin typeface="Arial" panose="020B0604020202020204" pitchFamily="34" charset="0"/>
+                  <a:ea typeface="+mn-ea"/>
+                  <a:cs typeface="+mn-cs"/>
+                </a:defRPr>
+              </a:lvl2pPr>
+              <a:lvl3pPr marL="914400" algn="l" rtl="0" fontAlgn="base">
+                <a:spcBef>
+                  <a:spcPct val="0"/>
+                </a:spcBef>
+                <a:spcAft>
+                  <a:spcPct val="0"/>
+                </a:spcAft>
+                <a:defRPr u="sng" kern="1200">
+                  <a:solidFill>
+                    <a:schemeClr val="tx1"/>
+                  </a:solidFill>
+                  <a:latin typeface="Arial" panose="020B0604020202020204" pitchFamily="34" charset="0"/>
+                  <a:ea typeface="+mn-ea"/>
+                  <a:cs typeface="+mn-cs"/>
+                </a:defRPr>
+              </a:lvl3pPr>
+              <a:lvl4pPr marL="1371600" algn="l" rtl="0" fontAlgn="base">
+                <a:spcBef>
+                  <a:spcPct val="0"/>
+                </a:spcBef>
+                <a:spcAft>
+                  <a:spcPct val="0"/>
+                </a:spcAft>
+                <a:defRPr u="sng" kern="1200">
+                  <a:solidFill>
+                    <a:schemeClr val="tx1"/>
+                  </a:solidFill>
+                  <a:latin typeface="Arial" panose="020B0604020202020204" pitchFamily="34" charset="0"/>
+                  <a:ea typeface="+mn-ea"/>
+                  <a:cs typeface="+mn-cs"/>
+                </a:defRPr>
+              </a:lvl4pPr>
+              <a:lvl5pPr marL="1828800" algn="l" rtl="0" fontAlgn="base">
+                <a:spcBef>
+                  <a:spcPct val="0"/>
+                </a:spcBef>
+                <a:spcAft>
+                  <a:spcPct val="0"/>
+                </a:spcAft>
+                <a:defRPr u="sng" kern="1200">
+                  <a:solidFill>
+                    <a:schemeClr val="tx1"/>
+                  </a:solidFill>
+                  <a:latin typeface="Arial" panose="020B0604020202020204" pitchFamily="34" charset="0"/>
+                  <a:ea typeface="+mn-ea"/>
+                  <a:cs typeface="+mn-cs"/>
+                </a:defRPr>
+              </a:lvl5pPr>
+              <a:lvl6pPr marL="2286000" algn="l" defTabSz="914400" rtl="0" eaLnBrk="1" latinLnBrk="0" hangingPunct="1">
+                <a:defRPr u="sng" kern="1200">
+                  <a:solidFill>
+                    <a:schemeClr val="tx1"/>
+                  </a:solidFill>
+                  <a:latin typeface="Arial" panose="020B0604020202020204" pitchFamily="34" charset="0"/>
+                  <a:ea typeface="+mn-ea"/>
+                  <a:cs typeface="+mn-cs"/>
+                </a:defRPr>
+              </a:lvl6pPr>
+              <a:lvl7pPr marL="2743200" algn="l" defTabSz="914400" rtl="0" eaLnBrk="1" latinLnBrk="0" hangingPunct="1">
+                <a:defRPr u="sng" kern="1200">
+                  <a:solidFill>
+                    <a:schemeClr val="tx1"/>
+                  </a:solidFill>
+                  <a:latin typeface="Arial" panose="020B0604020202020204" pitchFamily="34" charset="0"/>
+                  <a:ea typeface="+mn-ea"/>
+                  <a:cs typeface="+mn-cs"/>
+                </a:defRPr>
+              </a:lvl7pPr>
+              <a:lvl8pPr marL="3200400" algn="l" defTabSz="914400" rtl="0" eaLnBrk="1" latinLnBrk="0" hangingPunct="1">
+                <a:defRPr u="sng" kern="1200">
+                  <a:solidFill>
+                    <a:schemeClr val="tx1"/>
+                  </a:solidFill>
+                  <a:latin typeface="Arial" panose="020B0604020202020204" pitchFamily="34" charset="0"/>
+                  <a:ea typeface="+mn-ea"/>
+                  <a:cs typeface="+mn-cs"/>
+                </a:defRPr>
+              </a:lvl8pPr>
+              <a:lvl9pPr marL="3657600" algn="l" defTabSz="914400" rtl="0" eaLnBrk="1" latinLnBrk="0" hangingPunct="1">
+                <a:defRPr u="sng" kern="1200">
+                  <a:solidFill>
+                    <a:schemeClr val="tx1"/>
+                  </a:solidFill>
+                  <a:latin typeface="Arial" panose="020B0604020202020204" pitchFamily="34" charset="0"/>
+                  <a:ea typeface="+mn-ea"/>
+                  <a:cs typeface="+mn-cs"/>
+                </a:defRPr>
+              </a:lvl9pPr>
+            </a:lstStyle>
+            <a:p>
+              <a:pPr fontAlgn="auto">
+                <a:spcBef>
+                  <a:spcPts val="0"/>
+                </a:spcBef>
+                <a:spcAft>
+                  <a:spcPts val="0"/>
+                </a:spcAft>
+                <a:defRPr/>
+              </a:pPr>
+              <a:endParaRPr lang="it-IT" u="none" kern="0">
+                <a:solidFill>
+                  <a:sysClr val="windowText" lastClr="000000"/>
+                </a:solidFill>
+                <a:latin typeface="Arial" charset="0"/>
+              </a:endParaRPr>
+            </a:p>
+          </p:txBody>
+        </p:sp>
+        <p:sp>
+          <p:nvSpPr>
+            <p:cNvPr id="10" name="Text Box 1680"/>
+            <p:cNvSpPr txBox="1">
+              <a:spLocks noChangeArrowheads="1"/>
+            </p:cNvSpPr>
+            <p:nvPr/>
+          </p:nvSpPr>
+          <p:spPr bwMode="auto">
+            <a:xfrm>
+              <a:off x="249" y="2840"/>
+              <a:ext cx="624" cy="218"/>
+            </a:xfrm>
+            <a:prstGeom prst="rect">
+              <a:avLst/>
+            </a:prstGeom>
+            <a:noFill/>
+            <a:ln w="9525">
+              <a:solidFill>
+                <a:srgbClr val="FF0000"/>
+              </a:solidFill>
+              <a:prstDash val="lgDash"/>
+              <a:miter lim="800000"/>
+              <a:headEnd/>
+              <a:tailEnd/>
+            </a:ln>
+            <a:extLst>
+              <a:ext uri="{909E8E84-426E-40DD-AFC4-6F175D3DCCD1}">
+                <a14:hiddenFill xmlns:a14="http://schemas.microsoft.com/office/drawing/2010/main">
+                  <a:solidFill>
+                    <a:srgbClr val="FFFFFF"/>
+                  </a:solidFill>
+                </a14:hiddenFill>
+              </a:ext>
+            </a:extLst>
+          </p:spPr>
+          <p:txBody>
+            <a:bodyPr>
+              <a:spAutoFit/>
+            </a:bodyPr>
+            <a:lstStyle>
+              <a:defPPr>
+                <a:defRPr lang="it-IT"/>
+              </a:defPPr>
+              <a:lvl1pPr algn="l" rtl="0" fontAlgn="base">
+                <a:spcBef>
+                  <a:spcPct val="0"/>
+                </a:spcBef>
+                <a:spcAft>
+                  <a:spcPct val="0"/>
+                </a:spcAft>
+                <a:defRPr u="sng" kern="1200">
+                  <a:solidFill>
+                    <a:schemeClr val="tx1"/>
+                  </a:solidFill>
+                  <a:latin typeface="Arial" panose="020B0604020202020204" pitchFamily="34" charset="0"/>
+                  <a:ea typeface="+mn-ea"/>
+                  <a:cs typeface="+mn-cs"/>
+                </a:defRPr>
+              </a:lvl1pPr>
+              <a:lvl2pPr marL="457200" algn="l" rtl="0" fontAlgn="base">
+                <a:spcBef>
+                  <a:spcPct val="0"/>
+                </a:spcBef>
+                <a:spcAft>
+                  <a:spcPct val="0"/>
+                </a:spcAft>
+                <a:defRPr u="sng" kern="1200">
+                  <a:solidFill>
+                    <a:schemeClr val="tx1"/>
+                  </a:solidFill>
+                  <a:latin typeface="Arial" panose="020B0604020202020204" pitchFamily="34" charset="0"/>
+                  <a:ea typeface="+mn-ea"/>
+                  <a:cs typeface="+mn-cs"/>
+                </a:defRPr>
+              </a:lvl2pPr>
+              <a:lvl3pPr marL="914400" algn="l" rtl="0" fontAlgn="base">
+                <a:spcBef>
+                  <a:spcPct val="0"/>
+                </a:spcBef>
+                <a:spcAft>
+                  <a:spcPct val="0"/>
+                </a:spcAft>
+                <a:defRPr u="sng" kern="1200">
+                  <a:solidFill>
+                    <a:schemeClr val="tx1"/>
+                  </a:solidFill>
+                  <a:latin typeface="Arial" panose="020B0604020202020204" pitchFamily="34" charset="0"/>
+                  <a:ea typeface="+mn-ea"/>
+                  <a:cs typeface="+mn-cs"/>
+                </a:defRPr>
+              </a:lvl3pPr>
+              <a:lvl4pPr marL="1371600" algn="l" rtl="0" fontAlgn="base">
+                <a:spcBef>
+                  <a:spcPct val="0"/>
+                </a:spcBef>
+                <a:spcAft>
+                  <a:spcPct val="0"/>
+                </a:spcAft>
+                <a:defRPr u="sng" kern="1200">
+                  <a:solidFill>
+                    <a:schemeClr val="tx1"/>
+                  </a:solidFill>
+                  <a:latin typeface="Arial" panose="020B0604020202020204" pitchFamily="34" charset="0"/>
+                  <a:ea typeface="+mn-ea"/>
+                  <a:cs typeface="+mn-cs"/>
+                </a:defRPr>
+              </a:lvl4pPr>
+              <a:lvl5pPr marL="1828800" algn="l" rtl="0" fontAlgn="base">
+                <a:spcBef>
+                  <a:spcPct val="0"/>
+                </a:spcBef>
+                <a:spcAft>
+                  <a:spcPct val="0"/>
+                </a:spcAft>
+                <a:defRPr u="sng" kern="1200">
+                  <a:solidFill>
+                    <a:schemeClr val="tx1"/>
+                  </a:solidFill>
+                  <a:latin typeface="Arial" panose="020B0604020202020204" pitchFamily="34" charset="0"/>
+                  <a:ea typeface="+mn-ea"/>
+                  <a:cs typeface="+mn-cs"/>
+                </a:defRPr>
+              </a:lvl5pPr>
+              <a:lvl6pPr marL="2286000" algn="l" defTabSz="914400" rtl="0" eaLnBrk="1" latinLnBrk="0" hangingPunct="1">
+                <a:defRPr u="sng" kern="1200">
+                  <a:solidFill>
+                    <a:schemeClr val="tx1"/>
+                  </a:solidFill>
+                  <a:latin typeface="Arial" panose="020B0604020202020204" pitchFamily="34" charset="0"/>
+                  <a:ea typeface="+mn-ea"/>
+                  <a:cs typeface="+mn-cs"/>
+                </a:defRPr>
+              </a:lvl6pPr>
+              <a:lvl7pPr marL="2743200" algn="l" defTabSz="914400" rtl="0" eaLnBrk="1" latinLnBrk="0" hangingPunct="1">
+                <a:defRPr u="sng" kern="1200">
+                  <a:solidFill>
+                    <a:schemeClr val="tx1"/>
+                  </a:solidFill>
+                  <a:latin typeface="Arial" panose="020B0604020202020204" pitchFamily="34" charset="0"/>
+                  <a:ea typeface="+mn-ea"/>
+                  <a:cs typeface="+mn-cs"/>
+                </a:defRPr>
+              </a:lvl7pPr>
+              <a:lvl8pPr marL="3200400" algn="l" defTabSz="914400" rtl="0" eaLnBrk="1" latinLnBrk="0" hangingPunct="1">
+                <a:defRPr u="sng" kern="1200">
+                  <a:solidFill>
+                    <a:schemeClr val="tx1"/>
+                  </a:solidFill>
+                  <a:latin typeface="Arial" panose="020B0604020202020204" pitchFamily="34" charset="0"/>
+                  <a:ea typeface="+mn-ea"/>
+                  <a:cs typeface="+mn-cs"/>
+                </a:defRPr>
+              </a:lvl8pPr>
+              <a:lvl9pPr marL="3657600" algn="l" defTabSz="914400" rtl="0" eaLnBrk="1" latinLnBrk="0" hangingPunct="1">
+                <a:defRPr u="sng" kern="1200">
+                  <a:solidFill>
+                    <a:schemeClr val="tx1"/>
+                  </a:solidFill>
+                  <a:latin typeface="Arial" panose="020B0604020202020204" pitchFamily="34" charset="0"/>
+                  <a:ea typeface="+mn-ea"/>
+                  <a:cs typeface="+mn-cs"/>
+                </a:defRPr>
+              </a:lvl9pPr>
+            </a:lstStyle>
+            <a:p>
+              <a:pPr algn="ctr" eaLnBrk="1" hangingPunct="1"/>
+              <a:r>
+                <a:rPr lang="it-IT" altLang="it-IT" sz="1600" u="none">
+                  <a:solidFill>
+                    <a:srgbClr val="FF0000"/>
+                  </a:solidFill>
+                  <a:latin typeface="Calibri" panose="020F0502020204030204" pitchFamily="34" charset="0"/>
+                </a:rPr>
+                <a:t>rdf:type</a:t>
+              </a:r>
+            </a:p>
+          </p:txBody>
+        </p:sp>
+        <p:sp>
+          <p:nvSpPr>
+            <p:cNvPr id="11" name="Rettangolo arrotondato 5"/>
+            <p:cNvSpPr>
+              <a:spLocks noChangeArrowheads="1"/>
+            </p:cNvSpPr>
+            <p:nvPr/>
+          </p:nvSpPr>
+          <p:spPr bwMode="auto">
+            <a:xfrm>
+              <a:off x="249" y="3113"/>
+              <a:ext cx="624" cy="174"/>
+            </a:xfrm>
+            <a:prstGeom prst="roundRect">
+              <a:avLst>
+                <a:gd name="adj" fmla="val 16667"/>
+              </a:avLst>
+            </a:prstGeom>
+            <a:solidFill>
+              <a:srgbClr val="3C8C93"/>
+            </a:solidFill>
+            <a:ln w="25400" algn="ctr">
+              <a:solidFill>
+                <a:srgbClr val="262673"/>
+              </a:solidFill>
+              <a:round/>
+              <a:headEnd/>
+              <a:tailEnd/>
+            </a:ln>
+          </p:spPr>
+          <p:txBody>
+            <a:bodyPr anchor="ctr"/>
+            <a:lstStyle>
+              <a:defPPr>
+                <a:defRPr lang="it-IT"/>
+              </a:defPPr>
+              <a:lvl1pPr algn="l" rtl="0" fontAlgn="base">
+                <a:spcBef>
+                  <a:spcPct val="0"/>
+                </a:spcBef>
+                <a:spcAft>
+                  <a:spcPct val="0"/>
+                </a:spcAft>
+                <a:defRPr u="sng" kern="1200">
+                  <a:solidFill>
+                    <a:schemeClr val="tx1"/>
+                  </a:solidFill>
+                  <a:latin typeface="Arial" panose="020B0604020202020204" pitchFamily="34" charset="0"/>
+                  <a:ea typeface="+mn-ea"/>
+                  <a:cs typeface="+mn-cs"/>
+                </a:defRPr>
+              </a:lvl1pPr>
+              <a:lvl2pPr marL="457200" algn="l" rtl="0" fontAlgn="base">
+                <a:spcBef>
+                  <a:spcPct val="0"/>
+                </a:spcBef>
+                <a:spcAft>
+                  <a:spcPct val="0"/>
+                </a:spcAft>
+                <a:defRPr u="sng" kern="1200">
+                  <a:solidFill>
+                    <a:schemeClr val="tx1"/>
+                  </a:solidFill>
+                  <a:latin typeface="Arial" panose="020B0604020202020204" pitchFamily="34" charset="0"/>
+                  <a:ea typeface="+mn-ea"/>
+                  <a:cs typeface="+mn-cs"/>
+                </a:defRPr>
+              </a:lvl2pPr>
+              <a:lvl3pPr marL="914400" algn="l" rtl="0" fontAlgn="base">
+                <a:spcBef>
+                  <a:spcPct val="0"/>
+                </a:spcBef>
+                <a:spcAft>
+                  <a:spcPct val="0"/>
+                </a:spcAft>
+                <a:defRPr u="sng" kern="1200">
+                  <a:solidFill>
+                    <a:schemeClr val="tx1"/>
+                  </a:solidFill>
+                  <a:latin typeface="Arial" panose="020B0604020202020204" pitchFamily="34" charset="0"/>
+                  <a:ea typeface="+mn-ea"/>
+                  <a:cs typeface="+mn-cs"/>
+                </a:defRPr>
+              </a:lvl3pPr>
+              <a:lvl4pPr marL="1371600" algn="l" rtl="0" fontAlgn="base">
+                <a:spcBef>
+                  <a:spcPct val="0"/>
+                </a:spcBef>
+                <a:spcAft>
+                  <a:spcPct val="0"/>
+                </a:spcAft>
+                <a:defRPr u="sng" kern="1200">
+                  <a:solidFill>
+                    <a:schemeClr val="tx1"/>
+                  </a:solidFill>
+                  <a:latin typeface="Arial" panose="020B0604020202020204" pitchFamily="34" charset="0"/>
+                  <a:ea typeface="+mn-ea"/>
+                  <a:cs typeface="+mn-cs"/>
+                </a:defRPr>
+              </a:lvl4pPr>
+              <a:lvl5pPr marL="1828800" algn="l" rtl="0" fontAlgn="base">
+                <a:spcBef>
+                  <a:spcPct val="0"/>
+                </a:spcBef>
+                <a:spcAft>
+                  <a:spcPct val="0"/>
+                </a:spcAft>
+                <a:defRPr u="sng" kern="1200">
+                  <a:solidFill>
+                    <a:schemeClr val="tx1"/>
+                  </a:solidFill>
+                  <a:latin typeface="Arial" panose="020B0604020202020204" pitchFamily="34" charset="0"/>
+                  <a:ea typeface="+mn-ea"/>
+                  <a:cs typeface="+mn-cs"/>
+                </a:defRPr>
+              </a:lvl5pPr>
+              <a:lvl6pPr marL="2286000" algn="l" defTabSz="914400" rtl="0" eaLnBrk="1" latinLnBrk="0" hangingPunct="1">
+                <a:defRPr u="sng" kern="1200">
+                  <a:solidFill>
+                    <a:schemeClr val="tx1"/>
+                  </a:solidFill>
+                  <a:latin typeface="Arial" panose="020B0604020202020204" pitchFamily="34" charset="0"/>
+                  <a:ea typeface="+mn-ea"/>
+                  <a:cs typeface="+mn-cs"/>
+                </a:defRPr>
+              </a:lvl6pPr>
+              <a:lvl7pPr marL="2743200" algn="l" defTabSz="914400" rtl="0" eaLnBrk="1" latinLnBrk="0" hangingPunct="1">
+                <a:defRPr u="sng" kern="1200">
+                  <a:solidFill>
+                    <a:schemeClr val="tx1"/>
+                  </a:solidFill>
+                  <a:latin typeface="Arial" panose="020B0604020202020204" pitchFamily="34" charset="0"/>
+                  <a:ea typeface="+mn-ea"/>
+                  <a:cs typeface="+mn-cs"/>
+                </a:defRPr>
+              </a:lvl7pPr>
+              <a:lvl8pPr marL="3200400" algn="l" defTabSz="914400" rtl="0" eaLnBrk="1" latinLnBrk="0" hangingPunct="1">
+                <a:defRPr u="sng" kern="1200">
+                  <a:solidFill>
+                    <a:schemeClr val="tx1"/>
+                  </a:solidFill>
+                  <a:latin typeface="Arial" panose="020B0604020202020204" pitchFamily="34" charset="0"/>
+                  <a:ea typeface="+mn-ea"/>
+                  <a:cs typeface="+mn-cs"/>
+                </a:defRPr>
+              </a:lvl8pPr>
+              <a:lvl9pPr marL="3657600" algn="l" defTabSz="914400" rtl="0" eaLnBrk="1" latinLnBrk="0" hangingPunct="1">
+                <a:defRPr u="sng" kern="1200">
+                  <a:solidFill>
+                    <a:schemeClr val="tx1"/>
+                  </a:solidFill>
+                  <a:latin typeface="Arial" panose="020B0604020202020204" pitchFamily="34" charset="0"/>
+                  <a:ea typeface="+mn-ea"/>
+                  <a:cs typeface="+mn-cs"/>
+                </a:defRPr>
+              </a:lvl9pPr>
+            </a:lstStyle>
+            <a:p>
+              <a:pPr algn="ctr" eaLnBrk="1" hangingPunct="1"/>
+              <a:r>
+                <a:rPr lang="it-IT" altLang="it-IT" sz="1400" u="none">
+                  <a:solidFill>
+                    <a:srgbClr val="FFFFFF"/>
+                  </a:solidFill>
+                </a:rPr>
+                <a:t>CLASS</a:t>
+              </a:r>
+            </a:p>
+          </p:txBody>
+        </p:sp>
+      </p:grpSp>
+      <p:sp>
+        <p:nvSpPr>
+          <p:cNvPr id="13" name="Segnaposto contenuto 12"/>
+          <p:cNvSpPr>
+            <a:spLocks noGrp="1"/>
+          </p:cNvSpPr>
+          <p:nvPr>
+            <p:ph idx="1"/>
+          </p:nvPr>
+        </p:nvSpPr>
+        <p:spPr/>
+        <p:txBody>
+          <a:bodyPr/>
+          <a:lstStyle/>
+          <a:p>
+            <a:endParaRPr lang="it-IT"/>
+          </a:p>
+        </p:txBody>
+      </p:sp>
+    </p:spTree>
+    <p:extLst>
+      <p:ext uri="{BB962C8B-B14F-4D97-AF65-F5344CB8AC3E}">
+        <p14:creationId xmlns:p14="http://schemas.microsoft.com/office/powerpoint/2010/main" val="3412366615"/>
       </p:ext>
     </p:extLst>
   </p:cSld>

</xml_diff>

<commit_message>
aggiunge al powerpoint la slide sull'ontologia di riferimento e sull'architettura sowftware dell'applicazione
</commit_message>
<xml_diff>
--- a/ontologia.pptx
+++ b/ontologia.pptx
@@ -14,8 +14,10 @@
     <p:sldId id="263" r:id="rId8"/>
     <p:sldId id="264" r:id="rId9"/>
     <p:sldId id="269" r:id="rId10"/>
-    <p:sldId id="256" r:id="rId11"/>
-    <p:sldId id="258" r:id="rId12"/>
+    <p:sldId id="270" r:id="rId11"/>
+    <p:sldId id="272" r:id="rId12"/>
+    <p:sldId id="271" r:id="rId13"/>
+    <p:sldId id="258" r:id="rId14"/>
   </p:sldIdLst>
   <p:sldSz cx="12192000" cy="6858000"/>
   <p:notesSz cx="6858000" cy="9144000"/>
@@ -269,7 +271,7 @@
           <a:p>
             <a:fld id="{1A332EEC-0DEC-4519-86B2-D35C9D955E4F}" type="datetimeFigureOut">
               <a:rPr lang="it-IT" smtClean="0"/>
-              <a:t>28/09/2017</a:t>
+              <a:t>29/09/2017</a:t>
             </a:fld>
             <a:endParaRPr lang="it-IT"/>
           </a:p>
@@ -439,7 +441,7 @@
           <a:p>
             <a:fld id="{1A332EEC-0DEC-4519-86B2-D35C9D955E4F}" type="datetimeFigureOut">
               <a:rPr lang="it-IT" smtClean="0"/>
-              <a:t>28/09/2017</a:t>
+              <a:t>29/09/2017</a:t>
             </a:fld>
             <a:endParaRPr lang="it-IT"/>
           </a:p>
@@ -619,7 +621,7 @@
           <a:p>
             <a:fld id="{1A332EEC-0DEC-4519-86B2-D35C9D955E4F}" type="datetimeFigureOut">
               <a:rPr lang="it-IT" smtClean="0"/>
-              <a:t>28/09/2017</a:t>
+              <a:t>29/09/2017</a:t>
             </a:fld>
             <a:endParaRPr lang="it-IT"/>
           </a:p>
@@ -789,7 +791,7 @@
           <a:p>
             <a:fld id="{1A332EEC-0DEC-4519-86B2-D35C9D955E4F}" type="datetimeFigureOut">
               <a:rPr lang="it-IT" smtClean="0"/>
-              <a:t>28/09/2017</a:t>
+              <a:t>29/09/2017</a:t>
             </a:fld>
             <a:endParaRPr lang="it-IT"/>
           </a:p>
@@ -1035,7 +1037,7 @@
           <a:p>
             <a:fld id="{1A332EEC-0DEC-4519-86B2-D35C9D955E4F}" type="datetimeFigureOut">
               <a:rPr lang="it-IT" smtClean="0"/>
-              <a:t>28/09/2017</a:t>
+              <a:t>29/09/2017</a:t>
             </a:fld>
             <a:endParaRPr lang="it-IT"/>
           </a:p>
@@ -1267,7 +1269,7 @@
           <a:p>
             <a:fld id="{1A332EEC-0DEC-4519-86B2-D35C9D955E4F}" type="datetimeFigureOut">
               <a:rPr lang="it-IT" smtClean="0"/>
-              <a:t>28/09/2017</a:t>
+              <a:t>29/09/2017</a:t>
             </a:fld>
             <a:endParaRPr lang="it-IT"/>
           </a:p>
@@ -1634,7 +1636,7 @@
           <a:p>
             <a:fld id="{1A332EEC-0DEC-4519-86B2-D35C9D955E4F}" type="datetimeFigureOut">
               <a:rPr lang="it-IT" smtClean="0"/>
-              <a:t>28/09/2017</a:t>
+              <a:t>29/09/2017</a:t>
             </a:fld>
             <a:endParaRPr lang="it-IT"/>
           </a:p>
@@ -1752,7 +1754,7 @@
           <a:p>
             <a:fld id="{1A332EEC-0DEC-4519-86B2-D35C9D955E4F}" type="datetimeFigureOut">
               <a:rPr lang="it-IT" smtClean="0"/>
-              <a:t>28/09/2017</a:t>
+              <a:t>29/09/2017</a:t>
             </a:fld>
             <a:endParaRPr lang="it-IT"/>
           </a:p>
@@ -1847,7 +1849,7 @@
           <a:p>
             <a:fld id="{1A332EEC-0DEC-4519-86B2-D35C9D955E4F}" type="datetimeFigureOut">
               <a:rPr lang="it-IT" smtClean="0"/>
-              <a:t>28/09/2017</a:t>
+              <a:t>29/09/2017</a:t>
             </a:fld>
             <a:endParaRPr lang="it-IT"/>
           </a:p>
@@ -2124,7 +2126,7 @@
           <a:p>
             <a:fld id="{1A332EEC-0DEC-4519-86B2-D35C9D955E4F}" type="datetimeFigureOut">
               <a:rPr lang="it-IT" smtClean="0"/>
-              <a:t>28/09/2017</a:t>
+              <a:t>29/09/2017</a:t>
             </a:fld>
             <a:endParaRPr lang="it-IT"/>
           </a:p>
@@ -2377,7 +2379,7 @@
           <a:p>
             <a:fld id="{1A332EEC-0DEC-4519-86B2-D35C9D955E4F}" type="datetimeFigureOut">
               <a:rPr lang="it-IT" smtClean="0"/>
-              <a:t>28/09/2017</a:t>
+              <a:t>29/09/2017</a:t>
             </a:fld>
             <a:endParaRPr lang="it-IT"/>
           </a:p>
@@ -2590,7 +2592,7 @@
           <a:p>
             <a:fld id="{1A332EEC-0DEC-4519-86B2-D35C9D955E4F}" type="datetimeFigureOut">
               <a:rPr lang="it-IT" smtClean="0"/>
-              <a:t>28/09/2017</a:t>
+              <a:t>29/09/2017</a:t>
             </a:fld>
             <a:endParaRPr lang="it-IT"/>
           </a:p>
@@ -3313,20 +3315,677 @@
           <a:chExt cx="0" cy="0"/>
         </a:xfrm>
       </p:grpSpPr>
-      <p:sp>
-        <p:nvSpPr>
-          <p:cNvPr id="6" name="Rectangle: Rounded Corners 5"/>
+      <p:pic>
+        <p:nvPicPr>
+          <p:cNvPr id="27" name="Immagine 26"/>
+          <p:cNvPicPr>
+            <a:picLocks noChangeAspect="1"/>
+          </p:cNvPicPr>
+          <p:nvPr/>
+        </p:nvPicPr>
+        <p:blipFill rotWithShape="1">
+          <a:blip r:embed="rId2"/>
+          <a:srcRect l="2201" t="1668" r="4600" b="5443"/>
+          <a:stretch/>
+        </p:blipFill>
+        <p:spPr>
+          <a:xfrm>
+            <a:off x="4935050" y="4065565"/>
+            <a:ext cx="2321899" cy="1688654"/>
+          </a:xfrm>
+          <a:prstGeom prst="rect">
+            <a:avLst/>
+          </a:prstGeom>
+        </p:spPr>
+      </p:pic>
+      <p:sp>
+        <p:nvSpPr>
+          <p:cNvPr id="52" name="Title 1">
+            <a:extLst>
+              <a:ext uri="{FF2B5EF4-FFF2-40B4-BE49-F238E27FC236}">
+                <a16:creationId xmlns:a16="http://schemas.microsoft.com/office/drawing/2014/main" id="{515D56D6-294D-44FB-B3E2-DE9DB87B0670}"/>
+              </a:ext>
+            </a:extLst>
+          </p:cNvPr>
+          <p:cNvSpPr>
+            <a:spLocks noGrp="1"/>
+          </p:cNvSpPr>
+          <p:nvPr>
+            <p:ph type="title"/>
+          </p:nvPr>
+        </p:nvSpPr>
+        <p:spPr>
+          <a:xfrm>
+            <a:off x="0" y="0"/>
+            <a:ext cx="12192000" cy="1690689"/>
+          </a:xfrm>
+          <a:solidFill>
+            <a:schemeClr val="accent1">
+              <a:lumMod val="40000"/>
+              <a:lumOff val="60000"/>
+            </a:schemeClr>
+          </a:solidFill>
+        </p:spPr>
+        <p:txBody>
+          <a:bodyPr/>
+          <a:lstStyle/>
+          <a:p>
+            <a:pPr algn="ctr"/>
+            <a:r>
+              <a:rPr lang="it-IT" b="1" dirty="0"/>
+              <a:t>Architettura software</a:t>
+            </a:r>
+          </a:p>
+        </p:txBody>
+      </p:sp>
+      <p:cxnSp>
+        <p:nvCxnSpPr>
+          <p:cNvPr id="24" name="Straight Arrow Connector 23">
+            <a:extLst>
+              <a:ext uri="{FF2B5EF4-FFF2-40B4-BE49-F238E27FC236}">
+                <a16:creationId xmlns:a16="http://schemas.microsoft.com/office/drawing/2014/main" id="{5A4B92CE-3848-4D79-AAF0-C4D07143B8BD}"/>
+              </a:ext>
+            </a:extLst>
+          </p:cNvPr>
+          <p:cNvCxnSpPr>
+            <a:cxnSpLocks/>
+            <a:endCxn id="27" idx="0"/>
+          </p:cNvCxnSpPr>
+          <p:nvPr/>
+        </p:nvCxnSpPr>
+        <p:spPr>
+          <a:xfrm>
+            <a:off x="6095998" y="2744777"/>
+            <a:ext cx="0" cy="1332000"/>
+          </a:xfrm>
+          <a:prstGeom prst="straightConnector1">
+            <a:avLst/>
+          </a:prstGeom>
+          <a:ln w="28575">
+            <a:solidFill>
+              <a:schemeClr val="tx1"/>
+            </a:solidFill>
+            <a:tailEnd type="triangle"/>
+          </a:ln>
+        </p:spPr>
+        <p:style>
+          <a:lnRef idx="1">
+            <a:schemeClr val="accent1"/>
+          </a:lnRef>
+          <a:fillRef idx="0">
+            <a:schemeClr val="accent1"/>
+          </a:fillRef>
+          <a:effectRef idx="0">
+            <a:schemeClr val="accent1"/>
+          </a:effectRef>
+          <a:fontRef idx="minor">
+            <a:schemeClr val="tx1"/>
+          </a:fontRef>
+        </p:style>
+      </p:cxnSp>
+      <p:pic>
+        <p:nvPicPr>
+          <p:cNvPr id="32" name="Picture 31">
+            <a:extLst>
+              <a:ext uri="{FF2B5EF4-FFF2-40B4-BE49-F238E27FC236}">
+                <a16:creationId xmlns:a16="http://schemas.microsoft.com/office/drawing/2014/main" id="{9290C010-1D18-4E8B-863E-4F8A28721ECD}"/>
+              </a:ext>
+            </a:extLst>
+          </p:cNvPr>
+          <p:cNvPicPr>
+            <a:picLocks noChangeAspect="1"/>
+          </p:cNvPicPr>
+          <p:nvPr/>
+        </p:nvPicPr>
+        <p:blipFill>
+          <a:blip r:embed="rId3">
+            <a:extLst>
+              <a:ext uri="{28A0092B-C50C-407E-A947-70E740481C1C}">
+                <a14:useLocalDpi xmlns:a14="http://schemas.microsoft.com/office/drawing/2010/main" val="0"/>
+              </a:ext>
+            </a:extLst>
+          </a:blip>
+          <a:stretch>
+            <a:fillRect/>
+          </a:stretch>
+        </p:blipFill>
+        <p:spPr>
+          <a:xfrm>
+            <a:off x="5700655" y="2346614"/>
+            <a:ext cx="790685" cy="438211"/>
+          </a:xfrm>
+          <a:prstGeom prst="rect">
+            <a:avLst/>
+          </a:prstGeom>
+        </p:spPr>
+      </p:pic>
+      <p:pic>
+        <p:nvPicPr>
+          <p:cNvPr id="34" name="Picture 33">
+            <a:extLst>
+              <a:ext uri="{FF2B5EF4-FFF2-40B4-BE49-F238E27FC236}">
+                <a16:creationId xmlns:a16="http://schemas.microsoft.com/office/drawing/2014/main" id="{1874A9F7-B19A-4E5C-B6B4-DA1E6B3F6400}"/>
+              </a:ext>
+            </a:extLst>
+          </p:cNvPr>
+          <p:cNvPicPr>
+            <a:picLocks noChangeAspect="1"/>
+          </p:cNvPicPr>
+          <p:nvPr/>
+        </p:nvPicPr>
+        <p:blipFill>
+          <a:blip r:embed="rId4">
+            <a:extLst>
+              <a:ext uri="{28A0092B-C50C-407E-A947-70E740481C1C}">
+                <a14:useLocalDpi xmlns:a14="http://schemas.microsoft.com/office/drawing/2010/main" val="0"/>
+              </a:ext>
+            </a:extLst>
+          </a:blip>
+          <a:stretch>
+            <a:fillRect/>
+          </a:stretch>
+        </p:blipFill>
+        <p:spPr>
+          <a:xfrm>
+            <a:off x="8334979" y="4586082"/>
+            <a:ext cx="1085714" cy="647619"/>
+          </a:xfrm>
+          <a:prstGeom prst="rect">
+            <a:avLst/>
+          </a:prstGeom>
+        </p:spPr>
+      </p:pic>
+      <p:cxnSp>
+        <p:nvCxnSpPr>
+          <p:cNvPr id="36" name="Straight Arrow Connector 35">
+            <a:extLst>
+              <a:ext uri="{FF2B5EF4-FFF2-40B4-BE49-F238E27FC236}">
+                <a16:creationId xmlns:a16="http://schemas.microsoft.com/office/drawing/2014/main" id="{E10F67F0-1339-41CA-8C96-D79072E835A4}"/>
+              </a:ext>
+            </a:extLst>
+          </p:cNvPr>
+          <p:cNvCxnSpPr>
+            <a:cxnSpLocks/>
+          </p:cNvCxnSpPr>
+          <p:nvPr/>
+        </p:nvCxnSpPr>
+        <p:spPr>
+          <a:xfrm>
+            <a:off x="7205434" y="4790941"/>
+            <a:ext cx="1176295" cy="0"/>
+          </a:xfrm>
+          <a:prstGeom prst="straightConnector1">
+            <a:avLst/>
+          </a:prstGeom>
+          <a:ln w="28575">
+            <a:solidFill>
+              <a:schemeClr val="tx1"/>
+            </a:solidFill>
+            <a:prstDash val="lgDashDot"/>
+            <a:headEnd type="none" w="med" len="med"/>
+            <a:tailEnd type="arrow" w="med" len="med"/>
+          </a:ln>
+        </p:spPr>
+        <p:style>
+          <a:lnRef idx="1">
+            <a:schemeClr val="accent2"/>
+          </a:lnRef>
+          <a:fillRef idx="0">
+            <a:schemeClr val="accent2"/>
+          </a:fillRef>
+          <a:effectRef idx="0">
+            <a:schemeClr val="accent2"/>
+          </a:effectRef>
+          <a:fontRef idx="minor">
+            <a:schemeClr val="tx1"/>
+          </a:fontRef>
+        </p:style>
+      </p:cxnSp>
+      <p:pic>
+        <p:nvPicPr>
+          <p:cNvPr id="95" name="Picture 94">
+            <a:extLst>
+              <a:ext uri="{FF2B5EF4-FFF2-40B4-BE49-F238E27FC236}">
+                <a16:creationId xmlns:a16="http://schemas.microsoft.com/office/drawing/2014/main" id="{82918184-8990-4169-B62B-3F0359BA5B84}"/>
+              </a:ext>
+            </a:extLst>
+          </p:cNvPr>
+          <p:cNvPicPr>
+            <a:picLocks noChangeAspect="1"/>
+          </p:cNvPicPr>
+          <p:nvPr/>
+        </p:nvPicPr>
+        <p:blipFill>
+          <a:blip r:embed="rId4">
+            <a:extLst>
+              <a:ext uri="{28A0092B-C50C-407E-A947-70E740481C1C}">
+                <a14:useLocalDpi xmlns:a14="http://schemas.microsoft.com/office/drawing/2010/main" val="0"/>
+              </a:ext>
+            </a:extLst>
+          </a:blip>
+          <a:stretch>
+            <a:fillRect/>
+          </a:stretch>
+        </p:blipFill>
+        <p:spPr>
+          <a:xfrm>
+            <a:off x="2924929" y="4637598"/>
+            <a:ext cx="1085714" cy="647619"/>
+          </a:xfrm>
+          <a:prstGeom prst="rect">
+            <a:avLst/>
+          </a:prstGeom>
+        </p:spPr>
+      </p:pic>
+      <p:cxnSp>
+        <p:nvCxnSpPr>
+          <p:cNvPr id="44" name="Straight Arrow Connector 43">
+            <a:extLst>
+              <a:ext uri="{FF2B5EF4-FFF2-40B4-BE49-F238E27FC236}">
+                <a16:creationId xmlns:a16="http://schemas.microsoft.com/office/drawing/2014/main" id="{9ECEC739-DDBB-4DBD-9AE8-834DD4933D3B}"/>
+              </a:ext>
+            </a:extLst>
+          </p:cNvPr>
+          <p:cNvCxnSpPr>
+            <a:cxnSpLocks/>
+          </p:cNvCxnSpPr>
+          <p:nvPr/>
+        </p:nvCxnSpPr>
+        <p:spPr>
+          <a:xfrm flipH="1">
+            <a:off x="3683948" y="4790941"/>
+            <a:ext cx="1251102" cy="0"/>
+          </a:xfrm>
+          <a:prstGeom prst="straightConnector1">
+            <a:avLst/>
+          </a:prstGeom>
+          <a:ln w="28575">
+            <a:solidFill>
+              <a:schemeClr val="tx1"/>
+            </a:solidFill>
+            <a:prstDash val="sysDot"/>
+            <a:tailEnd type="triangle"/>
+          </a:ln>
+        </p:spPr>
+        <p:style>
+          <a:lnRef idx="1">
+            <a:schemeClr val="accent1"/>
+          </a:lnRef>
+          <a:fillRef idx="0">
+            <a:schemeClr val="accent1"/>
+          </a:fillRef>
+          <a:effectRef idx="0">
+            <a:schemeClr val="accent1"/>
+          </a:effectRef>
+          <a:fontRef idx="minor">
+            <a:schemeClr val="tx1"/>
+          </a:fontRef>
+        </p:style>
+      </p:cxnSp>
+      <p:sp>
+        <p:nvSpPr>
+          <p:cNvPr id="47" name="TextBox 46">
+            <a:extLst>
+              <a:ext uri="{FF2B5EF4-FFF2-40B4-BE49-F238E27FC236}">
+                <a16:creationId xmlns:a16="http://schemas.microsoft.com/office/drawing/2014/main" id="{5C447C3E-F92E-4090-830C-2CE99DE866BA}"/>
+              </a:ext>
+            </a:extLst>
+          </p:cNvPr>
+          <p:cNvSpPr txBox="1"/>
+          <p:nvPr/>
+        </p:nvSpPr>
+        <p:spPr>
+          <a:xfrm>
+            <a:off x="5512547" y="1919741"/>
+            <a:ext cx="1351894" cy="369332"/>
+          </a:xfrm>
+          <a:prstGeom prst="rect">
+            <a:avLst/>
+          </a:prstGeom>
+          <a:noFill/>
+        </p:spPr>
+        <p:txBody>
+          <a:bodyPr wrap="square" rtlCol="0">
+            <a:spAutoFit/>
+          </a:bodyPr>
+          <a:lstStyle/>
+          <a:p>
+            <a:r>
+              <a:rPr lang="it-IT" dirty="0"/>
+              <a:t>Aula studio</a:t>
+            </a:r>
+          </a:p>
+        </p:txBody>
+      </p:sp>
+      <p:sp>
+        <p:nvSpPr>
+          <p:cNvPr id="48" name="TextBox 47">
+            <a:extLst>
+              <a:ext uri="{FF2B5EF4-FFF2-40B4-BE49-F238E27FC236}">
+                <a16:creationId xmlns:a16="http://schemas.microsoft.com/office/drawing/2014/main" id="{B66619FD-4E6E-4502-A61D-E08B77F257BB}"/>
+              </a:ext>
+            </a:extLst>
+          </p:cNvPr>
+          <p:cNvSpPr txBox="1"/>
+          <p:nvPr/>
+        </p:nvSpPr>
+        <p:spPr>
+          <a:xfrm>
+            <a:off x="9275230" y="4586082"/>
+            <a:ext cx="1223493" cy="369332"/>
+          </a:xfrm>
+          <a:prstGeom prst="rect">
+            <a:avLst/>
+          </a:prstGeom>
+          <a:noFill/>
+        </p:spPr>
+        <p:txBody>
+          <a:bodyPr wrap="square" rtlCol="0">
+            <a:spAutoFit/>
+          </a:bodyPr>
+          <a:lstStyle/>
+          <a:p>
+            <a:r>
+              <a:rPr lang="it-IT" dirty="0"/>
+              <a:t>Studente</a:t>
+            </a:r>
+          </a:p>
+        </p:txBody>
+      </p:sp>
+      <p:sp>
+        <p:nvSpPr>
+          <p:cNvPr id="49" name="TextBox 48">
+            <a:extLst>
+              <a:ext uri="{FF2B5EF4-FFF2-40B4-BE49-F238E27FC236}">
+                <a16:creationId xmlns:a16="http://schemas.microsoft.com/office/drawing/2014/main" id="{464B0DB8-0B1E-4569-A266-EC7EFD7252FE}"/>
+              </a:ext>
+            </a:extLst>
+          </p:cNvPr>
+          <p:cNvSpPr txBox="1"/>
+          <p:nvPr/>
+        </p:nvSpPr>
+        <p:spPr>
+          <a:xfrm>
+            <a:off x="749462" y="4329276"/>
+            <a:ext cx="2395471" cy="923330"/>
+          </a:xfrm>
+          <a:prstGeom prst="rect">
+            <a:avLst/>
+          </a:prstGeom>
+          <a:noFill/>
+        </p:spPr>
+        <p:txBody>
+          <a:bodyPr wrap="square" rtlCol="0">
+            <a:spAutoFit/>
+          </a:bodyPr>
+          <a:lstStyle/>
+          <a:p>
+            <a:r>
+              <a:rPr lang="it-IT" dirty="0"/>
+              <a:t>Raccoglitore di statistiche sull’utilizzo delle aule studio</a:t>
+            </a:r>
+          </a:p>
+        </p:txBody>
+      </p:sp>
+      <p:cxnSp>
+        <p:nvCxnSpPr>
+          <p:cNvPr id="54" name="Straight Arrow Connector 53">
+            <a:extLst>
+              <a:ext uri="{FF2B5EF4-FFF2-40B4-BE49-F238E27FC236}">
+                <a16:creationId xmlns:a16="http://schemas.microsoft.com/office/drawing/2014/main" id="{212B92AE-CB25-4F2E-9CA5-4E827EF2740F}"/>
+              </a:ext>
+            </a:extLst>
+          </p:cNvPr>
+          <p:cNvCxnSpPr/>
+          <p:nvPr/>
+        </p:nvCxnSpPr>
+        <p:spPr>
+          <a:xfrm>
+            <a:off x="8484306" y="2544685"/>
+            <a:ext cx="785611" cy="0"/>
+          </a:xfrm>
+          <a:prstGeom prst="straightConnector1">
+            <a:avLst/>
+          </a:prstGeom>
+          <a:ln w="28575">
+            <a:solidFill>
+              <a:schemeClr val="tx1"/>
+            </a:solidFill>
+            <a:tailEnd type="triangle"/>
+          </a:ln>
+        </p:spPr>
+        <p:style>
+          <a:lnRef idx="1">
+            <a:schemeClr val="accent1"/>
+          </a:lnRef>
+          <a:fillRef idx="0">
+            <a:schemeClr val="accent1"/>
+          </a:fillRef>
+          <a:effectRef idx="0">
+            <a:schemeClr val="accent1"/>
+          </a:effectRef>
+          <a:fontRef idx="minor">
+            <a:schemeClr val="tx1"/>
+          </a:fontRef>
+        </p:style>
+      </p:cxnSp>
+      <p:cxnSp>
+        <p:nvCxnSpPr>
+          <p:cNvPr id="96" name="Straight Arrow Connector 95">
+            <a:extLst>
+              <a:ext uri="{FF2B5EF4-FFF2-40B4-BE49-F238E27FC236}">
+                <a16:creationId xmlns:a16="http://schemas.microsoft.com/office/drawing/2014/main" id="{59B703F6-DD2C-4BEC-88EA-29D1584B4E09}"/>
+              </a:ext>
+            </a:extLst>
+          </p:cNvPr>
+          <p:cNvCxnSpPr/>
+          <p:nvPr/>
+        </p:nvCxnSpPr>
+        <p:spPr>
+          <a:xfrm>
+            <a:off x="8484306" y="2888330"/>
+            <a:ext cx="785611" cy="0"/>
+          </a:xfrm>
+          <a:prstGeom prst="straightConnector1">
+            <a:avLst/>
+          </a:prstGeom>
+          <a:ln w="28575">
+            <a:solidFill>
+              <a:schemeClr val="tx1"/>
+            </a:solidFill>
+            <a:prstDash val="sysDot"/>
+            <a:tailEnd type="triangle"/>
+          </a:ln>
+        </p:spPr>
+        <p:style>
+          <a:lnRef idx="1">
+            <a:schemeClr val="accent1"/>
+          </a:lnRef>
+          <a:fillRef idx="0">
+            <a:schemeClr val="accent1"/>
+          </a:fillRef>
+          <a:effectRef idx="0">
+            <a:schemeClr val="accent1"/>
+          </a:effectRef>
+          <a:fontRef idx="minor">
+            <a:schemeClr val="tx1"/>
+          </a:fontRef>
+        </p:style>
+      </p:cxnSp>
+      <p:cxnSp>
+        <p:nvCxnSpPr>
+          <p:cNvPr id="97" name="Straight Arrow Connector 96">
+            <a:extLst>
+              <a:ext uri="{FF2B5EF4-FFF2-40B4-BE49-F238E27FC236}">
+                <a16:creationId xmlns:a16="http://schemas.microsoft.com/office/drawing/2014/main" id="{CA67D751-6D43-4DE5-917A-DBFE8C53FBC3}"/>
+              </a:ext>
+            </a:extLst>
+          </p:cNvPr>
+          <p:cNvCxnSpPr/>
+          <p:nvPr/>
+        </p:nvCxnSpPr>
+        <p:spPr>
+          <a:xfrm>
+            <a:off x="8484306" y="3259296"/>
+            <a:ext cx="785611" cy="0"/>
+          </a:xfrm>
+          <a:prstGeom prst="straightConnector1">
+            <a:avLst/>
+          </a:prstGeom>
+          <a:ln w="28575">
+            <a:solidFill>
+              <a:schemeClr val="tx1"/>
+            </a:solidFill>
+            <a:prstDash val="dashDot"/>
+            <a:tailEnd type="triangle"/>
+          </a:ln>
+        </p:spPr>
+        <p:style>
+          <a:lnRef idx="1">
+            <a:schemeClr val="accent1"/>
+          </a:lnRef>
+          <a:fillRef idx="0">
+            <a:schemeClr val="accent1"/>
+          </a:fillRef>
+          <a:effectRef idx="0">
+            <a:schemeClr val="accent1"/>
+          </a:effectRef>
+          <a:fontRef idx="minor">
+            <a:schemeClr val="tx1"/>
+          </a:fontRef>
+        </p:style>
+      </p:cxnSp>
+      <p:sp>
+        <p:nvSpPr>
+          <p:cNvPr id="55" name="TextBox 54">
+            <a:extLst>
+              <a:ext uri="{FF2B5EF4-FFF2-40B4-BE49-F238E27FC236}">
+                <a16:creationId xmlns:a16="http://schemas.microsoft.com/office/drawing/2014/main" id="{93C25ABA-CFEE-4EE9-B4E3-0DC9B8CB791E}"/>
+              </a:ext>
+            </a:extLst>
+          </p:cNvPr>
+          <p:cNvSpPr txBox="1"/>
+          <p:nvPr/>
+        </p:nvSpPr>
+        <p:spPr>
+          <a:xfrm>
+            <a:off x="8484306" y="2360019"/>
+            <a:ext cx="2900188" cy="369332"/>
+          </a:xfrm>
+          <a:prstGeom prst="rect">
+            <a:avLst/>
+          </a:prstGeom>
+          <a:noFill/>
+        </p:spPr>
+        <p:txBody>
+          <a:bodyPr wrap="square" rtlCol="0">
+            <a:spAutoFit/>
+          </a:bodyPr>
+          <a:lstStyle/>
+          <a:p>
+            <a:r>
+              <a:rPr lang="it-IT" dirty="0"/>
+              <a:t>                 Update</a:t>
+            </a:r>
+          </a:p>
+        </p:txBody>
+      </p:sp>
+      <p:sp>
+        <p:nvSpPr>
+          <p:cNvPr id="98" name="TextBox 97">
+            <a:extLst>
+              <a:ext uri="{FF2B5EF4-FFF2-40B4-BE49-F238E27FC236}">
+                <a16:creationId xmlns:a16="http://schemas.microsoft.com/office/drawing/2014/main" id="{7E93FB48-5507-444B-85AF-8C33D224BE28}"/>
+              </a:ext>
+            </a:extLst>
+          </p:cNvPr>
+          <p:cNvSpPr txBox="1"/>
+          <p:nvPr/>
+        </p:nvSpPr>
+        <p:spPr>
+          <a:xfrm>
+            <a:off x="8484306" y="2686817"/>
+            <a:ext cx="2900188" cy="369332"/>
+          </a:xfrm>
+          <a:prstGeom prst="rect">
+            <a:avLst/>
+          </a:prstGeom>
+          <a:noFill/>
+        </p:spPr>
+        <p:txBody>
+          <a:bodyPr wrap="square" rtlCol="0">
+            <a:spAutoFit/>
+          </a:bodyPr>
+          <a:lstStyle/>
+          <a:p>
+            <a:r>
+              <a:rPr lang="it-IT" dirty="0"/>
+              <a:t>                 Subscribe</a:t>
+            </a:r>
+          </a:p>
+        </p:txBody>
+      </p:sp>
+      <p:sp>
+        <p:nvSpPr>
+          <p:cNvPr id="99" name="TextBox 98">
+            <a:extLst>
+              <a:ext uri="{FF2B5EF4-FFF2-40B4-BE49-F238E27FC236}">
+                <a16:creationId xmlns:a16="http://schemas.microsoft.com/office/drawing/2014/main" id="{586F4D57-BA7D-4A90-A7F7-43E4E51C2593}"/>
+              </a:ext>
+            </a:extLst>
+          </p:cNvPr>
+          <p:cNvSpPr txBox="1"/>
+          <p:nvPr/>
+        </p:nvSpPr>
+        <p:spPr>
+          <a:xfrm>
+            <a:off x="9372023" y="3013615"/>
+            <a:ext cx="2900188" cy="369332"/>
+          </a:xfrm>
+          <a:prstGeom prst="rect">
+            <a:avLst/>
+          </a:prstGeom>
+          <a:noFill/>
+        </p:spPr>
+        <p:txBody>
+          <a:bodyPr wrap="square" rtlCol="0">
+            <a:spAutoFit/>
+          </a:bodyPr>
+          <a:lstStyle/>
+          <a:p>
+            <a:r>
+              <a:rPr lang="it-IT" dirty="0"/>
+              <a:t>Query</a:t>
+            </a:r>
+          </a:p>
+        </p:txBody>
+      </p:sp>
+      <p:sp>
+        <p:nvSpPr>
+          <p:cNvPr id="69" name="Rectangle 68">
+            <a:extLst>
+              <a:ext uri="{FF2B5EF4-FFF2-40B4-BE49-F238E27FC236}">
+                <a16:creationId xmlns:a16="http://schemas.microsoft.com/office/drawing/2014/main" id="{63B9871C-D97B-424B-9B70-7B844EAB404E}"/>
+              </a:ext>
+            </a:extLst>
+          </p:cNvPr>
           <p:cNvSpPr/>
           <p:nvPr/>
         </p:nvSpPr>
         <p:spPr>
           <a:xfrm>
-            <a:off x="5163610" y="1227121"/>
-            <a:ext cx="1881810" cy="516835"/>
-          </a:xfrm>
-          <a:prstGeom prst="roundRect">
+            <a:off x="8334979" y="2360019"/>
+            <a:ext cx="2215166" cy="1022928"/>
+          </a:xfrm>
+          <a:prstGeom prst="rect">
             <a:avLst/>
           </a:prstGeom>
+          <a:noFill/>
+          <a:ln w="28575">
+            <a:solidFill>
+              <a:schemeClr val="tx1"/>
+            </a:solidFill>
+          </a:ln>
         </p:spPr>
         <p:style>
           <a:lnRef idx="2">
@@ -3349,22 +4008,49 @@
           <a:lstStyle/>
           <a:p>
             <a:pPr algn="ctr"/>
-            <a:r>
-              <a:rPr lang="it-IT" dirty="0"/>
-              <a:t>sr:Table</a:t>
-            </a:r>
-          </a:p>
-        </p:txBody>
-      </p:sp>
-      <p:sp>
-        <p:nvSpPr>
-          <p:cNvPr id="7" name="Rectangle: Rounded Corners 6"/>
+            <a:endParaRPr lang="it-IT"/>
+          </a:p>
+        </p:txBody>
+      </p:sp>
+    </p:spTree>
+    <p:extLst>
+      <p:ext uri="{BB962C8B-B14F-4D97-AF65-F5344CB8AC3E}">
+        <p14:creationId xmlns:p14="http://schemas.microsoft.com/office/powerpoint/2010/main" val="871101247"/>
+      </p:ext>
+    </p:extLst>
+  </p:cSld>
+  <p:clrMapOvr>
+    <a:masterClrMapping/>
+  </p:clrMapOvr>
+</p:sld>
+</file>
+
+<file path=ppt/slides/slide11.xml><?xml version="1.0" encoding="utf-8"?>
+<p:sld xmlns:a="http://schemas.openxmlformats.org/drawingml/2006/main" xmlns:r="http://schemas.openxmlformats.org/officeDocument/2006/relationships" xmlns:p="http://schemas.openxmlformats.org/presentationml/2006/main">
+  <p:cSld>
+    <p:spTree>
+      <p:nvGrpSpPr>
+        <p:cNvPr id="1" name=""/>
+        <p:cNvGrpSpPr/>
+        <p:nvPr/>
+      </p:nvGrpSpPr>
+      <p:grpSpPr>
+        <a:xfrm>
+          <a:off x="0" y="0"/>
+          <a:ext cx="0" cy="0"/>
+          <a:chOff x="0" y="0"/>
+          <a:chExt cx="0" cy="0"/>
+        </a:xfrm>
+      </p:grpSpPr>
+      <p:sp>
+        <p:nvSpPr>
+          <p:cNvPr id="6" name="Rectangle: Rounded Corners 5"/>
           <p:cNvSpPr/>
           <p:nvPr/>
         </p:nvSpPr>
         <p:spPr>
           <a:xfrm>
-            <a:off x="5163610" y="2193478"/>
+            <a:off x="4967543" y="1813592"/>
             <a:ext cx="1881810" cy="516835"/>
           </a:xfrm>
           <a:prstGeom prst="roundRect">
@@ -3394,20 +4080,20 @@
             <a:pPr algn="ctr"/>
             <a:r>
               <a:rPr lang="it-IT" dirty="0"/>
-              <a:t>sr:StudyRoom</a:t>
-            </a:r>
-          </a:p>
-        </p:txBody>
-      </p:sp>
-      <p:sp>
-        <p:nvSpPr>
-          <p:cNvPr id="8" name="Rectangle: Rounded Corners 7"/>
+              <a:t>sr:Table</a:t>
+            </a:r>
+          </a:p>
+        </p:txBody>
+      </p:sp>
+      <p:sp>
+        <p:nvSpPr>
+          <p:cNvPr id="7" name="Rectangle: Rounded Corners 6"/>
           <p:cNvSpPr/>
           <p:nvPr/>
         </p:nvSpPr>
         <p:spPr>
           <a:xfrm>
-            <a:off x="5163610" y="260764"/>
+            <a:off x="4967543" y="2423387"/>
             <a:ext cx="1881810" cy="516835"/>
           </a:xfrm>
           <a:prstGeom prst="roundRect">
@@ -3437,20 +4123,20 @@
             <a:pPr algn="ctr"/>
             <a:r>
               <a:rPr lang="it-IT" dirty="0"/>
-              <a:t>sr:Seat</a:t>
-            </a:r>
-          </a:p>
-        </p:txBody>
-      </p:sp>
-      <p:sp>
-        <p:nvSpPr>
-          <p:cNvPr id="10" name="Rectangle: Rounded Corners 9"/>
+              <a:t>sr:StudyRoom</a:t>
+            </a:r>
+          </a:p>
+        </p:txBody>
+      </p:sp>
+      <p:sp>
+        <p:nvSpPr>
+          <p:cNvPr id="8" name="Rectangle: Rounded Corners 7"/>
           <p:cNvSpPr/>
           <p:nvPr/>
         </p:nvSpPr>
         <p:spPr>
           <a:xfrm>
-            <a:off x="5163610" y="3159835"/>
+            <a:off x="4967543" y="4291399"/>
             <a:ext cx="1881810" cy="516835"/>
           </a:xfrm>
           <a:prstGeom prst="roundRect">
@@ -3480,20 +4166,20 @@
             <a:pPr algn="ctr"/>
             <a:r>
               <a:rPr lang="it-IT" dirty="0"/>
-              <a:t>sr:University</a:t>
-            </a:r>
-          </a:p>
-        </p:txBody>
-      </p:sp>
-      <p:sp>
-        <p:nvSpPr>
-          <p:cNvPr id="11" name="Rectangle: Rounded Corners 10"/>
+              <a:t>sr:Seat</a:t>
+            </a:r>
+          </a:p>
+        </p:txBody>
+      </p:sp>
+      <p:sp>
+        <p:nvSpPr>
+          <p:cNvPr id="10" name="Rectangle: Rounded Corners 9"/>
           <p:cNvSpPr/>
           <p:nvPr/>
         </p:nvSpPr>
         <p:spPr>
           <a:xfrm>
-            <a:off x="5163610" y="4126192"/>
+            <a:off x="4979720" y="3040170"/>
             <a:ext cx="1881810" cy="516835"/>
           </a:xfrm>
           <a:prstGeom prst="roundRect">
@@ -3523,20 +4209,20 @@
             <a:pPr algn="ctr"/>
             <a:r>
               <a:rPr lang="it-IT" dirty="0"/>
-              <a:t>sr:Feature</a:t>
-            </a:r>
-          </a:p>
-        </p:txBody>
-      </p:sp>
-      <p:sp>
-        <p:nvSpPr>
-          <p:cNvPr id="12" name="Rectangle: Rounded Corners 11"/>
+              <a:t>sr:University</a:t>
+            </a:r>
+          </a:p>
+        </p:txBody>
+      </p:sp>
+      <p:sp>
+        <p:nvSpPr>
+          <p:cNvPr id="11" name="Rectangle: Rounded Corners 10"/>
           <p:cNvSpPr/>
           <p:nvPr/>
         </p:nvSpPr>
         <p:spPr>
           <a:xfrm>
-            <a:off x="5163610" y="5092549"/>
+            <a:off x="4979720" y="3687927"/>
             <a:ext cx="1881810" cy="516835"/>
           </a:xfrm>
           <a:prstGeom prst="roundRect">
@@ -3566,7 +4252,7 @@
             <a:pPr algn="ctr"/>
             <a:r>
               <a:rPr lang="it-IT" dirty="0"/>
-              <a:t>locn:Address</a:t>
+              <a:t>sr:Feature</a:t>
             </a:r>
           </a:p>
         </p:txBody>
@@ -3579,7 +4265,7 @@
         </p:nvSpPr>
         <p:spPr>
           <a:xfrm>
-            <a:off x="5163610" y="6058908"/>
+            <a:off x="4979720" y="4920495"/>
             <a:ext cx="1881810" cy="516835"/>
           </a:xfrm>
           <a:prstGeom prst="roundRect">
@@ -3609,7 +4295,7 @@
             <a:pPr algn="ctr"/>
             <a:r>
               <a:rPr lang="it-IT" dirty="0"/>
-              <a:t>geo:_Geometry</a:t>
+              <a:t>geo:SpatialThing</a:t>
             </a:r>
           </a:p>
         </p:txBody>
@@ -3622,8 +4308,8 @@
         </p:nvSpPr>
         <p:spPr>
           <a:xfrm>
-            <a:off x="2368935" y="3159835"/>
-            <a:ext cx="1882800" cy="516835"/>
+            <a:off x="2778103" y="3035405"/>
+            <a:ext cx="1286204" cy="516835"/>
           </a:xfrm>
           <a:prstGeom prst="roundRect">
             <a:avLst/>
@@ -3665,7 +4351,7 @@
         </p:nvSpPr>
         <p:spPr>
           <a:xfrm>
-            <a:off x="7957295" y="6058907"/>
+            <a:off x="7723985" y="4937642"/>
             <a:ext cx="1881810" cy="516835"/>
           </a:xfrm>
           <a:prstGeom prst="roundRect">
@@ -3695,7 +4381,7 @@
             <a:pPr algn="ctr"/>
             <a:r>
               <a:rPr lang="it-IT" dirty="0"/>
-              <a:t>geo:_Point</a:t>
+              <a:t>geo:Point</a:t>
             </a:r>
           </a:p>
         </p:txBody>
@@ -3705,13 +4391,12 @@
           <p:cNvPr id="18" name="Straight Arrow Connector 17"/>
           <p:cNvCxnSpPr>
             <a:cxnSpLocks/>
-            <a:stCxn id="15" idx="3"/>
           </p:cNvCxnSpPr>
           <p:nvPr/>
         </p:nvCxnSpPr>
         <p:spPr>
           <a:xfrm>
-            <a:off x="4251735" y="3418253"/>
+            <a:off x="4064307" y="3299198"/>
             <a:ext cx="932265" cy="0"/>
           </a:xfrm>
           <a:prstGeom prst="straightConnector1">
@@ -3752,7 +4437,7 @@
         </p:nvCxnSpPr>
         <p:spPr>
           <a:xfrm>
-            <a:off x="7045420" y="6313853"/>
+            <a:off x="6861530" y="5195793"/>
             <a:ext cx="911875" cy="0"/>
           </a:xfrm>
           <a:prstGeom prst="straightConnector1">
@@ -3793,6 +4478,908 @@
         </p:nvCxnSpPr>
         <p:spPr>
           <a:xfrm>
+            <a:off x="4539080" y="3973536"/>
+            <a:ext cx="432000" cy="0"/>
+          </a:xfrm>
+          <a:prstGeom prst="straightConnector1">
+            <a:avLst/>
+          </a:prstGeom>
+          <a:ln w="38100" cap="flat" cmpd="sng" algn="ctr">
+            <a:solidFill>
+              <a:schemeClr val="dk1"/>
+            </a:solidFill>
+            <a:prstDash val="solid"/>
+            <a:round/>
+            <a:headEnd type="none" w="med" len="med"/>
+            <a:tailEnd type="triangle" w="med" len="med"/>
+          </a:ln>
+        </p:spPr>
+        <p:style>
+          <a:lnRef idx="0">
+            <a:scrgbClr r="0" g="0" b="0"/>
+          </a:lnRef>
+          <a:fillRef idx="0">
+            <a:scrgbClr r="0" g="0" b="0"/>
+          </a:fillRef>
+          <a:effectRef idx="0">
+            <a:scrgbClr r="0" g="0" b="0"/>
+          </a:effectRef>
+          <a:fontRef idx="minor">
+            <a:schemeClr val="tx1"/>
+          </a:fontRef>
+        </p:style>
+      </p:cxnSp>
+      <p:cxnSp>
+        <p:nvCxnSpPr>
+          <p:cNvPr id="23" name="Straight Arrow Connector 22"/>
+          <p:cNvCxnSpPr>
+            <a:cxnSpLocks/>
+          </p:cNvCxnSpPr>
+          <p:nvPr/>
+        </p:nvCxnSpPr>
+        <p:spPr>
+          <a:xfrm>
+            <a:off x="4564573" y="2681804"/>
+            <a:ext cx="432000" cy="0"/>
+          </a:xfrm>
+          <a:prstGeom prst="straightConnector1">
+            <a:avLst/>
+          </a:prstGeom>
+          <a:ln w="38100" cap="flat" cmpd="sng" algn="ctr">
+            <a:solidFill>
+              <a:schemeClr val="dk1"/>
+            </a:solidFill>
+            <a:prstDash val="solid"/>
+            <a:round/>
+            <a:headEnd type="none" w="med" len="med"/>
+            <a:tailEnd type="triangle" w="med" len="med"/>
+          </a:ln>
+        </p:spPr>
+        <p:style>
+          <a:lnRef idx="0">
+            <a:scrgbClr r="0" g="0" b="0"/>
+          </a:lnRef>
+          <a:fillRef idx="0">
+            <a:scrgbClr r="0" g="0" b="0"/>
+          </a:fillRef>
+          <a:effectRef idx="0">
+            <a:scrgbClr r="0" g="0" b="0"/>
+          </a:effectRef>
+          <a:fontRef idx="minor">
+            <a:schemeClr val="tx1"/>
+          </a:fontRef>
+        </p:style>
+      </p:cxnSp>
+      <p:cxnSp>
+        <p:nvCxnSpPr>
+          <p:cNvPr id="24" name="Straight Arrow Connector 23"/>
+          <p:cNvCxnSpPr>
+            <a:cxnSpLocks/>
+            <a:endCxn id="13" idx="1"/>
+          </p:cNvCxnSpPr>
+          <p:nvPr/>
+        </p:nvCxnSpPr>
+        <p:spPr>
+          <a:xfrm flipV="1">
+            <a:off x="4518690" y="5178913"/>
+            <a:ext cx="461030" cy="13676"/>
+          </a:xfrm>
+          <a:prstGeom prst="straightConnector1">
+            <a:avLst/>
+          </a:prstGeom>
+          <a:ln w="38100" cap="flat" cmpd="sng" algn="ctr">
+            <a:solidFill>
+              <a:schemeClr val="dk1"/>
+            </a:solidFill>
+            <a:prstDash val="solid"/>
+            <a:round/>
+            <a:headEnd type="none" w="med" len="med"/>
+            <a:tailEnd type="triangle" w="med" len="med"/>
+          </a:ln>
+        </p:spPr>
+        <p:style>
+          <a:lnRef idx="0">
+            <a:scrgbClr r="0" g="0" b="0"/>
+          </a:lnRef>
+          <a:fillRef idx="0">
+            <a:scrgbClr r="0" g="0" b="0"/>
+          </a:fillRef>
+          <a:effectRef idx="0">
+            <a:scrgbClr r="0" g="0" b="0"/>
+          </a:effectRef>
+          <a:fontRef idx="minor">
+            <a:schemeClr val="tx1"/>
+          </a:fontRef>
+        </p:style>
+      </p:cxnSp>
+      <p:cxnSp>
+        <p:nvCxnSpPr>
+          <p:cNvPr id="25" name="Straight Arrow Connector 24"/>
+          <p:cNvCxnSpPr>
+            <a:cxnSpLocks/>
+          </p:cNvCxnSpPr>
+          <p:nvPr/>
+        </p:nvCxnSpPr>
+        <p:spPr>
+          <a:xfrm>
+            <a:off x="4547720" y="2072009"/>
+            <a:ext cx="432000" cy="0"/>
+          </a:xfrm>
+          <a:prstGeom prst="straightConnector1">
+            <a:avLst/>
+          </a:prstGeom>
+          <a:ln w="38100" cap="flat" cmpd="sng" algn="ctr">
+            <a:solidFill>
+              <a:schemeClr val="dk1"/>
+            </a:solidFill>
+            <a:prstDash val="solid"/>
+            <a:round/>
+            <a:headEnd type="none" w="med" len="med"/>
+            <a:tailEnd type="triangle" w="med" len="med"/>
+          </a:ln>
+        </p:spPr>
+        <p:style>
+          <a:lnRef idx="0">
+            <a:scrgbClr r="0" g="0" b="0"/>
+          </a:lnRef>
+          <a:fillRef idx="0">
+            <a:scrgbClr r="0" g="0" b="0"/>
+          </a:fillRef>
+          <a:effectRef idx="0">
+            <a:scrgbClr r="0" g="0" b="0"/>
+          </a:effectRef>
+          <a:fontRef idx="minor">
+            <a:schemeClr val="tx1"/>
+          </a:fontRef>
+        </p:style>
+      </p:cxnSp>
+      <p:cxnSp>
+        <p:nvCxnSpPr>
+          <p:cNvPr id="26" name="Straight Arrow Connector 25"/>
+          <p:cNvCxnSpPr>
+            <a:cxnSpLocks/>
+          </p:cNvCxnSpPr>
+          <p:nvPr/>
+        </p:nvCxnSpPr>
+        <p:spPr>
+          <a:xfrm>
+            <a:off x="4555933" y="4582317"/>
+            <a:ext cx="432000" cy="0"/>
+          </a:xfrm>
+          <a:prstGeom prst="straightConnector1">
+            <a:avLst/>
+          </a:prstGeom>
+          <a:ln w="38100" cap="flat" cmpd="sng" algn="ctr">
+            <a:solidFill>
+              <a:schemeClr val="dk1"/>
+            </a:solidFill>
+            <a:prstDash val="solid"/>
+            <a:round/>
+            <a:headEnd type="none" w="med" len="med"/>
+            <a:tailEnd type="triangle" w="med" len="med"/>
+          </a:ln>
+        </p:spPr>
+        <p:style>
+          <a:lnRef idx="0">
+            <a:scrgbClr r="0" g="0" b="0"/>
+          </a:lnRef>
+          <a:fillRef idx="0">
+            <a:scrgbClr r="0" g="0" b="0"/>
+          </a:fillRef>
+          <a:effectRef idx="0">
+            <a:scrgbClr r="0" g="0" b="0"/>
+          </a:effectRef>
+          <a:fontRef idx="minor">
+            <a:schemeClr val="tx1"/>
+          </a:fontRef>
+        </p:style>
+      </p:cxnSp>
+      <p:cxnSp>
+        <p:nvCxnSpPr>
+          <p:cNvPr id="42" name="Straight Connector 41"/>
+          <p:cNvCxnSpPr>
+            <a:cxnSpLocks/>
+          </p:cNvCxnSpPr>
+          <p:nvPr/>
+        </p:nvCxnSpPr>
+        <p:spPr>
+          <a:xfrm flipH="1">
+            <a:off x="4547293" y="2072009"/>
+            <a:ext cx="428" cy="3120580"/>
+          </a:xfrm>
+          <a:prstGeom prst="line">
+            <a:avLst/>
+          </a:prstGeom>
+          <a:ln w="38100">
+            <a:solidFill>
+              <a:schemeClr val="tx1"/>
+            </a:solidFill>
+          </a:ln>
+        </p:spPr>
+        <p:style>
+          <a:lnRef idx="1">
+            <a:schemeClr val="accent1"/>
+          </a:lnRef>
+          <a:fillRef idx="0">
+            <a:schemeClr val="accent1"/>
+          </a:fillRef>
+          <a:effectRef idx="0">
+            <a:schemeClr val="accent1"/>
+          </a:effectRef>
+          <a:fontRef idx="minor">
+            <a:schemeClr val="tx1"/>
+          </a:fontRef>
+        </p:style>
+      </p:cxnSp>
+      <p:sp>
+        <p:nvSpPr>
+          <p:cNvPr id="29" name="Title 1">
+            <a:extLst>
+              <a:ext uri="{FF2B5EF4-FFF2-40B4-BE49-F238E27FC236}">
+                <a16:creationId xmlns:a16="http://schemas.microsoft.com/office/drawing/2014/main" id="{E6E42441-9AFD-4C72-9A96-9DAFA828C563}"/>
+              </a:ext>
+            </a:extLst>
+          </p:cNvPr>
+          <p:cNvSpPr txBox="1">
+            <a:spLocks/>
+          </p:cNvSpPr>
+          <p:nvPr/>
+        </p:nvSpPr>
+        <p:spPr>
+          <a:xfrm>
+            <a:off x="0" y="0"/>
+            <a:ext cx="12192000" cy="1690689"/>
+          </a:xfrm>
+          <a:prstGeom prst="rect">
+            <a:avLst/>
+          </a:prstGeom>
+          <a:solidFill>
+            <a:schemeClr val="accent1">
+              <a:lumMod val="40000"/>
+              <a:lumOff val="60000"/>
+            </a:schemeClr>
+          </a:solidFill>
+        </p:spPr>
+        <p:txBody>
+          <a:bodyPr vert="horz" lIns="91440" tIns="45720" rIns="91440" bIns="45720" rtlCol="0" anchor="ctr">
+            <a:normAutofit/>
+          </a:bodyPr>
+          <a:lstStyle>
+            <a:lvl1pPr algn="ctr" defTabSz="914400" rtl="0" eaLnBrk="1" latinLnBrk="0" hangingPunct="1">
+              <a:lnSpc>
+                <a:spcPct val="90000"/>
+              </a:lnSpc>
+              <a:spcBef>
+                <a:spcPct val="0"/>
+              </a:spcBef>
+              <a:buNone/>
+              <a:defRPr sz="6000" kern="1200">
+                <a:solidFill>
+                  <a:schemeClr val="tx1"/>
+                </a:solidFill>
+                <a:latin typeface="+mj-lt"/>
+                <a:ea typeface="+mj-ea"/>
+                <a:cs typeface="+mj-cs"/>
+              </a:defRPr>
+            </a:lvl1pPr>
+          </a:lstStyle>
+          <a:p>
+            <a:r>
+              <a:rPr lang="it-IT" sz="4400" b="1" dirty="0"/>
+              <a:t>Ontologia di riferimento</a:t>
+            </a:r>
+          </a:p>
+        </p:txBody>
+      </p:sp>
+      <p:sp>
+        <p:nvSpPr>
+          <p:cNvPr id="2" name="TextBox 1">
+            <a:extLst>
+              <a:ext uri="{FF2B5EF4-FFF2-40B4-BE49-F238E27FC236}">
+                <a16:creationId xmlns:a16="http://schemas.microsoft.com/office/drawing/2014/main" id="{773D6907-62EF-45DD-AA09-79C5BA324916}"/>
+              </a:ext>
+            </a:extLst>
+          </p:cNvPr>
+          <p:cNvSpPr txBox="1"/>
+          <p:nvPr/>
+        </p:nvSpPr>
+        <p:spPr>
+          <a:xfrm>
+            <a:off x="1646349" y="5950719"/>
+            <a:ext cx="9672034" cy="1200329"/>
+          </a:xfrm>
+          <a:prstGeom prst="rect">
+            <a:avLst/>
+          </a:prstGeom>
+          <a:noFill/>
+        </p:spPr>
+        <p:txBody>
+          <a:bodyPr wrap="square" rtlCol="0">
+            <a:spAutoFit/>
+          </a:bodyPr>
+          <a:lstStyle/>
+          <a:p>
+            <a:r>
+              <a:rPr lang="it-IT" dirty="0"/>
+              <a:t>sr:	http://www.semanticweb.org/matteo/ontologies/2016/11/OperazioneStudyRoom# </a:t>
+            </a:r>
+          </a:p>
+          <a:p>
+            <a:r>
+              <a:rPr lang="it-IT" dirty="0"/>
+              <a:t>geo: 	http://www.w3.org/2003/01/geo/wgs84_pos#</a:t>
+            </a:r>
+          </a:p>
+          <a:p>
+            <a:endParaRPr lang="it-IT" dirty="0"/>
+          </a:p>
+          <a:p>
+            <a:endParaRPr lang="it-IT" dirty="0"/>
+          </a:p>
+        </p:txBody>
+      </p:sp>
+      <p:sp>
+        <p:nvSpPr>
+          <p:cNvPr id="3" name="Rectangle 2">
+            <a:extLst>
+              <a:ext uri="{FF2B5EF4-FFF2-40B4-BE49-F238E27FC236}">
+                <a16:creationId xmlns:a16="http://schemas.microsoft.com/office/drawing/2014/main" id="{69D9ED6F-A644-4A99-BA8F-8DD7AB5455AA}"/>
+              </a:ext>
+            </a:extLst>
+          </p:cNvPr>
+          <p:cNvSpPr/>
+          <p:nvPr/>
+        </p:nvSpPr>
+        <p:spPr>
+          <a:xfrm>
+            <a:off x="1556197" y="5950720"/>
+            <a:ext cx="9079605" cy="674338"/>
+          </a:xfrm>
+          <a:prstGeom prst="rect">
+            <a:avLst/>
+          </a:prstGeom>
+          <a:noFill/>
+          <a:ln w="28575">
+            <a:solidFill>
+              <a:schemeClr val="tx1"/>
+            </a:solidFill>
+          </a:ln>
+        </p:spPr>
+        <p:style>
+          <a:lnRef idx="2">
+            <a:schemeClr val="accent1">
+              <a:shade val="50000"/>
+            </a:schemeClr>
+          </a:lnRef>
+          <a:fillRef idx="1">
+            <a:schemeClr val="accent1"/>
+          </a:fillRef>
+          <a:effectRef idx="0">
+            <a:schemeClr val="accent1"/>
+          </a:effectRef>
+          <a:fontRef idx="minor">
+            <a:schemeClr val="lt1"/>
+          </a:fontRef>
+        </p:style>
+        <p:txBody>
+          <a:bodyPr rtlCol="0" anchor="ctr"/>
+          <a:lstStyle/>
+          <a:p>
+            <a:pPr algn="ctr"/>
+            <a:endParaRPr lang="it-IT"/>
+          </a:p>
+        </p:txBody>
+      </p:sp>
+    </p:spTree>
+    <p:extLst>
+      <p:ext uri="{BB962C8B-B14F-4D97-AF65-F5344CB8AC3E}">
+        <p14:creationId xmlns:p14="http://schemas.microsoft.com/office/powerpoint/2010/main" val="3058292775"/>
+      </p:ext>
+    </p:extLst>
+  </p:cSld>
+  <p:clrMapOvr>
+    <a:masterClrMapping/>
+  </p:clrMapOvr>
+</p:sld>
+</file>
+
+<file path=ppt/slides/slide12.xml><?xml version="1.0" encoding="utf-8"?>
+<p:sld xmlns:a="http://schemas.openxmlformats.org/drawingml/2006/main" xmlns:r="http://schemas.openxmlformats.org/officeDocument/2006/relationships" xmlns:p="http://schemas.openxmlformats.org/presentationml/2006/main">
+  <p:cSld>
+    <p:spTree>
+      <p:nvGrpSpPr>
+        <p:cNvPr id="1" name=""/>
+        <p:cNvGrpSpPr/>
+        <p:nvPr/>
+      </p:nvGrpSpPr>
+      <p:grpSpPr>
+        <a:xfrm>
+          <a:off x="0" y="0"/>
+          <a:ext cx="0" cy="0"/>
+          <a:chOff x="0" y="0"/>
+          <a:chExt cx="0" cy="0"/>
+        </a:xfrm>
+      </p:grpSpPr>
+      <p:sp>
+        <p:nvSpPr>
+          <p:cNvPr id="6" name="Rectangle: Rounded Corners 5"/>
+          <p:cNvSpPr/>
+          <p:nvPr/>
+        </p:nvSpPr>
+        <p:spPr>
+          <a:xfrm>
+            <a:off x="5163610" y="1227121"/>
+            <a:ext cx="1881810" cy="516835"/>
+          </a:xfrm>
+          <a:prstGeom prst="roundRect">
+            <a:avLst/>
+          </a:prstGeom>
+        </p:spPr>
+        <p:style>
+          <a:lnRef idx="2">
+            <a:schemeClr val="accent1">
+              <a:shade val="50000"/>
+            </a:schemeClr>
+          </a:lnRef>
+          <a:fillRef idx="1">
+            <a:schemeClr val="accent1"/>
+          </a:fillRef>
+          <a:effectRef idx="0">
+            <a:schemeClr val="accent1"/>
+          </a:effectRef>
+          <a:fontRef idx="minor">
+            <a:schemeClr val="lt1"/>
+          </a:fontRef>
+        </p:style>
+        <p:txBody>
+          <a:bodyPr rtlCol="0" anchor="ctr"/>
+          <a:lstStyle/>
+          <a:p>
+            <a:pPr algn="ctr"/>
+            <a:r>
+              <a:rPr lang="it-IT" dirty="0"/>
+              <a:t>sr:Table</a:t>
+            </a:r>
+          </a:p>
+        </p:txBody>
+      </p:sp>
+      <p:sp>
+        <p:nvSpPr>
+          <p:cNvPr id="7" name="Rectangle: Rounded Corners 6"/>
+          <p:cNvSpPr/>
+          <p:nvPr/>
+        </p:nvSpPr>
+        <p:spPr>
+          <a:xfrm>
+            <a:off x="5163610" y="2193478"/>
+            <a:ext cx="1881810" cy="516835"/>
+          </a:xfrm>
+          <a:prstGeom prst="roundRect">
+            <a:avLst/>
+          </a:prstGeom>
+        </p:spPr>
+        <p:style>
+          <a:lnRef idx="2">
+            <a:schemeClr val="accent1">
+              <a:shade val="50000"/>
+            </a:schemeClr>
+          </a:lnRef>
+          <a:fillRef idx="1">
+            <a:schemeClr val="accent1"/>
+          </a:fillRef>
+          <a:effectRef idx="0">
+            <a:schemeClr val="accent1"/>
+          </a:effectRef>
+          <a:fontRef idx="minor">
+            <a:schemeClr val="lt1"/>
+          </a:fontRef>
+        </p:style>
+        <p:txBody>
+          <a:bodyPr rtlCol="0" anchor="ctr"/>
+          <a:lstStyle/>
+          <a:p>
+            <a:pPr algn="ctr"/>
+            <a:r>
+              <a:rPr lang="it-IT" dirty="0"/>
+              <a:t>sr:StudyRoom</a:t>
+            </a:r>
+          </a:p>
+        </p:txBody>
+      </p:sp>
+      <p:sp>
+        <p:nvSpPr>
+          <p:cNvPr id="8" name="Rectangle: Rounded Corners 7"/>
+          <p:cNvSpPr/>
+          <p:nvPr/>
+        </p:nvSpPr>
+        <p:spPr>
+          <a:xfrm>
+            <a:off x="5163610" y="260764"/>
+            <a:ext cx="1881810" cy="516835"/>
+          </a:xfrm>
+          <a:prstGeom prst="roundRect">
+            <a:avLst/>
+          </a:prstGeom>
+        </p:spPr>
+        <p:style>
+          <a:lnRef idx="2">
+            <a:schemeClr val="accent1">
+              <a:shade val="50000"/>
+            </a:schemeClr>
+          </a:lnRef>
+          <a:fillRef idx="1">
+            <a:schemeClr val="accent1"/>
+          </a:fillRef>
+          <a:effectRef idx="0">
+            <a:schemeClr val="accent1"/>
+          </a:effectRef>
+          <a:fontRef idx="minor">
+            <a:schemeClr val="lt1"/>
+          </a:fontRef>
+        </p:style>
+        <p:txBody>
+          <a:bodyPr rtlCol="0" anchor="ctr"/>
+          <a:lstStyle/>
+          <a:p>
+            <a:pPr algn="ctr"/>
+            <a:r>
+              <a:rPr lang="it-IT" dirty="0"/>
+              <a:t>sr:Seat</a:t>
+            </a:r>
+          </a:p>
+        </p:txBody>
+      </p:sp>
+      <p:sp>
+        <p:nvSpPr>
+          <p:cNvPr id="10" name="Rectangle: Rounded Corners 9"/>
+          <p:cNvSpPr/>
+          <p:nvPr/>
+        </p:nvSpPr>
+        <p:spPr>
+          <a:xfrm>
+            <a:off x="5163610" y="3159835"/>
+            <a:ext cx="1881810" cy="516835"/>
+          </a:xfrm>
+          <a:prstGeom prst="roundRect">
+            <a:avLst/>
+          </a:prstGeom>
+        </p:spPr>
+        <p:style>
+          <a:lnRef idx="2">
+            <a:schemeClr val="accent1">
+              <a:shade val="50000"/>
+            </a:schemeClr>
+          </a:lnRef>
+          <a:fillRef idx="1">
+            <a:schemeClr val="accent1"/>
+          </a:fillRef>
+          <a:effectRef idx="0">
+            <a:schemeClr val="accent1"/>
+          </a:effectRef>
+          <a:fontRef idx="minor">
+            <a:schemeClr val="lt1"/>
+          </a:fontRef>
+        </p:style>
+        <p:txBody>
+          <a:bodyPr rtlCol="0" anchor="ctr"/>
+          <a:lstStyle/>
+          <a:p>
+            <a:pPr algn="ctr"/>
+            <a:r>
+              <a:rPr lang="it-IT" dirty="0"/>
+              <a:t>sr:University</a:t>
+            </a:r>
+          </a:p>
+        </p:txBody>
+      </p:sp>
+      <p:sp>
+        <p:nvSpPr>
+          <p:cNvPr id="11" name="Rectangle: Rounded Corners 10"/>
+          <p:cNvSpPr/>
+          <p:nvPr/>
+        </p:nvSpPr>
+        <p:spPr>
+          <a:xfrm>
+            <a:off x="5163610" y="4126192"/>
+            <a:ext cx="1881810" cy="516835"/>
+          </a:xfrm>
+          <a:prstGeom prst="roundRect">
+            <a:avLst/>
+          </a:prstGeom>
+        </p:spPr>
+        <p:style>
+          <a:lnRef idx="2">
+            <a:schemeClr val="accent1">
+              <a:shade val="50000"/>
+            </a:schemeClr>
+          </a:lnRef>
+          <a:fillRef idx="1">
+            <a:schemeClr val="accent1"/>
+          </a:fillRef>
+          <a:effectRef idx="0">
+            <a:schemeClr val="accent1"/>
+          </a:effectRef>
+          <a:fontRef idx="minor">
+            <a:schemeClr val="lt1"/>
+          </a:fontRef>
+        </p:style>
+        <p:txBody>
+          <a:bodyPr rtlCol="0" anchor="ctr"/>
+          <a:lstStyle/>
+          <a:p>
+            <a:pPr algn="ctr"/>
+            <a:r>
+              <a:rPr lang="it-IT" dirty="0"/>
+              <a:t>sr:Feature</a:t>
+            </a:r>
+          </a:p>
+        </p:txBody>
+      </p:sp>
+      <p:sp>
+        <p:nvSpPr>
+          <p:cNvPr id="12" name="Rectangle: Rounded Corners 11"/>
+          <p:cNvSpPr/>
+          <p:nvPr/>
+        </p:nvSpPr>
+        <p:spPr>
+          <a:xfrm>
+            <a:off x="5163610" y="5092549"/>
+            <a:ext cx="1881810" cy="516835"/>
+          </a:xfrm>
+          <a:prstGeom prst="roundRect">
+            <a:avLst/>
+          </a:prstGeom>
+        </p:spPr>
+        <p:style>
+          <a:lnRef idx="2">
+            <a:schemeClr val="accent1">
+              <a:shade val="50000"/>
+            </a:schemeClr>
+          </a:lnRef>
+          <a:fillRef idx="1">
+            <a:schemeClr val="accent1"/>
+          </a:fillRef>
+          <a:effectRef idx="0">
+            <a:schemeClr val="accent1"/>
+          </a:effectRef>
+          <a:fontRef idx="minor">
+            <a:schemeClr val="lt1"/>
+          </a:fontRef>
+        </p:style>
+        <p:txBody>
+          <a:bodyPr rtlCol="0" anchor="ctr"/>
+          <a:lstStyle/>
+          <a:p>
+            <a:pPr algn="ctr"/>
+            <a:r>
+              <a:rPr lang="it-IT" dirty="0"/>
+              <a:t>locn:Address</a:t>
+            </a:r>
+          </a:p>
+        </p:txBody>
+      </p:sp>
+      <p:sp>
+        <p:nvSpPr>
+          <p:cNvPr id="13" name="Rectangle: Rounded Corners 12"/>
+          <p:cNvSpPr/>
+          <p:nvPr/>
+        </p:nvSpPr>
+        <p:spPr>
+          <a:xfrm>
+            <a:off x="5163610" y="6058908"/>
+            <a:ext cx="1881810" cy="516835"/>
+          </a:xfrm>
+          <a:prstGeom prst="roundRect">
+            <a:avLst/>
+          </a:prstGeom>
+        </p:spPr>
+        <p:style>
+          <a:lnRef idx="2">
+            <a:schemeClr val="accent1">
+              <a:shade val="50000"/>
+            </a:schemeClr>
+          </a:lnRef>
+          <a:fillRef idx="1">
+            <a:schemeClr val="accent1"/>
+          </a:fillRef>
+          <a:effectRef idx="0">
+            <a:schemeClr val="accent1"/>
+          </a:effectRef>
+          <a:fontRef idx="minor">
+            <a:schemeClr val="lt1"/>
+          </a:fontRef>
+        </p:style>
+        <p:txBody>
+          <a:bodyPr rtlCol="0" anchor="ctr"/>
+          <a:lstStyle/>
+          <a:p>
+            <a:pPr algn="ctr"/>
+            <a:r>
+              <a:rPr lang="it-IT" dirty="0"/>
+              <a:t>geo:SpatialThing</a:t>
+            </a:r>
+          </a:p>
+        </p:txBody>
+      </p:sp>
+      <p:sp>
+        <p:nvSpPr>
+          <p:cNvPr id="15" name="Rectangle: Rounded Corners 14"/>
+          <p:cNvSpPr/>
+          <p:nvPr/>
+        </p:nvSpPr>
+        <p:spPr>
+          <a:xfrm>
+            <a:off x="2368935" y="3159835"/>
+            <a:ext cx="1882800" cy="516835"/>
+          </a:xfrm>
+          <a:prstGeom prst="roundRect">
+            <a:avLst/>
+          </a:prstGeom>
+        </p:spPr>
+        <p:style>
+          <a:lnRef idx="2">
+            <a:schemeClr val="accent1">
+              <a:shade val="50000"/>
+            </a:schemeClr>
+          </a:lnRef>
+          <a:fillRef idx="1">
+            <a:schemeClr val="accent1"/>
+          </a:fillRef>
+          <a:effectRef idx="0">
+            <a:schemeClr val="accent1"/>
+          </a:effectRef>
+          <a:fontRef idx="minor">
+            <a:schemeClr val="lt1"/>
+          </a:fontRef>
+        </p:style>
+        <p:txBody>
+          <a:bodyPr rtlCol="0" anchor="ctr"/>
+          <a:lstStyle/>
+          <a:p>
+            <a:pPr algn="ctr"/>
+            <a:r>
+              <a:rPr lang="it-IT" dirty="0"/>
+              <a:t>owl:Thing</a:t>
+            </a:r>
+          </a:p>
+        </p:txBody>
+      </p:sp>
+      <p:sp>
+        <p:nvSpPr>
+          <p:cNvPr id="16" name="Rectangle: Rounded Corners 15"/>
+          <p:cNvSpPr/>
+          <p:nvPr/>
+        </p:nvSpPr>
+        <p:spPr>
+          <a:xfrm>
+            <a:off x="7957295" y="6058907"/>
+            <a:ext cx="1881810" cy="516835"/>
+          </a:xfrm>
+          <a:prstGeom prst="roundRect">
+            <a:avLst/>
+          </a:prstGeom>
+        </p:spPr>
+        <p:style>
+          <a:lnRef idx="2">
+            <a:schemeClr val="accent1">
+              <a:shade val="50000"/>
+            </a:schemeClr>
+          </a:lnRef>
+          <a:fillRef idx="1">
+            <a:schemeClr val="accent1"/>
+          </a:fillRef>
+          <a:effectRef idx="0">
+            <a:schemeClr val="accent1"/>
+          </a:effectRef>
+          <a:fontRef idx="minor">
+            <a:schemeClr val="lt1"/>
+          </a:fontRef>
+        </p:style>
+        <p:txBody>
+          <a:bodyPr rtlCol="0" anchor="ctr"/>
+          <a:lstStyle/>
+          <a:p>
+            <a:pPr algn="ctr"/>
+            <a:r>
+              <a:rPr lang="it-IT" dirty="0"/>
+              <a:t>geo:Point</a:t>
+            </a:r>
+          </a:p>
+        </p:txBody>
+      </p:sp>
+      <p:cxnSp>
+        <p:nvCxnSpPr>
+          <p:cNvPr id="18" name="Straight Arrow Connector 17"/>
+          <p:cNvCxnSpPr>
+            <a:cxnSpLocks/>
+            <a:stCxn id="15" idx="3"/>
+          </p:cNvCxnSpPr>
+          <p:nvPr/>
+        </p:nvCxnSpPr>
+        <p:spPr>
+          <a:xfrm>
+            <a:off x="4251735" y="3418253"/>
+            <a:ext cx="932265" cy="0"/>
+          </a:xfrm>
+          <a:prstGeom prst="straightConnector1">
+            <a:avLst/>
+          </a:prstGeom>
+          <a:ln w="38100" cap="flat" cmpd="sng" algn="ctr">
+            <a:solidFill>
+              <a:schemeClr val="dk1"/>
+            </a:solidFill>
+            <a:prstDash val="solid"/>
+            <a:round/>
+            <a:headEnd type="none" w="med" len="med"/>
+            <a:tailEnd type="triangle" w="med" len="med"/>
+          </a:ln>
+        </p:spPr>
+        <p:style>
+          <a:lnRef idx="0">
+            <a:scrgbClr r="0" g="0" b="0"/>
+          </a:lnRef>
+          <a:fillRef idx="0">
+            <a:scrgbClr r="0" g="0" b="0"/>
+          </a:fillRef>
+          <a:effectRef idx="0">
+            <a:scrgbClr r="0" g="0" b="0"/>
+          </a:effectRef>
+          <a:fontRef idx="minor">
+            <a:schemeClr val="tx1"/>
+          </a:fontRef>
+        </p:style>
+      </p:cxnSp>
+      <p:cxnSp>
+        <p:nvCxnSpPr>
+          <p:cNvPr id="20" name="Straight Arrow Connector 19"/>
+          <p:cNvCxnSpPr>
+            <a:cxnSpLocks/>
+          </p:cNvCxnSpPr>
+          <p:nvPr/>
+        </p:nvCxnSpPr>
+        <p:spPr>
+          <a:xfrm>
+            <a:off x="7045420" y="6313853"/>
+            <a:ext cx="911875" cy="0"/>
+          </a:xfrm>
+          <a:prstGeom prst="straightConnector1">
+            <a:avLst/>
+          </a:prstGeom>
+          <a:ln w="38100" cap="flat" cmpd="sng" algn="ctr">
+            <a:solidFill>
+              <a:schemeClr val="dk1"/>
+            </a:solidFill>
+            <a:prstDash val="solid"/>
+            <a:round/>
+            <a:headEnd type="none" w="med" len="med"/>
+            <a:tailEnd type="triangle" w="med" len="med"/>
+          </a:ln>
+        </p:spPr>
+        <p:style>
+          <a:lnRef idx="0">
+            <a:scrgbClr r="0" g="0" b="0"/>
+          </a:lnRef>
+          <a:fillRef idx="0">
+            <a:scrgbClr r="0" g="0" b="0"/>
+          </a:fillRef>
+          <a:effectRef idx="0">
+            <a:scrgbClr r="0" g="0" b="0"/>
+          </a:effectRef>
+          <a:fontRef idx="minor">
+            <a:schemeClr val="tx1"/>
+          </a:fontRef>
+        </p:style>
+      </p:cxnSp>
+      <p:cxnSp>
+        <p:nvCxnSpPr>
+          <p:cNvPr id="21" name="Straight Arrow Connector 20"/>
+          <p:cNvCxnSpPr>
+            <a:cxnSpLocks/>
+          </p:cNvCxnSpPr>
+          <p:nvPr/>
+        </p:nvCxnSpPr>
+        <p:spPr>
+          <a:xfrm>
             <a:off x="4752000" y="4393130"/>
             <a:ext cx="432000" cy="0"/>
           </a:xfrm>
@@ -4068,10 +5655,10 @@
       </p:cxnSp>
       <p:sp>
         <p:nvSpPr>
-          <p:cNvPr id="27" name="TextBox 26">
+          <p:cNvPr id="2" name="TextBox 1">
             <a:extLst>
               <a:ext uri="{FF2B5EF4-FFF2-40B4-BE49-F238E27FC236}">
-                <a16:creationId xmlns:a16="http://schemas.microsoft.com/office/drawing/2014/main" id="{C5E17AE9-F250-4ABD-9C54-C92270DBA7CC}"/>
+                <a16:creationId xmlns:a16="http://schemas.microsoft.com/office/drawing/2014/main" id="{D015BEF2-ED1A-4F8E-8563-15ABF7E60025}"/>
               </a:ext>
             </a:extLst>
           </p:cNvPr>
@@ -4080,8 +5667,8 @@
         </p:nvSpPr>
         <p:spPr>
           <a:xfrm>
-            <a:off x="953247" y="532630"/>
-            <a:ext cx="3387144" cy="369332"/>
+            <a:off x="1197735" y="777599"/>
+            <a:ext cx="2459865" cy="646331"/>
           </a:xfrm>
           <a:prstGeom prst="rect">
             <a:avLst/>
@@ -4100,7 +5687,7 @@
                   <a:srgbClr val="FF0000"/>
                 </a:solidFill>
               </a:rPr>
-              <a:t>SECONDO ME E’ DA CAMBIARE</a:t>
+              <a:t>BACKUP – NON MODIFICARE</a:t>
             </a:r>
           </a:p>
         </p:txBody>
@@ -4108,7 +5695,7 @@
     </p:spTree>
     <p:extLst>
       <p:ext uri="{BB962C8B-B14F-4D97-AF65-F5344CB8AC3E}">
-        <p14:creationId xmlns:p14="http://schemas.microsoft.com/office/powerpoint/2010/main" val="2544109714"/>
+        <p14:creationId xmlns:p14="http://schemas.microsoft.com/office/powerpoint/2010/main" val="1807586185"/>
       </p:ext>
     </p:extLst>
   </p:cSld>
@@ -4118,7 +5705,7 @@
 </p:sld>
 </file>
 
-<file path=ppt/slides/slide11.xml><?xml version="1.0" encoding="utf-8"?>
+<file path=ppt/slides/slide13.xml><?xml version="1.0" encoding="utf-8"?>
 <p:sld xmlns:a="http://schemas.openxmlformats.org/drawingml/2006/main" xmlns:r="http://schemas.openxmlformats.org/officeDocument/2006/relationships" xmlns:p="http://schemas.openxmlformats.org/presentationml/2006/main">
   <p:cSld>
     <p:spTree>
@@ -6159,7 +7746,7 @@
                   <a:srgbClr val="FF0000"/>
                 </a:solidFill>
               </a:rPr>
-              <a:t>Voglio poter specificare il numero di posti liberi che le aule studio da includere nel risultato hanno</a:t>
+              <a:t>Voglio poter specificare il numero di posti liberi che le aule studio da includere nel risultato devono avere</a:t>
             </a:r>
           </a:p>
           <a:p>
@@ -6288,7 +7875,7 @@
           <a:p>
             <a:r>
               <a:rPr lang="it-IT" dirty="0"/>
-              <a:t>Voglio poter specificare il numero di posti liberi che le aule studio hanno</a:t>
+              <a:t>Voglio poter specificare il numero di posti liberi che le aule studio devono avere</a:t>
             </a:r>
           </a:p>
           <a:p>

</xml_diff>